<commit_message>
add Sequence Diagram 02 & 03
</commit_message>
<xml_diff>
--- a/PlantUML_in_Action.pptx
+++ b/PlantUML_in_Action.pptx
@@ -5,15 +5,16 @@
     <p:sldMasterId id="2147483648" r:id="rId4"/>
   </p:sldMasterIdLst>
   <p:notesMasterIdLst>
-    <p:notesMasterId r:id="rId8"/>
+    <p:notesMasterId r:id="rId9"/>
   </p:notesMasterIdLst>
   <p:handoutMasterIdLst>
-    <p:handoutMasterId r:id="rId9"/>
+    <p:handoutMasterId r:id="rId10"/>
   </p:handoutMasterIdLst>
   <p:sldIdLst>
     <p:sldId id="269" r:id="rId5"/>
     <p:sldId id="270" r:id="rId6"/>
     <p:sldId id="271" r:id="rId7"/>
+    <p:sldId id="273" r:id="rId8"/>
   </p:sldIdLst>
   <p:sldSz cx="12192000" cy="6858000"/>
   <p:notesSz cx="6858000" cy="9144000"/>
@@ -904,6 +905,90 @@
     <p:extLst>
       <p:ext uri="{BB962C8B-B14F-4D97-AF65-F5344CB8AC3E}">
         <p14:creationId xmlns:p14="http://schemas.microsoft.com/office/powerpoint/2010/main" val="2735392765"/>
+      </p:ext>
+    </p:extLst>
+  </p:cSld>
+  <p:clrMapOvr>
+    <a:masterClrMapping/>
+  </p:clrMapOvr>
+</p:notes>
+</file>
+
+<file path=ppt/notesSlides/notesSlide4.xml><?xml version="1.0" encoding="utf-8"?>
+<p:notes xmlns:a="http://schemas.openxmlformats.org/drawingml/2006/main" xmlns:r="http://schemas.openxmlformats.org/officeDocument/2006/relationships" xmlns:p="http://schemas.openxmlformats.org/presentationml/2006/main">
+  <p:cSld>
+    <p:spTree>
+      <p:nvGrpSpPr>
+        <p:cNvPr id="1" name=""/>
+        <p:cNvGrpSpPr/>
+        <p:nvPr/>
+      </p:nvGrpSpPr>
+      <p:grpSpPr>
+        <a:xfrm>
+          <a:off x="0" y="0"/>
+          <a:ext cx="0" cy="0"/>
+          <a:chOff x="0" y="0"/>
+          <a:chExt cx="0" cy="0"/>
+        </a:xfrm>
+      </p:grpSpPr>
+      <p:sp>
+        <p:nvSpPr>
+          <p:cNvPr id="2" name="Slide Image Placeholder 1"/>
+          <p:cNvSpPr>
+            <a:spLocks noGrp="1" noRot="1" noChangeAspect="1"/>
+          </p:cNvSpPr>
+          <p:nvPr>
+            <p:ph type="sldImg"/>
+          </p:nvPr>
+        </p:nvSpPr>
+        <p:spPr/>
+      </p:sp>
+      <p:sp>
+        <p:nvSpPr>
+          <p:cNvPr id="3" name="Notes Placeholder 2"/>
+          <p:cNvSpPr>
+            <a:spLocks noGrp="1"/>
+          </p:cNvSpPr>
+          <p:nvPr>
+            <p:ph type="body" idx="1"/>
+          </p:nvPr>
+        </p:nvSpPr>
+        <p:spPr/>
+        <p:txBody>
+          <a:bodyPr/>
+          <a:lstStyle/>
+          <a:p>
+            <a:endParaRPr lang="en-US" dirty="0"/>
+          </a:p>
+        </p:txBody>
+      </p:sp>
+      <p:sp>
+        <p:nvSpPr>
+          <p:cNvPr id="4" name="Slide Number Placeholder 3"/>
+          <p:cNvSpPr>
+            <a:spLocks noGrp="1"/>
+          </p:cNvSpPr>
+          <p:nvPr>
+            <p:ph type="sldNum" sz="quarter" idx="5"/>
+          </p:nvPr>
+        </p:nvSpPr>
+        <p:spPr/>
+        <p:txBody>
+          <a:bodyPr/>
+          <a:lstStyle/>
+          <a:p>
+            <a:fld id="{B2D6E128-7848-41C8-9D17-DA3B35E5052C}" type="slidenum">
+              <a:rPr lang="en-US" smtClean="0"/>
+              <a:t>4</a:t>
+            </a:fld>
+            <a:endParaRPr lang="en-US" dirty="0"/>
+          </a:p>
+        </p:txBody>
+      </p:sp>
+    </p:spTree>
+    <p:extLst>
+      <p:ext uri="{BB962C8B-B14F-4D97-AF65-F5344CB8AC3E}">
+        <p14:creationId xmlns:p14="http://schemas.microsoft.com/office/powerpoint/2010/main" val="832385440"/>
       </p:ext>
     </p:extLst>
   </p:cSld>
@@ -7404,6 +7489,600 @@
     <p:extLst>
       <p:ext uri="{BB962C8B-B14F-4D97-AF65-F5344CB8AC3E}">
         <p14:creationId xmlns:p14="http://schemas.microsoft.com/office/powerpoint/2010/main" val="1234812172"/>
+      </p:ext>
+    </p:extLst>
+  </p:cSld>
+  <p:clrMapOvr>
+    <a:masterClrMapping/>
+  </p:clrMapOvr>
+</p:sld>
+</file>
+
+<file path=ppt/slides/slide4.xml><?xml version="1.0" encoding="utf-8"?>
+<p:sld xmlns:a="http://schemas.openxmlformats.org/drawingml/2006/main" xmlns:r="http://schemas.openxmlformats.org/officeDocument/2006/relationships" xmlns:p="http://schemas.openxmlformats.org/presentationml/2006/main">
+  <p:cSld>
+    <p:spTree>
+      <p:nvGrpSpPr>
+        <p:cNvPr id="1" name=""/>
+        <p:cNvGrpSpPr/>
+        <p:nvPr/>
+      </p:nvGrpSpPr>
+      <p:grpSpPr>
+        <a:xfrm>
+          <a:off x="0" y="0"/>
+          <a:ext cx="0" cy="0"/>
+          <a:chOff x="0" y="0"/>
+          <a:chExt cx="0" cy="0"/>
+        </a:xfrm>
+      </p:grpSpPr>
+      <p:pic>
+        <p:nvPicPr>
+          <p:cNvPr id="18" name="Picture Placeholder 17" descr="Learn to Draw Background">
+            <a:extLst>
+              <a:ext uri="{FF2B5EF4-FFF2-40B4-BE49-F238E27FC236}">
+                <a16:creationId xmlns:a16="http://schemas.microsoft.com/office/drawing/2014/main" id="{7FD9C5C0-919A-48C6-B5A4-49A012EB3DC2}"/>
+              </a:ext>
+            </a:extLst>
+          </p:cNvPr>
+          <p:cNvPicPr>
+            <a:picLocks noGrp="1" noChangeAspect="1"/>
+          </p:cNvPicPr>
+          <p:nvPr>
+            <p:ph type="pic" sz="quarter" idx="15"/>
+          </p:nvPr>
+        </p:nvPicPr>
+        <p:blipFill>
+          <a:blip r:embed="rId3">
+            <a:extLst>
+              <a:ext uri="{28A0092B-C50C-407E-A947-70E740481C1C}">
+                <a14:useLocalDpi xmlns:a14="http://schemas.microsoft.com/office/drawing/2010/main" val="0"/>
+              </a:ext>
+            </a:extLst>
+          </a:blip>
+          <a:srcRect/>
+          <a:stretch>
+            <a:fillRect/>
+          </a:stretch>
+        </p:blipFill>
+        <p:spPr>
+          <a:xfrm>
+            <a:off x="0" y="-32004"/>
+            <a:ext cx="12192000" cy="6912864"/>
+          </a:xfrm>
+        </p:spPr>
+      </p:pic>
+      <p:sp>
+        <p:nvSpPr>
+          <p:cNvPr id="21" name="Title 20">
+            <a:extLst>
+              <a:ext uri="{FF2B5EF4-FFF2-40B4-BE49-F238E27FC236}">
+                <a16:creationId xmlns:a16="http://schemas.microsoft.com/office/drawing/2014/main" id="{D4374B7E-EEDF-4C84-BE7C-BB50183825A0}"/>
+              </a:ext>
+            </a:extLst>
+          </p:cNvPr>
+          <p:cNvSpPr>
+            <a:spLocks noGrp="1"/>
+          </p:cNvSpPr>
+          <p:nvPr>
+            <p:ph type="title"/>
+          </p:nvPr>
+        </p:nvSpPr>
+        <p:spPr>
+          <a:xfrm>
+            <a:off x="2346356" y="128571"/>
+            <a:ext cx="7120094" cy="819150"/>
+          </a:xfrm>
+          <a:gradFill flip="none" rotWithShape="1">
+            <a:gsLst>
+              <a:gs pos="0">
+                <a:schemeClr val="accent1">
+                  <a:lumMod val="67000"/>
+                </a:schemeClr>
+              </a:gs>
+              <a:gs pos="48000">
+                <a:schemeClr val="accent1">
+                  <a:lumMod val="97000"/>
+                  <a:lumOff val="3000"/>
+                </a:schemeClr>
+              </a:gs>
+              <a:gs pos="100000">
+                <a:schemeClr val="accent1">
+                  <a:lumMod val="60000"/>
+                  <a:lumOff val="40000"/>
+                </a:schemeClr>
+              </a:gs>
+            </a:gsLst>
+            <a:lin ang="16200000" scaled="1"/>
+            <a:tileRect/>
+          </a:gradFill>
+          <a:ln>
+            <a:noFill/>
+          </a:ln>
+        </p:spPr>
+        <p:style>
+          <a:lnRef idx="0">
+            <a:scrgbClr r="0" g="0" b="0"/>
+          </a:lnRef>
+          <a:fillRef idx="0">
+            <a:scrgbClr r="0" g="0" b="0"/>
+          </a:fillRef>
+          <a:effectRef idx="0">
+            <a:scrgbClr r="0" g="0" b="0"/>
+          </a:effectRef>
+          <a:fontRef idx="minor">
+            <a:schemeClr val="lt1"/>
+          </a:fontRef>
+        </p:style>
+        <p:txBody>
+          <a:bodyPr anchor="ctr"/>
+          <a:lstStyle/>
+          <a:p>
+            <a:pPr algn="ctr"/>
+            <a:r>
+              <a:rPr lang="en-US" sz="6600" dirty="0">
+                <a:solidFill>
+                  <a:schemeClr val="bg1">
+                    <a:lumMod val="95000"/>
+                  </a:schemeClr>
+                </a:solidFill>
+              </a:rPr>
+              <a:t>PlantUML in Action</a:t>
+            </a:r>
+          </a:p>
+        </p:txBody>
+      </p:sp>
+      <p:sp>
+        <p:nvSpPr>
+          <p:cNvPr id="2" name="TextBox 1">
+            <a:extLst>
+              <a:ext uri="{FF2B5EF4-FFF2-40B4-BE49-F238E27FC236}">
+                <a16:creationId xmlns:a16="http://schemas.microsoft.com/office/drawing/2014/main" id="{BCB381F4-71C4-3080-500A-ADD1D9693A22}"/>
+              </a:ext>
+            </a:extLst>
+          </p:cNvPr>
+          <p:cNvSpPr txBox="1"/>
+          <p:nvPr/>
+        </p:nvSpPr>
+        <p:spPr>
+          <a:xfrm>
+            <a:off x="63778" y="544376"/>
+            <a:ext cx="1742785" cy="1323439"/>
+          </a:xfrm>
+          <a:prstGeom prst="rect">
+            <a:avLst/>
+          </a:prstGeom>
+          <a:noFill/>
+        </p:spPr>
+        <p:txBody>
+          <a:bodyPr wrap="none" rtlCol="0">
+            <a:spAutoFit/>
+          </a:bodyPr>
+          <a:lstStyle/>
+          <a:p>
+            <a:pPr algn="ctr"/>
+            <a:r>
+              <a:rPr lang="en-US" sz="8000" b="1" dirty="0">
+                <a:solidFill>
+                  <a:schemeClr val="tx1">
+                    <a:lumMod val="65000"/>
+                    <a:lumOff val="35000"/>
+                  </a:schemeClr>
+                </a:solidFill>
+                <a:effectLst>
+                  <a:outerShdw blurRad="38100" dist="38100" dir="2700000" algn="tl">
+                    <a:srgbClr val="000000">
+                      <a:alpha val="43137"/>
+                    </a:srgbClr>
+                  </a:outerShdw>
+                </a:effectLst>
+                <a:ea typeface="+mj-ea"/>
+                <a:cs typeface="+mj-cs"/>
+              </a:rPr>
+              <a:t>003</a:t>
+            </a:r>
+          </a:p>
+        </p:txBody>
+      </p:sp>
+      <p:pic>
+        <p:nvPicPr>
+          <p:cNvPr id="4" name="Picture 3">
+            <a:extLst>
+              <a:ext uri="{FF2B5EF4-FFF2-40B4-BE49-F238E27FC236}">
+                <a16:creationId xmlns:a16="http://schemas.microsoft.com/office/drawing/2014/main" id="{4336F9C1-947E-5FCC-732F-E31EB756B976}"/>
+              </a:ext>
+            </a:extLst>
+          </p:cNvPr>
+          <p:cNvPicPr>
+            <a:picLocks noChangeAspect="1"/>
+          </p:cNvPicPr>
+          <p:nvPr/>
+        </p:nvPicPr>
+        <p:blipFill>
+          <a:blip r:embed="rId4"/>
+          <a:stretch>
+            <a:fillRect/>
+          </a:stretch>
+        </p:blipFill>
+        <p:spPr>
+          <a:xfrm>
+            <a:off x="140722" y="2321084"/>
+            <a:ext cx="2156873" cy="1800225"/>
+          </a:xfrm>
+          <a:prstGeom prst="rect">
+            <a:avLst/>
+          </a:prstGeom>
+          <a:ln>
+            <a:noFill/>
+          </a:ln>
+          <a:effectLst>
+            <a:softEdge rad="112500"/>
+          </a:effectLst>
+        </p:spPr>
+      </p:pic>
+      <p:grpSp>
+        <p:nvGrpSpPr>
+          <p:cNvPr id="6" name="Group 5">
+            <a:extLst>
+              <a:ext uri="{FF2B5EF4-FFF2-40B4-BE49-F238E27FC236}">
+                <a16:creationId xmlns:a16="http://schemas.microsoft.com/office/drawing/2014/main" id="{9D2C3B74-3F5D-CAAA-2D9B-BC4A520A9943}"/>
+              </a:ext>
+            </a:extLst>
+          </p:cNvPr>
+          <p:cNvGrpSpPr/>
+          <p:nvPr/>
+        </p:nvGrpSpPr>
+        <p:grpSpPr>
+          <a:xfrm>
+            <a:off x="140722" y="6221921"/>
+            <a:ext cx="2807208" cy="588020"/>
+            <a:chOff x="9034272" y="6189470"/>
+            <a:chExt cx="2807208" cy="588020"/>
+          </a:xfrm>
+        </p:grpSpPr>
+        <p:sp>
+          <p:nvSpPr>
+            <p:cNvPr id="7" name="Rectangle: Rounded Corners 6">
+              <a:extLst>
+                <a:ext uri="{FF2B5EF4-FFF2-40B4-BE49-F238E27FC236}">
+                  <a16:creationId xmlns:a16="http://schemas.microsoft.com/office/drawing/2014/main" id="{0010B690-7856-5EB1-2BF9-0C41CA3642A5}"/>
+                </a:ext>
+              </a:extLst>
+            </p:cNvPr>
+            <p:cNvSpPr/>
+            <p:nvPr/>
+          </p:nvSpPr>
+          <p:spPr>
+            <a:xfrm>
+              <a:off x="9034272" y="6189470"/>
+              <a:ext cx="2807208" cy="588020"/>
+            </a:xfrm>
+            <a:prstGeom prst="roundRect">
+              <a:avLst/>
+            </a:prstGeom>
+            <a:solidFill>
+              <a:schemeClr val="accent1">
+                <a:lumMod val="20000"/>
+                <a:lumOff val="80000"/>
+              </a:schemeClr>
+            </a:solidFill>
+            <a:ln>
+              <a:noFill/>
+            </a:ln>
+          </p:spPr>
+          <p:style>
+            <a:lnRef idx="2">
+              <a:schemeClr val="accent1">
+                <a:shade val="15000"/>
+              </a:schemeClr>
+            </a:lnRef>
+            <a:fillRef idx="1">
+              <a:schemeClr val="accent1"/>
+            </a:fillRef>
+            <a:effectRef idx="0">
+              <a:schemeClr val="accent1"/>
+            </a:effectRef>
+            <a:fontRef idx="minor">
+              <a:schemeClr val="lt1"/>
+            </a:fontRef>
+          </p:style>
+          <p:txBody>
+            <a:bodyPr rtlCol="0" anchor="ctr"/>
+            <a:lstStyle/>
+            <a:p>
+              <a:pPr algn="r"/>
+              <a:r>
+                <a:rPr lang="en-US" sz="1200" dirty="0">
+                  <a:ln w="0"/>
+                  <a:solidFill>
+                    <a:schemeClr val="tx1"/>
+                  </a:solidFill>
+                  <a:effectLst>
+                    <a:outerShdw blurRad="38100" dist="19050" dir="2700000" algn="tl" rotWithShape="0">
+                      <a:schemeClr val="dk1">
+                        <a:alpha val="40000"/>
+                      </a:schemeClr>
+                    </a:outerShdw>
+                  </a:effectLst>
+                </a:rPr>
+                <a:t>Yasen – Enterprise Architecture</a:t>
+              </a:r>
+            </a:p>
+            <a:p>
+              <a:pPr algn="r"/>
+              <a:r>
+                <a:rPr lang="en-US" sz="1200" dirty="0">
+                  <a:ln w="0"/>
+                  <a:solidFill>
+                    <a:schemeClr val="tx1"/>
+                  </a:solidFill>
+                  <a:effectLst>
+                    <a:outerShdw blurRad="38100" dist="19050" dir="2700000" algn="tl" rotWithShape="0">
+                      <a:schemeClr val="dk1">
+                        <a:alpha val="40000"/>
+                      </a:schemeClr>
+                    </a:outerShdw>
+                  </a:effectLst>
+                </a:rPr>
+                <a:t>YouTube: @yasenzhao</a:t>
+              </a:r>
+            </a:p>
+          </p:txBody>
+        </p:sp>
+        <p:pic>
+          <p:nvPicPr>
+            <p:cNvPr id="8" name="Picture 7">
+              <a:extLst>
+                <a:ext uri="{FF2B5EF4-FFF2-40B4-BE49-F238E27FC236}">
+                  <a16:creationId xmlns:a16="http://schemas.microsoft.com/office/drawing/2014/main" id="{574298EC-4397-D1B2-D733-593141A52CEB}"/>
+                </a:ext>
+              </a:extLst>
+            </p:cNvPr>
+            <p:cNvPicPr>
+              <a:picLocks noChangeAspect="1"/>
+            </p:cNvPicPr>
+            <p:nvPr/>
+          </p:nvPicPr>
+          <p:blipFill>
+            <a:blip r:embed="rId5">
+              <a:clrChange>
+                <a:clrFrom>
+                  <a:srgbClr val="FFFFFF"/>
+                </a:clrFrom>
+                <a:clrTo>
+                  <a:srgbClr val="FFFFFF">
+                    <a:alpha val="0"/>
+                  </a:srgbClr>
+                </a:clrTo>
+              </a:clrChange>
+            </a:blip>
+            <a:stretch>
+              <a:fillRect/>
+            </a:stretch>
+          </p:blipFill>
+          <p:spPr>
+            <a:xfrm>
+              <a:off x="9187981" y="6196988"/>
+              <a:ext cx="557286" cy="572984"/>
+            </a:xfrm>
+            <a:prstGeom prst="rect">
+              <a:avLst/>
+            </a:prstGeom>
+          </p:spPr>
+        </p:pic>
+      </p:grpSp>
+      <p:sp>
+        <p:nvSpPr>
+          <p:cNvPr id="11" name="Text Placeholder 10">
+            <a:extLst>
+              <a:ext uri="{FF2B5EF4-FFF2-40B4-BE49-F238E27FC236}">
+                <a16:creationId xmlns:a16="http://schemas.microsoft.com/office/drawing/2014/main" id="{35F1FC23-8B59-9603-A7DF-2732C830F2A2}"/>
+              </a:ext>
+            </a:extLst>
+          </p:cNvPr>
+          <p:cNvSpPr>
+            <a:spLocks noGrp="1"/>
+          </p:cNvSpPr>
+          <p:nvPr>
+            <p:ph type="body" sz="quarter" idx="14"/>
+          </p:nvPr>
+        </p:nvSpPr>
+        <p:spPr>
+          <a:xfrm>
+            <a:off x="3220162" y="6400799"/>
+            <a:ext cx="6246288" cy="401623"/>
+          </a:xfrm>
+        </p:spPr>
+        <p:txBody>
+          <a:bodyPr>
+            <a:normAutofit fontScale="92500" lnSpcReduction="10000"/>
+          </a:bodyPr>
+          <a:lstStyle/>
+          <a:p>
+            <a:pPr>
+              <a:lnSpc>
+                <a:spcPct val="120000"/>
+              </a:lnSpc>
+            </a:pPr>
+            <a:r>
+              <a:rPr lang="en-US" sz="2000" dirty="0"/>
+              <a:t>GitHub: </a:t>
+            </a:r>
+            <a:r>
+              <a:rPr lang="en-US" sz="2000" dirty="0">
+                <a:hlinkClick r:id="rId6"/>
+              </a:rPr>
+              <a:t>https://github.com/yasenstar/PlantUML_in_Action</a:t>
+            </a:r>
+            <a:endParaRPr lang="en-US" sz="2000" dirty="0"/>
+          </a:p>
+        </p:txBody>
+      </p:sp>
+      <p:sp>
+        <p:nvSpPr>
+          <p:cNvPr id="12" name="Title 20">
+            <a:extLst>
+              <a:ext uri="{FF2B5EF4-FFF2-40B4-BE49-F238E27FC236}">
+                <a16:creationId xmlns:a16="http://schemas.microsoft.com/office/drawing/2014/main" id="{0CA82506-B712-27A8-0AC7-E2C48FCA049F}"/>
+              </a:ext>
+            </a:extLst>
+          </p:cNvPr>
+          <p:cNvSpPr txBox="1">
+            <a:spLocks/>
+          </p:cNvSpPr>
+          <p:nvPr/>
+        </p:nvSpPr>
+        <p:spPr>
+          <a:xfrm>
+            <a:off x="2438317" y="1031627"/>
+            <a:ext cx="8953583" cy="1556767"/>
+          </a:xfrm>
+          <a:prstGeom prst="rect">
+            <a:avLst/>
+          </a:prstGeom>
+          <a:solidFill>
+            <a:srgbClr val="EDF3DB">
+              <a:alpha val="50196"/>
+            </a:srgbClr>
+          </a:solidFill>
+        </p:spPr>
+        <p:txBody>
+          <a:bodyPr vert="horz" lIns="91440" tIns="45720" rIns="91440" bIns="45720" rtlCol="0" anchor="ctr">
+            <a:noAutofit/>
+          </a:bodyPr>
+          <a:lstStyle>
+            <a:lvl1pPr algn="l" defTabSz="914400" rtl="0" eaLnBrk="1" latinLnBrk="0" hangingPunct="1">
+              <a:lnSpc>
+                <a:spcPct val="90000"/>
+              </a:lnSpc>
+              <a:spcBef>
+                <a:spcPct val="0"/>
+              </a:spcBef>
+              <a:buNone/>
+              <a:defRPr sz="8200" b="1" kern="1200">
+                <a:solidFill>
+                  <a:schemeClr val="tx1">
+                    <a:lumMod val="65000"/>
+                    <a:lumOff val="35000"/>
+                  </a:schemeClr>
+                </a:solidFill>
+                <a:effectLst>
+                  <a:outerShdw blurRad="38100" dist="38100" dir="2700000" algn="tl">
+                    <a:srgbClr val="000000">
+                      <a:alpha val="43137"/>
+                    </a:srgbClr>
+                  </a:outerShdw>
+                </a:effectLst>
+                <a:latin typeface="+mn-lt"/>
+                <a:ea typeface="+mj-ea"/>
+                <a:cs typeface="+mj-cs"/>
+              </a:defRPr>
+            </a:lvl1pPr>
+          </a:lstStyle>
+          <a:p>
+            <a:r>
+              <a:rPr lang="en-US" sz="5400" dirty="0"/>
+              <a:t>1. Sequence Diagram</a:t>
+            </a:r>
+          </a:p>
+          <a:p>
+            <a:r>
+              <a:rPr lang="en-US" sz="4000" dirty="0"/>
+              <a:t>1.2 Declaring Participant</a:t>
+            </a:r>
+          </a:p>
+          <a:p>
+            <a:r>
+              <a:rPr lang="en-US" sz="4000" dirty="0"/>
+              <a:t>1.3 Declaring Participant on Multiline</a:t>
+            </a:r>
+            <a:endParaRPr lang="en-US" sz="5400" dirty="0"/>
+          </a:p>
+        </p:txBody>
+      </p:sp>
+      <p:pic>
+        <p:nvPicPr>
+          <p:cNvPr id="14" name="Picture 13">
+            <a:extLst>
+              <a:ext uri="{FF2B5EF4-FFF2-40B4-BE49-F238E27FC236}">
+                <a16:creationId xmlns:a16="http://schemas.microsoft.com/office/drawing/2014/main" id="{4EBFC749-074E-DA79-B832-3B4DFE2F5419}"/>
+              </a:ext>
+            </a:extLst>
+          </p:cNvPr>
+          <p:cNvPicPr>
+            <a:picLocks noChangeAspect="1"/>
+          </p:cNvPicPr>
+          <p:nvPr/>
+        </p:nvPicPr>
+        <p:blipFill>
+          <a:blip r:embed="rId7"/>
+          <a:stretch>
+            <a:fillRect/>
+          </a:stretch>
+        </p:blipFill>
+        <p:spPr>
+          <a:xfrm>
+            <a:off x="3195040" y="2843608"/>
+            <a:ext cx="5729769" cy="3557191"/>
+          </a:xfrm>
+          <a:prstGeom prst="rect">
+            <a:avLst/>
+          </a:prstGeom>
+          <a:ln>
+            <a:noFill/>
+          </a:ln>
+          <a:effectLst>
+            <a:outerShdw blurRad="292100" dist="139700" dir="2700000" algn="tl" rotWithShape="0">
+              <a:srgbClr val="333333">
+                <a:alpha val="65000"/>
+              </a:srgbClr>
+            </a:outerShdw>
+          </a:effectLst>
+        </p:spPr>
+      </p:pic>
+      <p:pic>
+        <p:nvPicPr>
+          <p:cNvPr id="13" name="Picture 12">
+            <a:extLst>
+              <a:ext uri="{FF2B5EF4-FFF2-40B4-BE49-F238E27FC236}">
+                <a16:creationId xmlns:a16="http://schemas.microsoft.com/office/drawing/2014/main" id="{8B243150-5AC3-01EC-01F2-A63DADD8EEC5}"/>
+              </a:ext>
+            </a:extLst>
+          </p:cNvPr>
+          <p:cNvPicPr>
+            <a:picLocks noChangeAspect="1"/>
+          </p:cNvPicPr>
+          <p:nvPr/>
+        </p:nvPicPr>
+        <p:blipFill>
+          <a:blip r:embed="rId8"/>
+          <a:stretch>
+            <a:fillRect/>
+          </a:stretch>
+        </p:blipFill>
+        <p:spPr>
+          <a:xfrm>
+            <a:off x="8274475" y="3823126"/>
+            <a:ext cx="3623094" cy="2527032"/>
+          </a:xfrm>
+          <a:prstGeom prst="rect">
+            <a:avLst/>
+          </a:prstGeom>
+          <a:ln>
+            <a:noFill/>
+          </a:ln>
+          <a:effectLst>
+            <a:outerShdw blurRad="292100" dist="139700" dir="2700000" algn="tl" rotWithShape="0">
+              <a:srgbClr val="333333">
+                <a:alpha val="65000"/>
+              </a:srgbClr>
+            </a:outerShdw>
+          </a:effectLst>
+        </p:spPr>
+      </p:pic>
+    </p:spTree>
+    <p:extLst>
+      <p:ext uri="{BB962C8B-B14F-4D97-AF65-F5344CB8AC3E}">
+        <p14:creationId xmlns:p14="http://schemas.microsoft.com/office/powerpoint/2010/main" val="2582821873"/>
       </p:ext>
     </p:extLst>
   </p:cSld>

</xml_diff>

<commit_message>
prepare in chapter 01
</commit_message>
<xml_diff>
--- a/PlantUML_in_Action.pptx
+++ b/PlantUML_in_Action.pptx
@@ -5,16 +5,21 @@
     <p:sldMasterId id="2147483648" r:id="rId4"/>
   </p:sldMasterIdLst>
   <p:notesMasterIdLst>
-    <p:notesMasterId r:id="rId9"/>
+    <p:notesMasterId r:id="rId14"/>
   </p:notesMasterIdLst>
   <p:handoutMasterIdLst>
-    <p:handoutMasterId r:id="rId10"/>
+    <p:handoutMasterId r:id="rId15"/>
   </p:handoutMasterIdLst>
   <p:sldIdLst>
     <p:sldId id="269" r:id="rId5"/>
     <p:sldId id="270" r:id="rId6"/>
     <p:sldId id="271" r:id="rId7"/>
     <p:sldId id="273" r:id="rId8"/>
+    <p:sldId id="274" r:id="rId9"/>
+    <p:sldId id="275" r:id="rId10"/>
+    <p:sldId id="276" r:id="rId11"/>
+    <p:sldId id="277" r:id="rId12"/>
+    <p:sldId id="278" r:id="rId13"/>
   </p:sldIdLst>
   <p:sldSz cx="12192000" cy="6858000"/>
   <p:notesSz cx="6858000" cy="9144000"/>
@@ -989,6 +994,426 @@
     <p:extLst>
       <p:ext uri="{BB962C8B-B14F-4D97-AF65-F5344CB8AC3E}">
         <p14:creationId xmlns:p14="http://schemas.microsoft.com/office/powerpoint/2010/main" val="832385440"/>
+      </p:ext>
+    </p:extLst>
+  </p:cSld>
+  <p:clrMapOvr>
+    <a:masterClrMapping/>
+  </p:clrMapOvr>
+</p:notes>
+</file>
+
+<file path=ppt/notesSlides/notesSlide5.xml><?xml version="1.0" encoding="utf-8"?>
+<p:notes xmlns:a="http://schemas.openxmlformats.org/drawingml/2006/main" xmlns:r="http://schemas.openxmlformats.org/officeDocument/2006/relationships" xmlns:p="http://schemas.openxmlformats.org/presentationml/2006/main">
+  <p:cSld>
+    <p:spTree>
+      <p:nvGrpSpPr>
+        <p:cNvPr id="1" name=""/>
+        <p:cNvGrpSpPr/>
+        <p:nvPr/>
+      </p:nvGrpSpPr>
+      <p:grpSpPr>
+        <a:xfrm>
+          <a:off x="0" y="0"/>
+          <a:ext cx="0" cy="0"/>
+          <a:chOff x="0" y="0"/>
+          <a:chExt cx="0" cy="0"/>
+        </a:xfrm>
+      </p:grpSpPr>
+      <p:sp>
+        <p:nvSpPr>
+          <p:cNvPr id="2" name="Slide Image Placeholder 1"/>
+          <p:cNvSpPr>
+            <a:spLocks noGrp="1" noRot="1" noChangeAspect="1"/>
+          </p:cNvSpPr>
+          <p:nvPr>
+            <p:ph type="sldImg"/>
+          </p:nvPr>
+        </p:nvSpPr>
+        <p:spPr/>
+      </p:sp>
+      <p:sp>
+        <p:nvSpPr>
+          <p:cNvPr id="3" name="Notes Placeholder 2"/>
+          <p:cNvSpPr>
+            <a:spLocks noGrp="1"/>
+          </p:cNvSpPr>
+          <p:nvPr>
+            <p:ph type="body" idx="1"/>
+          </p:nvPr>
+        </p:nvSpPr>
+        <p:spPr/>
+        <p:txBody>
+          <a:bodyPr/>
+          <a:lstStyle/>
+          <a:p>
+            <a:endParaRPr lang="en-US" dirty="0"/>
+          </a:p>
+        </p:txBody>
+      </p:sp>
+      <p:sp>
+        <p:nvSpPr>
+          <p:cNvPr id="4" name="Slide Number Placeholder 3"/>
+          <p:cNvSpPr>
+            <a:spLocks noGrp="1"/>
+          </p:cNvSpPr>
+          <p:nvPr>
+            <p:ph type="sldNum" sz="quarter" idx="5"/>
+          </p:nvPr>
+        </p:nvSpPr>
+        <p:spPr/>
+        <p:txBody>
+          <a:bodyPr/>
+          <a:lstStyle/>
+          <a:p>
+            <a:fld id="{B2D6E128-7848-41C8-9D17-DA3B35E5052C}" type="slidenum">
+              <a:rPr lang="en-US" smtClean="0"/>
+              <a:t>5</a:t>
+            </a:fld>
+            <a:endParaRPr lang="en-US" dirty="0"/>
+          </a:p>
+        </p:txBody>
+      </p:sp>
+    </p:spTree>
+    <p:extLst>
+      <p:ext uri="{BB962C8B-B14F-4D97-AF65-F5344CB8AC3E}">
+        <p14:creationId xmlns:p14="http://schemas.microsoft.com/office/powerpoint/2010/main" val="3035261293"/>
+      </p:ext>
+    </p:extLst>
+  </p:cSld>
+  <p:clrMapOvr>
+    <a:masterClrMapping/>
+  </p:clrMapOvr>
+</p:notes>
+</file>
+
+<file path=ppt/notesSlides/notesSlide6.xml><?xml version="1.0" encoding="utf-8"?>
+<p:notes xmlns:a="http://schemas.openxmlformats.org/drawingml/2006/main" xmlns:r="http://schemas.openxmlformats.org/officeDocument/2006/relationships" xmlns:p="http://schemas.openxmlformats.org/presentationml/2006/main">
+  <p:cSld>
+    <p:spTree>
+      <p:nvGrpSpPr>
+        <p:cNvPr id="1" name=""/>
+        <p:cNvGrpSpPr/>
+        <p:nvPr/>
+      </p:nvGrpSpPr>
+      <p:grpSpPr>
+        <a:xfrm>
+          <a:off x="0" y="0"/>
+          <a:ext cx="0" cy="0"/>
+          <a:chOff x="0" y="0"/>
+          <a:chExt cx="0" cy="0"/>
+        </a:xfrm>
+      </p:grpSpPr>
+      <p:sp>
+        <p:nvSpPr>
+          <p:cNvPr id="2" name="Slide Image Placeholder 1"/>
+          <p:cNvSpPr>
+            <a:spLocks noGrp="1" noRot="1" noChangeAspect="1"/>
+          </p:cNvSpPr>
+          <p:nvPr>
+            <p:ph type="sldImg"/>
+          </p:nvPr>
+        </p:nvSpPr>
+        <p:spPr/>
+      </p:sp>
+      <p:sp>
+        <p:nvSpPr>
+          <p:cNvPr id="3" name="Notes Placeholder 2"/>
+          <p:cNvSpPr>
+            <a:spLocks noGrp="1"/>
+          </p:cNvSpPr>
+          <p:nvPr>
+            <p:ph type="body" idx="1"/>
+          </p:nvPr>
+        </p:nvSpPr>
+        <p:spPr/>
+        <p:txBody>
+          <a:bodyPr/>
+          <a:lstStyle/>
+          <a:p>
+            <a:endParaRPr lang="en-US" dirty="0"/>
+          </a:p>
+        </p:txBody>
+      </p:sp>
+      <p:sp>
+        <p:nvSpPr>
+          <p:cNvPr id="4" name="Slide Number Placeholder 3"/>
+          <p:cNvSpPr>
+            <a:spLocks noGrp="1"/>
+          </p:cNvSpPr>
+          <p:nvPr>
+            <p:ph type="sldNum" sz="quarter" idx="5"/>
+          </p:nvPr>
+        </p:nvSpPr>
+        <p:spPr/>
+        <p:txBody>
+          <a:bodyPr/>
+          <a:lstStyle/>
+          <a:p>
+            <a:fld id="{B2D6E128-7848-41C8-9D17-DA3B35E5052C}" type="slidenum">
+              <a:rPr lang="en-US" smtClean="0"/>
+              <a:t>6</a:t>
+            </a:fld>
+            <a:endParaRPr lang="en-US" dirty="0"/>
+          </a:p>
+        </p:txBody>
+      </p:sp>
+    </p:spTree>
+    <p:extLst>
+      <p:ext uri="{BB962C8B-B14F-4D97-AF65-F5344CB8AC3E}">
+        <p14:creationId xmlns:p14="http://schemas.microsoft.com/office/powerpoint/2010/main" val="3927236574"/>
+      </p:ext>
+    </p:extLst>
+  </p:cSld>
+  <p:clrMapOvr>
+    <a:masterClrMapping/>
+  </p:clrMapOvr>
+</p:notes>
+</file>
+
+<file path=ppt/notesSlides/notesSlide7.xml><?xml version="1.0" encoding="utf-8"?>
+<p:notes xmlns:a="http://schemas.openxmlformats.org/drawingml/2006/main" xmlns:r="http://schemas.openxmlformats.org/officeDocument/2006/relationships" xmlns:p="http://schemas.openxmlformats.org/presentationml/2006/main">
+  <p:cSld>
+    <p:spTree>
+      <p:nvGrpSpPr>
+        <p:cNvPr id="1" name=""/>
+        <p:cNvGrpSpPr/>
+        <p:nvPr/>
+      </p:nvGrpSpPr>
+      <p:grpSpPr>
+        <a:xfrm>
+          <a:off x="0" y="0"/>
+          <a:ext cx="0" cy="0"/>
+          <a:chOff x="0" y="0"/>
+          <a:chExt cx="0" cy="0"/>
+        </a:xfrm>
+      </p:grpSpPr>
+      <p:sp>
+        <p:nvSpPr>
+          <p:cNvPr id="2" name="Slide Image Placeholder 1"/>
+          <p:cNvSpPr>
+            <a:spLocks noGrp="1" noRot="1" noChangeAspect="1"/>
+          </p:cNvSpPr>
+          <p:nvPr>
+            <p:ph type="sldImg"/>
+          </p:nvPr>
+        </p:nvSpPr>
+        <p:spPr/>
+      </p:sp>
+      <p:sp>
+        <p:nvSpPr>
+          <p:cNvPr id="3" name="Notes Placeholder 2"/>
+          <p:cNvSpPr>
+            <a:spLocks noGrp="1"/>
+          </p:cNvSpPr>
+          <p:nvPr>
+            <p:ph type="body" idx="1"/>
+          </p:nvPr>
+        </p:nvSpPr>
+        <p:spPr/>
+        <p:txBody>
+          <a:bodyPr/>
+          <a:lstStyle/>
+          <a:p>
+            <a:endParaRPr lang="en-US" dirty="0"/>
+          </a:p>
+        </p:txBody>
+      </p:sp>
+      <p:sp>
+        <p:nvSpPr>
+          <p:cNvPr id="4" name="Slide Number Placeholder 3"/>
+          <p:cNvSpPr>
+            <a:spLocks noGrp="1"/>
+          </p:cNvSpPr>
+          <p:nvPr>
+            <p:ph type="sldNum" sz="quarter" idx="5"/>
+          </p:nvPr>
+        </p:nvSpPr>
+        <p:spPr/>
+        <p:txBody>
+          <a:bodyPr/>
+          <a:lstStyle/>
+          <a:p>
+            <a:fld id="{B2D6E128-7848-41C8-9D17-DA3B35E5052C}" type="slidenum">
+              <a:rPr lang="en-US" smtClean="0"/>
+              <a:t>7</a:t>
+            </a:fld>
+            <a:endParaRPr lang="en-US" dirty="0"/>
+          </a:p>
+        </p:txBody>
+      </p:sp>
+    </p:spTree>
+    <p:extLst>
+      <p:ext uri="{BB962C8B-B14F-4D97-AF65-F5344CB8AC3E}">
+        <p14:creationId xmlns:p14="http://schemas.microsoft.com/office/powerpoint/2010/main" val="744861654"/>
+      </p:ext>
+    </p:extLst>
+  </p:cSld>
+  <p:clrMapOvr>
+    <a:masterClrMapping/>
+  </p:clrMapOvr>
+</p:notes>
+</file>
+
+<file path=ppt/notesSlides/notesSlide8.xml><?xml version="1.0" encoding="utf-8"?>
+<p:notes xmlns:a="http://schemas.openxmlformats.org/drawingml/2006/main" xmlns:r="http://schemas.openxmlformats.org/officeDocument/2006/relationships" xmlns:p="http://schemas.openxmlformats.org/presentationml/2006/main">
+  <p:cSld>
+    <p:spTree>
+      <p:nvGrpSpPr>
+        <p:cNvPr id="1" name=""/>
+        <p:cNvGrpSpPr/>
+        <p:nvPr/>
+      </p:nvGrpSpPr>
+      <p:grpSpPr>
+        <a:xfrm>
+          <a:off x="0" y="0"/>
+          <a:ext cx="0" cy="0"/>
+          <a:chOff x="0" y="0"/>
+          <a:chExt cx="0" cy="0"/>
+        </a:xfrm>
+      </p:grpSpPr>
+      <p:sp>
+        <p:nvSpPr>
+          <p:cNvPr id="2" name="Slide Image Placeholder 1"/>
+          <p:cNvSpPr>
+            <a:spLocks noGrp="1" noRot="1" noChangeAspect="1"/>
+          </p:cNvSpPr>
+          <p:nvPr>
+            <p:ph type="sldImg"/>
+          </p:nvPr>
+        </p:nvSpPr>
+        <p:spPr/>
+      </p:sp>
+      <p:sp>
+        <p:nvSpPr>
+          <p:cNvPr id="3" name="Notes Placeholder 2"/>
+          <p:cNvSpPr>
+            <a:spLocks noGrp="1"/>
+          </p:cNvSpPr>
+          <p:nvPr>
+            <p:ph type="body" idx="1"/>
+          </p:nvPr>
+        </p:nvSpPr>
+        <p:spPr/>
+        <p:txBody>
+          <a:bodyPr/>
+          <a:lstStyle/>
+          <a:p>
+            <a:endParaRPr lang="en-US" dirty="0"/>
+          </a:p>
+        </p:txBody>
+      </p:sp>
+      <p:sp>
+        <p:nvSpPr>
+          <p:cNvPr id="4" name="Slide Number Placeholder 3"/>
+          <p:cNvSpPr>
+            <a:spLocks noGrp="1"/>
+          </p:cNvSpPr>
+          <p:nvPr>
+            <p:ph type="sldNum" sz="quarter" idx="5"/>
+          </p:nvPr>
+        </p:nvSpPr>
+        <p:spPr/>
+        <p:txBody>
+          <a:bodyPr/>
+          <a:lstStyle/>
+          <a:p>
+            <a:fld id="{B2D6E128-7848-41C8-9D17-DA3B35E5052C}" type="slidenum">
+              <a:rPr lang="en-US" smtClean="0"/>
+              <a:t>8</a:t>
+            </a:fld>
+            <a:endParaRPr lang="en-US" dirty="0"/>
+          </a:p>
+        </p:txBody>
+      </p:sp>
+    </p:spTree>
+    <p:extLst>
+      <p:ext uri="{BB962C8B-B14F-4D97-AF65-F5344CB8AC3E}">
+        <p14:creationId xmlns:p14="http://schemas.microsoft.com/office/powerpoint/2010/main" val="664104552"/>
+      </p:ext>
+    </p:extLst>
+  </p:cSld>
+  <p:clrMapOvr>
+    <a:masterClrMapping/>
+  </p:clrMapOvr>
+</p:notes>
+</file>
+
+<file path=ppt/notesSlides/notesSlide9.xml><?xml version="1.0" encoding="utf-8"?>
+<p:notes xmlns:a="http://schemas.openxmlformats.org/drawingml/2006/main" xmlns:r="http://schemas.openxmlformats.org/officeDocument/2006/relationships" xmlns:p="http://schemas.openxmlformats.org/presentationml/2006/main">
+  <p:cSld>
+    <p:spTree>
+      <p:nvGrpSpPr>
+        <p:cNvPr id="1" name=""/>
+        <p:cNvGrpSpPr/>
+        <p:nvPr/>
+      </p:nvGrpSpPr>
+      <p:grpSpPr>
+        <a:xfrm>
+          <a:off x="0" y="0"/>
+          <a:ext cx="0" cy="0"/>
+          <a:chOff x="0" y="0"/>
+          <a:chExt cx="0" cy="0"/>
+        </a:xfrm>
+      </p:grpSpPr>
+      <p:sp>
+        <p:nvSpPr>
+          <p:cNvPr id="2" name="Slide Image Placeholder 1"/>
+          <p:cNvSpPr>
+            <a:spLocks noGrp="1" noRot="1" noChangeAspect="1"/>
+          </p:cNvSpPr>
+          <p:nvPr>
+            <p:ph type="sldImg"/>
+          </p:nvPr>
+        </p:nvSpPr>
+        <p:spPr/>
+      </p:sp>
+      <p:sp>
+        <p:nvSpPr>
+          <p:cNvPr id="3" name="Notes Placeholder 2"/>
+          <p:cNvSpPr>
+            <a:spLocks noGrp="1"/>
+          </p:cNvSpPr>
+          <p:nvPr>
+            <p:ph type="body" idx="1"/>
+          </p:nvPr>
+        </p:nvSpPr>
+        <p:spPr/>
+        <p:txBody>
+          <a:bodyPr/>
+          <a:lstStyle/>
+          <a:p>
+            <a:endParaRPr lang="en-US" dirty="0"/>
+          </a:p>
+        </p:txBody>
+      </p:sp>
+      <p:sp>
+        <p:nvSpPr>
+          <p:cNvPr id="4" name="Slide Number Placeholder 3"/>
+          <p:cNvSpPr>
+            <a:spLocks noGrp="1"/>
+          </p:cNvSpPr>
+          <p:nvPr>
+            <p:ph type="sldNum" sz="quarter" idx="5"/>
+          </p:nvPr>
+        </p:nvSpPr>
+        <p:spPr/>
+        <p:txBody>
+          <a:bodyPr/>
+          <a:lstStyle/>
+          <a:p>
+            <a:fld id="{B2D6E128-7848-41C8-9D17-DA3B35E5052C}" type="slidenum">
+              <a:rPr lang="en-US" smtClean="0"/>
+              <a:t>9</a:t>
+            </a:fld>
+            <a:endParaRPr lang="en-US" dirty="0"/>
+          </a:p>
+        </p:txBody>
+      </p:sp>
+    </p:spTree>
+    <p:extLst>
+      <p:ext uri="{BB962C8B-B14F-4D97-AF65-F5344CB8AC3E}">
+        <p14:creationId xmlns:p14="http://schemas.microsoft.com/office/powerpoint/2010/main" val="1131308216"/>
       </p:ext>
     </p:extLst>
   </p:cSld>
@@ -8083,6 +8508,3044 @@
     <p:extLst>
       <p:ext uri="{BB962C8B-B14F-4D97-AF65-F5344CB8AC3E}">
         <p14:creationId xmlns:p14="http://schemas.microsoft.com/office/powerpoint/2010/main" val="2582821873"/>
+      </p:ext>
+    </p:extLst>
+  </p:cSld>
+  <p:clrMapOvr>
+    <a:masterClrMapping/>
+  </p:clrMapOvr>
+</p:sld>
+</file>
+
+<file path=ppt/slides/slide5.xml><?xml version="1.0" encoding="utf-8"?>
+<p:sld xmlns:a="http://schemas.openxmlformats.org/drawingml/2006/main" xmlns:r="http://schemas.openxmlformats.org/officeDocument/2006/relationships" xmlns:p="http://schemas.openxmlformats.org/presentationml/2006/main">
+  <p:cSld>
+    <p:spTree>
+      <p:nvGrpSpPr>
+        <p:cNvPr id="1" name=""/>
+        <p:cNvGrpSpPr/>
+        <p:nvPr/>
+      </p:nvGrpSpPr>
+      <p:grpSpPr>
+        <a:xfrm>
+          <a:off x="0" y="0"/>
+          <a:ext cx="0" cy="0"/>
+          <a:chOff x="0" y="0"/>
+          <a:chExt cx="0" cy="0"/>
+        </a:xfrm>
+      </p:grpSpPr>
+      <p:pic>
+        <p:nvPicPr>
+          <p:cNvPr id="18" name="Picture Placeholder 17" descr="Learn to Draw Background">
+            <a:extLst>
+              <a:ext uri="{FF2B5EF4-FFF2-40B4-BE49-F238E27FC236}">
+                <a16:creationId xmlns:a16="http://schemas.microsoft.com/office/drawing/2014/main" id="{7FD9C5C0-919A-48C6-B5A4-49A012EB3DC2}"/>
+              </a:ext>
+            </a:extLst>
+          </p:cNvPr>
+          <p:cNvPicPr>
+            <a:picLocks noGrp="1" noChangeAspect="1"/>
+          </p:cNvPicPr>
+          <p:nvPr>
+            <p:ph type="pic" sz="quarter" idx="15"/>
+          </p:nvPr>
+        </p:nvPicPr>
+        <p:blipFill>
+          <a:blip r:embed="rId3">
+            <a:extLst>
+              <a:ext uri="{28A0092B-C50C-407E-A947-70E740481C1C}">
+                <a14:useLocalDpi xmlns:a14="http://schemas.microsoft.com/office/drawing/2010/main" val="0"/>
+              </a:ext>
+            </a:extLst>
+          </a:blip>
+          <a:srcRect/>
+          <a:stretch>
+            <a:fillRect/>
+          </a:stretch>
+        </p:blipFill>
+        <p:spPr>
+          <a:xfrm>
+            <a:off x="0" y="-32004"/>
+            <a:ext cx="12192000" cy="6912864"/>
+          </a:xfrm>
+        </p:spPr>
+      </p:pic>
+      <p:sp>
+        <p:nvSpPr>
+          <p:cNvPr id="21" name="Title 20">
+            <a:extLst>
+              <a:ext uri="{FF2B5EF4-FFF2-40B4-BE49-F238E27FC236}">
+                <a16:creationId xmlns:a16="http://schemas.microsoft.com/office/drawing/2014/main" id="{D4374B7E-EEDF-4C84-BE7C-BB50183825A0}"/>
+              </a:ext>
+            </a:extLst>
+          </p:cNvPr>
+          <p:cNvSpPr>
+            <a:spLocks noGrp="1"/>
+          </p:cNvSpPr>
+          <p:nvPr>
+            <p:ph type="title"/>
+          </p:nvPr>
+        </p:nvSpPr>
+        <p:spPr>
+          <a:xfrm>
+            <a:off x="2346356" y="128571"/>
+            <a:ext cx="7120094" cy="819150"/>
+          </a:xfrm>
+          <a:gradFill flip="none" rotWithShape="1">
+            <a:gsLst>
+              <a:gs pos="0">
+                <a:schemeClr val="accent1">
+                  <a:lumMod val="67000"/>
+                </a:schemeClr>
+              </a:gs>
+              <a:gs pos="48000">
+                <a:schemeClr val="accent1">
+                  <a:lumMod val="97000"/>
+                  <a:lumOff val="3000"/>
+                </a:schemeClr>
+              </a:gs>
+              <a:gs pos="100000">
+                <a:schemeClr val="accent1">
+                  <a:lumMod val="60000"/>
+                  <a:lumOff val="40000"/>
+                </a:schemeClr>
+              </a:gs>
+            </a:gsLst>
+            <a:lin ang="16200000" scaled="1"/>
+            <a:tileRect/>
+          </a:gradFill>
+          <a:ln>
+            <a:noFill/>
+          </a:ln>
+        </p:spPr>
+        <p:style>
+          <a:lnRef idx="0">
+            <a:scrgbClr r="0" g="0" b="0"/>
+          </a:lnRef>
+          <a:fillRef idx="0">
+            <a:scrgbClr r="0" g="0" b="0"/>
+          </a:fillRef>
+          <a:effectRef idx="0">
+            <a:scrgbClr r="0" g="0" b="0"/>
+          </a:effectRef>
+          <a:fontRef idx="minor">
+            <a:schemeClr val="lt1"/>
+          </a:fontRef>
+        </p:style>
+        <p:txBody>
+          <a:bodyPr anchor="ctr"/>
+          <a:lstStyle/>
+          <a:p>
+            <a:pPr algn="ctr"/>
+            <a:r>
+              <a:rPr lang="en-US" sz="6600" dirty="0">
+                <a:solidFill>
+                  <a:schemeClr val="bg1">
+                    <a:lumMod val="95000"/>
+                  </a:schemeClr>
+                </a:solidFill>
+              </a:rPr>
+              <a:t>PlantUML in Action</a:t>
+            </a:r>
+          </a:p>
+        </p:txBody>
+      </p:sp>
+      <p:sp>
+        <p:nvSpPr>
+          <p:cNvPr id="2" name="TextBox 1">
+            <a:extLst>
+              <a:ext uri="{FF2B5EF4-FFF2-40B4-BE49-F238E27FC236}">
+                <a16:creationId xmlns:a16="http://schemas.microsoft.com/office/drawing/2014/main" id="{BCB381F4-71C4-3080-500A-ADD1D9693A22}"/>
+              </a:ext>
+            </a:extLst>
+          </p:cNvPr>
+          <p:cNvSpPr txBox="1"/>
+          <p:nvPr/>
+        </p:nvSpPr>
+        <p:spPr>
+          <a:xfrm>
+            <a:off x="63778" y="544376"/>
+            <a:ext cx="1742785" cy="1323439"/>
+          </a:xfrm>
+          <a:prstGeom prst="rect">
+            <a:avLst/>
+          </a:prstGeom>
+          <a:noFill/>
+        </p:spPr>
+        <p:txBody>
+          <a:bodyPr wrap="none" rtlCol="0">
+            <a:spAutoFit/>
+          </a:bodyPr>
+          <a:lstStyle/>
+          <a:p>
+            <a:pPr algn="ctr"/>
+            <a:r>
+              <a:rPr lang="en-US" sz="8000" b="1" dirty="0">
+                <a:solidFill>
+                  <a:schemeClr val="tx1">
+                    <a:lumMod val="65000"/>
+                    <a:lumOff val="35000"/>
+                  </a:schemeClr>
+                </a:solidFill>
+                <a:effectLst>
+                  <a:outerShdw blurRad="38100" dist="38100" dir="2700000" algn="tl">
+                    <a:srgbClr val="000000">
+                      <a:alpha val="43137"/>
+                    </a:srgbClr>
+                  </a:outerShdw>
+                </a:effectLst>
+                <a:ea typeface="+mj-ea"/>
+                <a:cs typeface="+mj-cs"/>
+              </a:rPr>
+              <a:t>004</a:t>
+            </a:r>
+          </a:p>
+        </p:txBody>
+      </p:sp>
+      <p:pic>
+        <p:nvPicPr>
+          <p:cNvPr id="4" name="Picture 3">
+            <a:extLst>
+              <a:ext uri="{FF2B5EF4-FFF2-40B4-BE49-F238E27FC236}">
+                <a16:creationId xmlns:a16="http://schemas.microsoft.com/office/drawing/2014/main" id="{4336F9C1-947E-5FCC-732F-E31EB756B976}"/>
+              </a:ext>
+            </a:extLst>
+          </p:cNvPr>
+          <p:cNvPicPr>
+            <a:picLocks noChangeAspect="1"/>
+          </p:cNvPicPr>
+          <p:nvPr/>
+        </p:nvPicPr>
+        <p:blipFill>
+          <a:blip r:embed="rId4"/>
+          <a:stretch>
+            <a:fillRect/>
+          </a:stretch>
+        </p:blipFill>
+        <p:spPr>
+          <a:xfrm>
+            <a:off x="140722" y="2321084"/>
+            <a:ext cx="2156873" cy="1800225"/>
+          </a:xfrm>
+          <a:prstGeom prst="rect">
+            <a:avLst/>
+          </a:prstGeom>
+          <a:ln>
+            <a:noFill/>
+          </a:ln>
+          <a:effectLst>
+            <a:softEdge rad="112500"/>
+          </a:effectLst>
+        </p:spPr>
+      </p:pic>
+      <p:grpSp>
+        <p:nvGrpSpPr>
+          <p:cNvPr id="6" name="Group 5">
+            <a:extLst>
+              <a:ext uri="{FF2B5EF4-FFF2-40B4-BE49-F238E27FC236}">
+                <a16:creationId xmlns:a16="http://schemas.microsoft.com/office/drawing/2014/main" id="{9D2C3B74-3F5D-CAAA-2D9B-BC4A520A9943}"/>
+              </a:ext>
+            </a:extLst>
+          </p:cNvPr>
+          <p:cNvGrpSpPr/>
+          <p:nvPr/>
+        </p:nvGrpSpPr>
+        <p:grpSpPr>
+          <a:xfrm>
+            <a:off x="140722" y="6221921"/>
+            <a:ext cx="2807208" cy="588020"/>
+            <a:chOff x="9034272" y="6189470"/>
+            <a:chExt cx="2807208" cy="588020"/>
+          </a:xfrm>
+        </p:grpSpPr>
+        <p:sp>
+          <p:nvSpPr>
+            <p:cNvPr id="7" name="Rectangle: Rounded Corners 6">
+              <a:extLst>
+                <a:ext uri="{FF2B5EF4-FFF2-40B4-BE49-F238E27FC236}">
+                  <a16:creationId xmlns:a16="http://schemas.microsoft.com/office/drawing/2014/main" id="{0010B690-7856-5EB1-2BF9-0C41CA3642A5}"/>
+                </a:ext>
+              </a:extLst>
+            </p:cNvPr>
+            <p:cNvSpPr/>
+            <p:nvPr/>
+          </p:nvSpPr>
+          <p:spPr>
+            <a:xfrm>
+              <a:off x="9034272" y="6189470"/>
+              <a:ext cx="2807208" cy="588020"/>
+            </a:xfrm>
+            <a:prstGeom prst="roundRect">
+              <a:avLst/>
+            </a:prstGeom>
+            <a:solidFill>
+              <a:schemeClr val="accent1">
+                <a:lumMod val="20000"/>
+                <a:lumOff val="80000"/>
+              </a:schemeClr>
+            </a:solidFill>
+            <a:ln>
+              <a:noFill/>
+            </a:ln>
+          </p:spPr>
+          <p:style>
+            <a:lnRef idx="2">
+              <a:schemeClr val="accent1">
+                <a:shade val="15000"/>
+              </a:schemeClr>
+            </a:lnRef>
+            <a:fillRef idx="1">
+              <a:schemeClr val="accent1"/>
+            </a:fillRef>
+            <a:effectRef idx="0">
+              <a:schemeClr val="accent1"/>
+            </a:effectRef>
+            <a:fontRef idx="minor">
+              <a:schemeClr val="lt1"/>
+            </a:fontRef>
+          </p:style>
+          <p:txBody>
+            <a:bodyPr rtlCol="0" anchor="ctr"/>
+            <a:lstStyle/>
+            <a:p>
+              <a:pPr algn="r"/>
+              <a:r>
+                <a:rPr lang="en-US" sz="1200" dirty="0">
+                  <a:ln w="0"/>
+                  <a:solidFill>
+                    <a:schemeClr val="tx1"/>
+                  </a:solidFill>
+                  <a:effectLst>
+                    <a:outerShdw blurRad="38100" dist="19050" dir="2700000" algn="tl" rotWithShape="0">
+                      <a:schemeClr val="dk1">
+                        <a:alpha val="40000"/>
+                      </a:schemeClr>
+                    </a:outerShdw>
+                  </a:effectLst>
+                </a:rPr>
+                <a:t>Yasen – Enterprise Architecture</a:t>
+              </a:r>
+            </a:p>
+            <a:p>
+              <a:pPr algn="r"/>
+              <a:r>
+                <a:rPr lang="en-US" sz="1200" dirty="0">
+                  <a:ln w="0"/>
+                  <a:solidFill>
+                    <a:schemeClr val="tx1"/>
+                  </a:solidFill>
+                  <a:effectLst>
+                    <a:outerShdw blurRad="38100" dist="19050" dir="2700000" algn="tl" rotWithShape="0">
+                      <a:schemeClr val="dk1">
+                        <a:alpha val="40000"/>
+                      </a:schemeClr>
+                    </a:outerShdw>
+                  </a:effectLst>
+                </a:rPr>
+                <a:t>YouTube: @yasenzhao</a:t>
+              </a:r>
+            </a:p>
+          </p:txBody>
+        </p:sp>
+        <p:pic>
+          <p:nvPicPr>
+            <p:cNvPr id="8" name="Picture 7">
+              <a:extLst>
+                <a:ext uri="{FF2B5EF4-FFF2-40B4-BE49-F238E27FC236}">
+                  <a16:creationId xmlns:a16="http://schemas.microsoft.com/office/drawing/2014/main" id="{574298EC-4397-D1B2-D733-593141A52CEB}"/>
+                </a:ext>
+              </a:extLst>
+            </p:cNvPr>
+            <p:cNvPicPr>
+              <a:picLocks noChangeAspect="1"/>
+            </p:cNvPicPr>
+            <p:nvPr/>
+          </p:nvPicPr>
+          <p:blipFill>
+            <a:blip r:embed="rId5">
+              <a:clrChange>
+                <a:clrFrom>
+                  <a:srgbClr val="FFFFFF"/>
+                </a:clrFrom>
+                <a:clrTo>
+                  <a:srgbClr val="FFFFFF">
+                    <a:alpha val="0"/>
+                  </a:srgbClr>
+                </a:clrTo>
+              </a:clrChange>
+            </a:blip>
+            <a:stretch>
+              <a:fillRect/>
+            </a:stretch>
+          </p:blipFill>
+          <p:spPr>
+            <a:xfrm>
+              <a:off x="9187981" y="6196988"/>
+              <a:ext cx="557286" cy="572984"/>
+            </a:xfrm>
+            <a:prstGeom prst="rect">
+              <a:avLst/>
+            </a:prstGeom>
+          </p:spPr>
+        </p:pic>
+      </p:grpSp>
+      <p:sp>
+        <p:nvSpPr>
+          <p:cNvPr id="11" name="Text Placeholder 10">
+            <a:extLst>
+              <a:ext uri="{FF2B5EF4-FFF2-40B4-BE49-F238E27FC236}">
+                <a16:creationId xmlns:a16="http://schemas.microsoft.com/office/drawing/2014/main" id="{35F1FC23-8B59-9603-A7DF-2732C830F2A2}"/>
+              </a:ext>
+            </a:extLst>
+          </p:cNvPr>
+          <p:cNvSpPr>
+            <a:spLocks noGrp="1"/>
+          </p:cNvSpPr>
+          <p:nvPr>
+            <p:ph type="body" sz="quarter" idx="14"/>
+          </p:nvPr>
+        </p:nvSpPr>
+        <p:spPr>
+          <a:xfrm>
+            <a:off x="3220162" y="6400799"/>
+            <a:ext cx="6246288" cy="401623"/>
+          </a:xfrm>
+        </p:spPr>
+        <p:txBody>
+          <a:bodyPr>
+            <a:normAutofit fontScale="92500" lnSpcReduction="10000"/>
+          </a:bodyPr>
+          <a:lstStyle/>
+          <a:p>
+            <a:pPr>
+              <a:lnSpc>
+                <a:spcPct val="120000"/>
+              </a:lnSpc>
+            </a:pPr>
+            <a:r>
+              <a:rPr lang="en-US" sz="2000" dirty="0"/>
+              <a:t>GitHub: </a:t>
+            </a:r>
+            <a:r>
+              <a:rPr lang="en-US" sz="2000" dirty="0">
+                <a:hlinkClick r:id="rId6"/>
+              </a:rPr>
+              <a:t>https://github.com/yasenstar/PlantUML_in_Action</a:t>
+            </a:r>
+            <a:endParaRPr lang="en-US" sz="2000" dirty="0"/>
+          </a:p>
+        </p:txBody>
+      </p:sp>
+      <p:sp>
+        <p:nvSpPr>
+          <p:cNvPr id="12" name="Title 20">
+            <a:extLst>
+              <a:ext uri="{FF2B5EF4-FFF2-40B4-BE49-F238E27FC236}">
+                <a16:creationId xmlns:a16="http://schemas.microsoft.com/office/drawing/2014/main" id="{0CA82506-B712-27A8-0AC7-E2C48FCA049F}"/>
+              </a:ext>
+            </a:extLst>
+          </p:cNvPr>
+          <p:cNvSpPr txBox="1">
+            <a:spLocks/>
+          </p:cNvSpPr>
+          <p:nvPr/>
+        </p:nvSpPr>
+        <p:spPr>
+          <a:xfrm>
+            <a:off x="2438317" y="1031627"/>
+            <a:ext cx="8953583" cy="2311438"/>
+          </a:xfrm>
+          <a:prstGeom prst="rect">
+            <a:avLst/>
+          </a:prstGeom>
+          <a:solidFill>
+            <a:srgbClr val="EDF3DB">
+              <a:alpha val="50196"/>
+            </a:srgbClr>
+          </a:solidFill>
+        </p:spPr>
+        <p:txBody>
+          <a:bodyPr vert="horz" lIns="91440" tIns="45720" rIns="91440" bIns="45720" rtlCol="0" anchor="ctr">
+            <a:noAutofit/>
+          </a:bodyPr>
+          <a:lstStyle>
+            <a:lvl1pPr algn="l" defTabSz="914400" rtl="0" eaLnBrk="1" latinLnBrk="0" hangingPunct="1">
+              <a:lnSpc>
+                <a:spcPct val="90000"/>
+              </a:lnSpc>
+              <a:spcBef>
+                <a:spcPct val="0"/>
+              </a:spcBef>
+              <a:buNone/>
+              <a:defRPr sz="8200" b="1" kern="1200">
+                <a:solidFill>
+                  <a:schemeClr val="tx1">
+                    <a:lumMod val="65000"/>
+                    <a:lumOff val="35000"/>
+                  </a:schemeClr>
+                </a:solidFill>
+                <a:effectLst>
+                  <a:outerShdw blurRad="38100" dist="38100" dir="2700000" algn="tl">
+                    <a:srgbClr val="000000">
+                      <a:alpha val="43137"/>
+                    </a:srgbClr>
+                  </a:outerShdw>
+                </a:effectLst>
+                <a:latin typeface="+mn-lt"/>
+                <a:ea typeface="+mj-ea"/>
+                <a:cs typeface="+mj-cs"/>
+              </a:defRPr>
+            </a:lvl1pPr>
+          </a:lstStyle>
+          <a:p>
+            <a:r>
+              <a:rPr lang="en-US" sz="5400" dirty="0"/>
+              <a:t>1. Sequence Diagram</a:t>
+            </a:r>
+          </a:p>
+          <a:p>
+            <a:r>
+              <a:rPr lang="en-US" sz="4000" dirty="0"/>
+              <a:t>1.4 Use Non-Letters in Participants</a:t>
+            </a:r>
+          </a:p>
+          <a:p>
+            <a:r>
+              <a:rPr lang="en-US" sz="4000" dirty="0"/>
+              <a:t>1.5 Message to Self</a:t>
+            </a:r>
+          </a:p>
+          <a:p>
+            <a:r>
+              <a:rPr lang="en-US" sz="4000" dirty="0"/>
+              <a:t>1.6 Text Alignment</a:t>
+            </a:r>
+            <a:endParaRPr lang="en-US" sz="5400" dirty="0"/>
+          </a:p>
+        </p:txBody>
+      </p:sp>
+      <p:pic>
+        <p:nvPicPr>
+          <p:cNvPr id="5" name="Picture 4">
+            <a:extLst>
+              <a:ext uri="{FF2B5EF4-FFF2-40B4-BE49-F238E27FC236}">
+                <a16:creationId xmlns:a16="http://schemas.microsoft.com/office/drawing/2014/main" id="{72AB21C9-B764-2AEE-8E86-0B1E2112C165}"/>
+              </a:ext>
+            </a:extLst>
+          </p:cNvPr>
+          <p:cNvPicPr>
+            <a:picLocks noChangeAspect="1"/>
+          </p:cNvPicPr>
+          <p:nvPr/>
+        </p:nvPicPr>
+        <p:blipFill>
+          <a:blip r:embed="rId7"/>
+          <a:stretch>
+            <a:fillRect/>
+          </a:stretch>
+        </p:blipFill>
+        <p:spPr>
+          <a:xfrm>
+            <a:off x="3105696" y="3488791"/>
+            <a:ext cx="4457700" cy="2587404"/>
+          </a:xfrm>
+          <a:prstGeom prst="rect">
+            <a:avLst/>
+          </a:prstGeom>
+          <a:ln>
+            <a:noFill/>
+          </a:ln>
+          <a:effectLst>
+            <a:outerShdw blurRad="292100" dist="139700" dir="2700000" algn="tl" rotWithShape="0">
+              <a:srgbClr val="333333">
+                <a:alpha val="65000"/>
+              </a:srgbClr>
+            </a:outerShdw>
+          </a:effectLst>
+        </p:spPr>
+      </p:pic>
+      <p:pic>
+        <p:nvPicPr>
+          <p:cNvPr id="10" name="Picture 9">
+            <a:extLst>
+              <a:ext uri="{FF2B5EF4-FFF2-40B4-BE49-F238E27FC236}">
+                <a16:creationId xmlns:a16="http://schemas.microsoft.com/office/drawing/2014/main" id="{765EA177-E177-00F2-1CF9-9BE3713B5FC5}"/>
+              </a:ext>
+            </a:extLst>
+          </p:cNvPr>
+          <p:cNvPicPr>
+            <a:picLocks noChangeAspect="1"/>
+          </p:cNvPicPr>
+          <p:nvPr/>
+        </p:nvPicPr>
+        <p:blipFill>
+          <a:blip r:embed="rId8"/>
+          <a:stretch>
+            <a:fillRect/>
+          </a:stretch>
+        </p:blipFill>
+        <p:spPr>
+          <a:xfrm>
+            <a:off x="7970179" y="3787775"/>
+            <a:ext cx="1762125" cy="1666875"/>
+          </a:xfrm>
+          <a:prstGeom prst="rect">
+            <a:avLst/>
+          </a:prstGeom>
+          <a:ln>
+            <a:noFill/>
+          </a:ln>
+          <a:effectLst>
+            <a:outerShdw blurRad="292100" dist="139700" dir="2700000" algn="tl" rotWithShape="0">
+              <a:srgbClr val="333333">
+                <a:alpha val="65000"/>
+              </a:srgbClr>
+            </a:outerShdw>
+          </a:effectLst>
+        </p:spPr>
+      </p:pic>
+      <p:pic>
+        <p:nvPicPr>
+          <p:cNvPr id="16" name="Picture 15">
+            <a:extLst>
+              <a:ext uri="{FF2B5EF4-FFF2-40B4-BE49-F238E27FC236}">
+                <a16:creationId xmlns:a16="http://schemas.microsoft.com/office/drawing/2014/main" id="{62FC0F3A-275A-95F0-AFC6-07679A5EA616}"/>
+              </a:ext>
+            </a:extLst>
+          </p:cNvPr>
+          <p:cNvPicPr>
+            <a:picLocks noChangeAspect="1"/>
+          </p:cNvPicPr>
+          <p:nvPr/>
+        </p:nvPicPr>
+        <p:blipFill>
+          <a:blip r:embed="rId9"/>
+          <a:stretch>
+            <a:fillRect/>
+          </a:stretch>
+        </p:blipFill>
+        <p:spPr>
+          <a:xfrm>
+            <a:off x="10001713" y="2898859"/>
+            <a:ext cx="1447800" cy="1476375"/>
+          </a:xfrm>
+          <a:prstGeom prst="rect">
+            <a:avLst/>
+          </a:prstGeom>
+          <a:ln>
+            <a:noFill/>
+          </a:ln>
+          <a:effectLst>
+            <a:outerShdw blurRad="292100" dist="139700" dir="2700000" algn="tl" rotWithShape="0">
+              <a:srgbClr val="333333">
+                <a:alpha val="65000"/>
+              </a:srgbClr>
+            </a:outerShdw>
+          </a:effectLst>
+        </p:spPr>
+      </p:pic>
+      <p:pic>
+        <p:nvPicPr>
+          <p:cNvPr id="19" name="Picture 18">
+            <a:extLst>
+              <a:ext uri="{FF2B5EF4-FFF2-40B4-BE49-F238E27FC236}">
+                <a16:creationId xmlns:a16="http://schemas.microsoft.com/office/drawing/2014/main" id="{2F3B3249-05D2-AFFF-F7F4-90685500A8F8}"/>
+              </a:ext>
+            </a:extLst>
+          </p:cNvPr>
+          <p:cNvPicPr>
+            <a:picLocks noChangeAspect="1"/>
+          </p:cNvPicPr>
+          <p:nvPr/>
+        </p:nvPicPr>
+        <p:blipFill>
+          <a:blip r:embed="rId10"/>
+          <a:stretch>
+            <a:fillRect/>
+          </a:stretch>
+        </p:blipFill>
+        <p:spPr>
+          <a:xfrm>
+            <a:off x="10385889" y="4602033"/>
+            <a:ext cx="1152525" cy="1276350"/>
+          </a:xfrm>
+          <a:prstGeom prst="rect">
+            <a:avLst/>
+          </a:prstGeom>
+          <a:ln>
+            <a:noFill/>
+          </a:ln>
+          <a:effectLst>
+            <a:outerShdw blurRad="292100" dist="139700" dir="2700000" algn="tl" rotWithShape="0">
+              <a:srgbClr val="333333">
+                <a:alpha val="65000"/>
+              </a:srgbClr>
+            </a:outerShdw>
+          </a:effectLst>
+        </p:spPr>
+      </p:pic>
+    </p:spTree>
+    <p:extLst>
+      <p:ext uri="{BB962C8B-B14F-4D97-AF65-F5344CB8AC3E}">
+        <p14:creationId xmlns:p14="http://schemas.microsoft.com/office/powerpoint/2010/main" val="3097025237"/>
+      </p:ext>
+    </p:extLst>
+  </p:cSld>
+  <p:clrMapOvr>
+    <a:masterClrMapping/>
+  </p:clrMapOvr>
+</p:sld>
+</file>
+
+<file path=ppt/slides/slide6.xml><?xml version="1.0" encoding="utf-8"?>
+<p:sld xmlns:a="http://schemas.openxmlformats.org/drawingml/2006/main" xmlns:r="http://schemas.openxmlformats.org/officeDocument/2006/relationships" xmlns:p="http://schemas.openxmlformats.org/presentationml/2006/main">
+  <p:cSld>
+    <p:spTree>
+      <p:nvGrpSpPr>
+        <p:cNvPr id="1" name=""/>
+        <p:cNvGrpSpPr/>
+        <p:nvPr/>
+      </p:nvGrpSpPr>
+      <p:grpSpPr>
+        <a:xfrm>
+          <a:off x="0" y="0"/>
+          <a:ext cx="0" cy="0"/>
+          <a:chOff x="0" y="0"/>
+          <a:chExt cx="0" cy="0"/>
+        </a:xfrm>
+      </p:grpSpPr>
+      <p:pic>
+        <p:nvPicPr>
+          <p:cNvPr id="18" name="Picture Placeholder 17" descr="Learn to Draw Background">
+            <a:extLst>
+              <a:ext uri="{FF2B5EF4-FFF2-40B4-BE49-F238E27FC236}">
+                <a16:creationId xmlns:a16="http://schemas.microsoft.com/office/drawing/2014/main" id="{7FD9C5C0-919A-48C6-B5A4-49A012EB3DC2}"/>
+              </a:ext>
+            </a:extLst>
+          </p:cNvPr>
+          <p:cNvPicPr>
+            <a:picLocks noGrp="1" noChangeAspect="1"/>
+          </p:cNvPicPr>
+          <p:nvPr>
+            <p:ph type="pic" sz="quarter" idx="15"/>
+          </p:nvPr>
+        </p:nvPicPr>
+        <p:blipFill>
+          <a:blip r:embed="rId3">
+            <a:extLst>
+              <a:ext uri="{28A0092B-C50C-407E-A947-70E740481C1C}">
+                <a14:useLocalDpi xmlns:a14="http://schemas.microsoft.com/office/drawing/2010/main" val="0"/>
+              </a:ext>
+            </a:extLst>
+          </a:blip>
+          <a:srcRect/>
+          <a:stretch>
+            <a:fillRect/>
+          </a:stretch>
+        </p:blipFill>
+        <p:spPr>
+          <a:xfrm>
+            <a:off x="0" y="-32004"/>
+            <a:ext cx="12192000" cy="6912864"/>
+          </a:xfrm>
+        </p:spPr>
+      </p:pic>
+      <p:sp>
+        <p:nvSpPr>
+          <p:cNvPr id="21" name="Title 20">
+            <a:extLst>
+              <a:ext uri="{FF2B5EF4-FFF2-40B4-BE49-F238E27FC236}">
+                <a16:creationId xmlns:a16="http://schemas.microsoft.com/office/drawing/2014/main" id="{D4374B7E-EEDF-4C84-BE7C-BB50183825A0}"/>
+              </a:ext>
+            </a:extLst>
+          </p:cNvPr>
+          <p:cNvSpPr>
+            <a:spLocks noGrp="1"/>
+          </p:cNvSpPr>
+          <p:nvPr>
+            <p:ph type="title"/>
+          </p:nvPr>
+        </p:nvSpPr>
+        <p:spPr>
+          <a:xfrm>
+            <a:off x="2346356" y="128571"/>
+            <a:ext cx="7120094" cy="819150"/>
+          </a:xfrm>
+          <a:gradFill flip="none" rotWithShape="1">
+            <a:gsLst>
+              <a:gs pos="0">
+                <a:schemeClr val="accent1">
+                  <a:lumMod val="67000"/>
+                </a:schemeClr>
+              </a:gs>
+              <a:gs pos="48000">
+                <a:schemeClr val="accent1">
+                  <a:lumMod val="97000"/>
+                  <a:lumOff val="3000"/>
+                </a:schemeClr>
+              </a:gs>
+              <a:gs pos="100000">
+                <a:schemeClr val="accent1">
+                  <a:lumMod val="60000"/>
+                  <a:lumOff val="40000"/>
+                </a:schemeClr>
+              </a:gs>
+            </a:gsLst>
+            <a:lin ang="16200000" scaled="1"/>
+            <a:tileRect/>
+          </a:gradFill>
+          <a:ln>
+            <a:noFill/>
+          </a:ln>
+        </p:spPr>
+        <p:style>
+          <a:lnRef idx="0">
+            <a:scrgbClr r="0" g="0" b="0"/>
+          </a:lnRef>
+          <a:fillRef idx="0">
+            <a:scrgbClr r="0" g="0" b="0"/>
+          </a:fillRef>
+          <a:effectRef idx="0">
+            <a:scrgbClr r="0" g="0" b="0"/>
+          </a:effectRef>
+          <a:fontRef idx="minor">
+            <a:schemeClr val="lt1"/>
+          </a:fontRef>
+        </p:style>
+        <p:txBody>
+          <a:bodyPr anchor="ctr"/>
+          <a:lstStyle/>
+          <a:p>
+            <a:pPr algn="ctr"/>
+            <a:r>
+              <a:rPr lang="en-US" sz="6600" dirty="0">
+                <a:solidFill>
+                  <a:schemeClr val="bg1">
+                    <a:lumMod val="95000"/>
+                  </a:schemeClr>
+                </a:solidFill>
+              </a:rPr>
+              <a:t>PlantUML in Action</a:t>
+            </a:r>
+          </a:p>
+        </p:txBody>
+      </p:sp>
+      <p:sp>
+        <p:nvSpPr>
+          <p:cNvPr id="2" name="TextBox 1">
+            <a:extLst>
+              <a:ext uri="{FF2B5EF4-FFF2-40B4-BE49-F238E27FC236}">
+                <a16:creationId xmlns:a16="http://schemas.microsoft.com/office/drawing/2014/main" id="{BCB381F4-71C4-3080-500A-ADD1D9693A22}"/>
+              </a:ext>
+            </a:extLst>
+          </p:cNvPr>
+          <p:cNvSpPr txBox="1"/>
+          <p:nvPr/>
+        </p:nvSpPr>
+        <p:spPr>
+          <a:xfrm>
+            <a:off x="63778" y="544376"/>
+            <a:ext cx="1742785" cy="1323439"/>
+          </a:xfrm>
+          <a:prstGeom prst="rect">
+            <a:avLst/>
+          </a:prstGeom>
+          <a:noFill/>
+        </p:spPr>
+        <p:txBody>
+          <a:bodyPr wrap="none" rtlCol="0">
+            <a:spAutoFit/>
+          </a:bodyPr>
+          <a:lstStyle/>
+          <a:p>
+            <a:pPr algn="ctr"/>
+            <a:r>
+              <a:rPr lang="en-US" sz="8000" b="1" dirty="0">
+                <a:solidFill>
+                  <a:schemeClr val="tx1">
+                    <a:lumMod val="65000"/>
+                    <a:lumOff val="35000"/>
+                  </a:schemeClr>
+                </a:solidFill>
+                <a:effectLst>
+                  <a:outerShdw blurRad="38100" dist="38100" dir="2700000" algn="tl">
+                    <a:srgbClr val="000000">
+                      <a:alpha val="43137"/>
+                    </a:srgbClr>
+                  </a:outerShdw>
+                </a:effectLst>
+                <a:ea typeface="+mj-ea"/>
+                <a:cs typeface="+mj-cs"/>
+              </a:rPr>
+              <a:t>005</a:t>
+            </a:r>
+          </a:p>
+        </p:txBody>
+      </p:sp>
+      <p:pic>
+        <p:nvPicPr>
+          <p:cNvPr id="4" name="Picture 3">
+            <a:extLst>
+              <a:ext uri="{FF2B5EF4-FFF2-40B4-BE49-F238E27FC236}">
+                <a16:creationId xmlns:a16="http://schemas.microsoft.com/office/drawing/2014/main" id="{4336F9C1-947E-5FCC-732F-E31EB756B976}"/>
+              </a:ext>
+            </a:extLst>
+          </p:cNvPr>
+          <p:cNvPicPr>
+            <a:picLocks noChangeAspect="1"/>
+          </p:cNvPicPr>
+          <p:nvPr/>
+        </p:nvPicPr>
+        <p:blipFill>
+          <a:blip r:embed="rId4"/>
+          <a:stretch>
+            <a:fillRect/>
+          </a:stretch>
+        </p:blipFill>
+        <p:spPr>
+          <a:xfrm>
+            <a:off x="140722" y="2321084"/>
+            <a:ext cx="2156873" cy="1800225"/>
+          </a:xfrm>
+          <a:prstGeom prst="rect">
+            <a:avLst/>
+          </a:prstGeom>
+          <a:ln>
+            <a:noFill/>
+          </a:ln>
+          <a:effectLst>
+            <a:softEdge rad="112500"/>
+          </a:effectLst>
+        </p:spPr>
+      </p:pic>
+      <p:grpSp>
+        <p:nvGrpSpPr>
+          <p:cNvPr id="6" name="Group 5">
+            <a:extLst>
+              <a:ext uri="{FF2B5EF4-FFF2-40B4-BE49-F238E27FC236}">
+                <a16:creationId xmlns:a16="http://schemas.microsoft.com/office/drawing/2014/main" id="{9D2C3B74-3F5D-CAAA-2D9B-BC4A520A9943}"/>
+              </a:ext>
+            </a:extLst>
+          </p:cNvPr>
+          <p:cNvGrpSpPr/>
+          <p:nvPr/>
+        </p:nvGrpSpPr>
+        <p:grpSpPr>
+          <a:xfrm>
+            <a:off x="140722" y="6221921"/>
+            <a:ext cx="2807208" cy="588020"/>
+            <a:chOff x="9034272" y="6189470"/>
+            <a:chExt cx="2807208" cy="588020"/>
+          </a:xfrm>
+        </p:grpSpPr>
+        <p:sp>
+          <p:nvSpPr>
+            <p:cNvPr id="7" name="Rectangle: Rounded Corners 6">
+              <a:extLst>
+                <a:ext uri="{FF2B5EF4-FFF2-40B4-BE49-F238E27FC236}">
+                  <a16:creationId xmlns:a16="http://schemas.microsoft.com/office/drawing/2014/main" id="{0010B690-7856-5EB1-2BF9-0C41CA3642A5}"/>
+                </a:ext>
+              </a:extLst>
+            </p:cNvPr>
+            <p:cNvSpPr/>
+            <p:nvPr/>
+          </p:nvSpPr>
+          <p:spPr>
+            <a:xfrm>
+              <a:off x="9034272" y="6189470"/>
+              <a:ext cx="2807208" cy="588020"/>
+            </a:xfrm>
+            <a:prstGeom prst="roundRect">
+              <a:avLst/>
+            </a:prstGeom>
+            <a:solidFill>
+              <a:schemeClr val="accent1">
+                <a:lumMod val="20000"/>
+                <a:lumOff val="80000"/>
+              </a:schemeClr>
+            </a:solidFill>
+            <a:ln>
+              <a:noFill/>
+            </a:ln>
+          </p:spPr>
+          <p:style>
+            <a:lnRef idx="2">
+              <a:schemeClr val="accent1">
+                <a:shade val="15000"/>
+              </a:schemeClr>
+            </a:lnRef>
+            <a:fillRef idx="1">
+              <a:schemeClr val="accent1"/>
+            </a:fillRef>
+            <a:effectRef idx="0">
+              <a:schemeClr val="accent1"/>
+            </a:effectRef>
+            <a:fontRef idx="minor">
+              <a:schemeClr val="lt1"/>
+            </a:fontRef>
+          </p:style>
+          <p:txBody>
+            <a:bodyPr rtlCol="0" anchor="ctr"/>
+            <a:lstStyle/>
+            <a:p>
+              <a:pPr algn="r"/>
+              <a:r>
+                <a:rPr lang="en-US" sz="1200" dirty="0">
+                  <a:ln w="0"/>
+                  <a:solidFill>
+                    <a:schemeClr val="tx1"/>
+                  </a:solidFill>
+                  <a:effectLst>
+                    <a:outerShdw blurRad="38100" dist="19050" dir="2700000" algn="tl" rotWithShape="0">
+                      <a:schemeClr val="dk1">
+                        <a:alpha val="40000"/>
+                      </a:schemeClr>
+                    </a:outerShdw>
+                  </a:effectLst>
+                </a:rPr>
+                <a:t>Yasen – Enterprise Architecture</a:t>
+              </a:r>
+            </a:p>
+            <a:p>
+              <a:pPr algn="r"/>
+              <a:r>
+                <a:rPr lang="en-US" sz="1200" dirty="0">
+                  <a:ln w="0"/>
+                  <a:solidFill>
+                    <a:schemeClr val="tx1"/>
+                  </a:solidFill>
+                  <a:effectLst>
+                    <a:outerShdw blurRad="38100" dist="19050" dir="2700000" algn="tl" rotWithShape="0">
+                      <a:schemeClr val="dk1">
+                        <a:alpha val="40000"/>
+                      </a:schemeClr>
+                    </a:outerShdw>
+                  </a:effectLst>
+                </a:rPr>
+                <a:t>YouTube: @yasenzhao</a:t>
+              </a:r>
+            </a:p>
+          </p:txBody>
+        </p:sp>
+        <p:pic>
+          <p:nvPicPr>
+            <p:cNvPr id="8" name="Picture 7">
+              <a:extLst>
+                <a:ext uri="{FF2B5EF4-FFF2-40B4-BE49-F238E27FC236}">
+                  <a16:creationId xmlns:a16="http://schemas.microsoft.com/office/drawing/2014/main" id="{574298EC-4397-D1B2-D733-593141A52CEB}"/>
+                </a:ext>
+              </a:extLst>
+            </p:cNvPr>
+            <p:cNvPicPr>
+              <a:picLocks noChangeAspect="1"/>
+            </p:cNvPicPr>
+            <p:nvPr/>
+          </p:nvPicPr>
+          <p:blipFill>
+            <a:blip r:embed="rId5">
+              <a:clrChange>
+                <a:clrFrom>
+                  <a:srgbClr val="FFFFFF"/>
+                </a:clrFrom>
+                <a:clrTo>
+                  <a:srgbClr val="FFFFFF">
+                    <a:alpha val="0"/>
+                  </a:srgbClr>
+                </a:clrTo>
+              </a:clrChange>
+            </a:blip>
+            <a:stretch>
+              <a:fillRect/>
+            </a:stretch>
+          </p:blipFill>
+          <p:spPr>
+            <a:xfrm>
+              <a:off x="9187981" y="6196988"/>
+              <a:ext cx="557286" cy="572984"/>
+            </a:xfrm>
+            <a:prstGeom prst="rect">
+              <a:avLst/>
+            </a:prstGeom>
+          </p:spPr>
+        </p:pic>
+      </p:grpSp>
+      <p:sp>
+        <p:nvSpPr>
+          <p:cNvPr id="11" name="Text Placeholder 10">
+            <a:extLst>
+              <a:ext uri="{FF2B5EF4-FFF2-40B4-BE49-F238E27FC236}">
+                <a16:creationId xmlns:a16="http://schemas.microsoft.com/office/drawing/2014/main" id="{35F1FC23-8B59-9603-A7DF-2732C830F2A2}"/>
+              </a:ext>
+            </a:extLst>
+          </p:cNvPr>
+          <p:cNvSpPr>
+            <a:spLocks noGrp="1"/>
+          </p:cNvSpPr>
+          <p:nvPr>
+            <p:ph type="body" sz="quarter" idx="14"/>
+          </p:nvPr>
+        </p:nvSpPr>
+        <p:spPr>
+          <a:xfrm>
+            <a:off x="3220162" y="6400799"/>
+            <a:ext cx="6246288" cy="401623"/>
+          </a:xfrm>
+        </p:spPr>
+        <p:txBody>
+          <a:bodyPr>
+            <a:normAutofit fontScale="92500" lnSpcReduction="10000"/>
+          </a:bodyPr>
+          <a:lstStyle/>
+          <a:p>
+            <a:pPr>
+              <a:lnSpc>
+                <a:spcPct val="120000"/>
+              </a:lnSpc>
+            </a:pPr>
+            <a:r>
+              <a:rPr lang="en-US" sz="2000" dirty="0"/>
+              <a:t>GitHub: </a:t>
+            </a:r>
+            <a:r>
+              <a:rPr lang="en-US" sz="2000" dirty="0">
+                <a:hlinkClick r:id="rId6"/>
+              </a:rPr>
+              <a:t>https://github.com/yasenstar/PlantUML_in_Action</a:t>
+            </a:r>
+            <a:endParaRPr lang="en-US" sz="2000" dirty="0"/>
+          </a:p>
+        </p:txBody>
+      </p:sp>
+      <p:sp>
+        <p:nvSpPr>
+          <p:cNvPr id="12" name="Title 20">
+            <a:extLst>
+              <a:ext uri="{FF2B5EF4-FFF2-40B4-BE49-F238E27FC236}">
+                <a16:creationId xmlns:a16="http://schemas.microsoft.com/office/drawing/2014/main" id="{0CA82506-B712-27A8-0AC7-E2C48FCA049F}"/>
+              </a:ext>
+            </a:extLst>
+          </p:cNvPr>
+          <p:cNvSpPr txBox="1">
+            <a:spLocks/>
+          </p:cNvSpPr>
+          <p:nvPr/>
+        </p:nvSpPr>
+        <p:spPr>
+          <a:xfrm>
+            <a:off x="2571750" y="1031627"/>
+            <a:ext cx="8820150" cy="1796313"/>
+          </a:xfrm>
+          <a:prstGeom prst="rect">
+            <a:avLst/>
+          </a:prstGeom>
+          <a:solidFill>
+            <a:srgbClr val="EDF3DB">
+              <a:alpha val="50196"/>
+            </a:srgbClr>
+          </a:solidFill>
+        </p:spPr>
+        <p:txBody>
+          <a:bodyPr vert="horz" lIns="91440" tIns="45720" rIns="91440" bIns="45720" rtlCol="0" anchor="ctr">
+            <a:noAutofit/>
+          </a:bodyPr>
+          <a:lstStyle>
+            <a:lvl1pPr algn="l" defTabSz="914400" rtl="0" eaLnBrk="1" latinLnBrk="0" hangingPunct="1">
+              <a:lnSpc>
+                <a:spcPct val="90000"/>
+              </a:lnSpc>
+              <a:spcBef>
+                <a:spcPct val="0"/>
+              </a:spcBef>
+              <a:buNone/>
+              <a:defRPr sz="8200" b="1" kern="1200">
+                <a:solidFill>
+                  <a:schemeClr val="tx1">
+                    <a:lumMod val="65000"/>
+                    <a:lumOff val="35000"/>
+                  </a:schemeClr>
+                </a:solidFill>
+                <a:effectLst>
+                  <a:outerShdw blurRad="38100" dist="38100" dir="2700000" algn="tl">
+                    <a:srgbClr val="000000">
+                      <a:alpha val="43137"/>
+                    </a:srgbClr>
+                  </a:outerShdw>
+                </a:effectLst>
+                <a:latin typeface="+mn-lt"/>
+                <a:ea typeface="+mj-ea"/>
+                <a:cs typeface="+mj-cs"/>
+              </a:defRPr>
+            </a:lvl1pPr>
+          </a:lstStyle>
+          <a:p>
+            <a:r>
+              <a:rPr lang="en-US" sz="5400" dirty="0"/>
+              <a:t>1. Sequence Diagram</a:t>
+            </a:r>
+          </a:p>
+          <a:p>
+            <a:r>
+              <a:rPr lang="en-US" sz="4000" dirty="0"/>
+              <a:t>1.7 Change Arrow Style</a:t>
+            </a:r>
+          </a:p>
+          <a:p>
+            <a:r>
+              <a:rPr lang="en-US" sz="4000" dirty="0"/>
+              <a:t>1.8 Change Arrow Color</a:t>
+            </a:r>
+            <a:endParaRPr lang="en-US" sz="5400" dirty="0"/>
+          </a:p>
+        </p:txBody>
+      </p:sp>
+      <p:pic>
+        <p:nvPicPr>
+          <p:cNvPr id="9" name="Picture 8">
+            <a:extLst>
+              <a:ext uri="{FF2B5EF4-FFF2-40B4-BE49-F238E27FC236}">
+                <a16:creationId xmlns:a16="http://schemas.microsoft.com/office/drawing/2014/main" id="{58FE264C-7CC8-9499-0FAC-6261F5F269B0}"/>
+              </a:ext>
+            </a:extLst>
+          </p:cNvPr>
+          <p:cNvPicPr>
+            <a:picLocks noChangeAspect="1"/>
+          </p:cNvPicPr>
+          <p:nvPr/>
+        </p:nvPicPr>
+        <p:blipFill>
+          <a:blip r:embed="rId7"/>
+          <a:stretch>
+            <a:fillRect/>
+          </a:stretch>
+        </p:blipFill>
+        <p:spPr>
+          <a:xfrm>
+            <a:off x="3220162" y="2945997"/>
+            <a:ext cx="3814763" cy="3225677"/>
+          </a:xfrm>
+          <a:prstGeom prst="rect">
+            <a:avLst/>
+          </a:prstGeom>
+          <a:ln>
+            <a:noFill/>
+          </a:ln>
+          <a:effectLst>
+            <a:outerShdw blurRad="292100" dist="139700" dir="2700000" algn="tl" rotWithShape="0">
+              <a:srgbClr val="333333">
+                <a:alpha val="65000"/>
+              </a:srgbClr>
+            </a:outerShdw>
+          </a:effectLst>
+        </p:spPr>
+      </p:pic>
+      <p:pic>
+        <p:nvPicPr>
+          <p:cNvPr id="14" name="Picture 13">
+            <a:extLst>
+              <a:ext uri="{FF2B5EF4-FFF2-40B4-BE49-F238E27FC236}">
+                <a16:creationId xmlns:a16="http://schemas.microsoft.com/office/drawing/2014/main" id="{5417DB17-B91A-C8A0-A08E-F637077D548F}"/>
+              </a:ext>
+            </a:extLst>
+          </p:cNvPr>
+          <p:cNvPicPr>
+            <a:picLocks noChangeAspect="1"/>
+          </p:cNvPicPr>
+          <p:nvPr/>
+        </p:nvPicPr>
+        <p:blipFill>
+          <a:blip r:embed="rId8"/>
+          <a:stretch>
+            <a:fillRect/>
+          </a:stretch>
+        </p:blipFill>
+        <p:spPr>
+          <a:xfrm>
+            <a:off x="7638814" y="3042997"/>
+            <a:ext cx="1332100" cy="3031676"/>
+          </a:xfrm>
+          <a:prstGeom prst="rect">
+            <a:avLst/>
+          </a:prstGeom>
+          <a:ln>
+            <a:noFill/>
+          </a:ln>
+          <a:effectLst>
+            <a:outerShdw blurRad="292100" dist="139700" dir="2700000" algn="tl" rotWithShape="0">
+              <a:srgbClr val="333333">
+                <a:alpha val="65000"/>
+              </a:srgbClr>
+            </a:outerShdw>
+          </a:effectLst>
+        </p:spPr>
+      </p:pic>
+      <p:pic>
+        <p:nvPicPr>
+          <p:cNvPr id="17" name="Picture 16">
+            <a:extLst>
+              <a:ext uri="{FF2B5EF4-FFF2-40B4-BE49-F238E27FC236}">
+                <a16:creationId xmlns:a16="http://schemas.microsoft.com/office/drawing/2014/main" id="{9DEFAABA-C064-33CF-2B21-6420B2877D91}"/>
+              </a:ext>
+            </a:extLst>
+          </p:cNvPr>
+          <p:cNvPicPr>
+            <a:picLocks noChangeAspect="1"/>
+          </p:cNvPicPr>
+          <p:nvPr/>
+        </p:nvPicPr>
+        <p:blipFill>
+          <a:blip r:embed="rId9"/>
+          <a:stretch>
+            <a:fillRect/>
+          </a:stretch>
+        </p:blipFill>
+        <p:spPr>
+          <a:xfrm>
+            <a:off x="9574803" y="3525309"/>
+            <a:ext cx="1332100" cy="2067052"/>
+          </a:xfrm>
+          <a:prstGeom prst="rect">
+            <a:avLst/>
+          </a:prstGeom>
+          <a:ln>
+            <a:noFill/>
+          </a:ln>
+          <a:effectLst>
+            <a:outerShdw blurRad="292100" dist="139700" dir="2700000" algn="tl" rotWithShape="0">
+              <a:srgbClr val="333333">
+                <a:alpha val="65000"/>
+              </a:srgbClr>
+            </a:outerShdw>
+          </a:effectLst>
+        </p:spPr>
+      </p:pic>
+    </p:spTree>
+    <p:extLst>
+      <p:ext uri="{BB962C8B-B14F-4D97-AF65-F5344CB8AC3E}">
+        <p14:creationId xmlns:p14="http://schemas.microsoft.com/office/powerpoint/2010/main" val="1109865666"/>
+      </p:ext>
+    </p:extLst>
+  </p:cSld>
+  <p:clrMapOvr>
+    <a:masterClrMapping/>
+  </p:clrMapOvr>
+</p:sld>
+</file>
+
+<file path=ppt/slides/slide7.xml><?xml version="1.0" encoding="utf-8"?>
+<p:sld xmlns:a="http://schemas.openxmlformats.org/drawingml/2006/main" xmlns:r="http://schemas.openxmlformats.org/officeDocument/2006/relationships" xmlns:p="http://schemas.openxmlformats.org/presentationml/2006/main">
+  <p:cSld>
+    <p:spTree>
+      <p:nvGrpSpPr>
+        <p:cNvPr id="1" name=""/>
+        <p:cNvGrpSpPr/>
+        <p:nvPr/>
+      </p:nvGrpSpPr>
+      <p:grpSpPr>
+        <a:xfrm>
+          <a:off x="0" y="0"/>
+          <a:ext cx="0" cy="0"/>
+          <a:chOff x="0" y="0"/>
+          <a:chExt cx="0" cy="0"/>
+        </a:xfrm>
+      </p:grpSpPr>
+      <p:pic>
+        <p:nvPicPr>
+          <p:cNvPr id="18" name="Picture Placeholder 17" descr="Learn to Draw Background">
+            <a:extLst>
+              <a:ext uri="{FF2B5EF4-FFF2-40B4-BE49-F238E27FC236}">
+                <a16:creationId xmlns:a16="http://schemas.microsoft.com/office/drawing/2014/main" id="{7FD9C5C0-919A-48C6-B5A4-49A012EB3DC2}"/>
+              </a:ext>
+            </a:extLst>
+          </p:cNvPr>
+          <p:cNvPicPr>
+            <a:picLocks noGrp="1" noChangeAspect="1"/>
+          </p:cNvPicPr>
+          <p:nvPr>
+            <p:ph type="pic" sz="quarter" idx="15"/>
+          </p:nvPr>
+        </p:nvPicPr>
+        <p:blipFill>
+          <a:blip r:embed="rId3">
+            <a:extLst>
+              <a:ext uri="{28A0092B-C50C-407E-A947-70E740481C1C}">
+                <a14:useLocalDpi xmlns:a14="http://schemas.microsoft.com/office/drawing/2010/main" val="0"/>
+              </a:ext>
+            </a:extLst>
+          </a:blip>
+          <a:srcRect/>
+          <a:stretch>
+            <a:fillRect/>
+          </a:stretch>
+        </p:blipFill>
+        <p:spPr>
+          <a:xfrm>
+            <a:off x="0" y="-32004"/>
+            <a:ext cx="12192000" cy="6912864"/>
+          </a:xfrm>
+        </p:spPr>
+      </p:pic>
+      <p:sp>
+        <p:nvSpPr>
+          <p:cNvPr id="21" name="Title 20">
+            <a:extLst>
+              <a:ext uri="{FF2B5EF4-FFF2-40B4-BE49-F238E27FC236}">
+                <a16:creationId xmlns:a16="http://schemas.microsoft.com/office/drawing/2014/main" id="{D4374B7E-EEDF-4C84-BE7C-BB50183825A0}"/>
+              </a:ext>
+            </a:extLst>
+          </p:cNvPr>
+          <p:cNvSpPr>
+            <a:spLocks noGrp="1"/>
+          </p:cNvSpPr>
+          <p:nvPr>
+            <p:ph type="title"/>
+          </p:nvPr>
+        </p:nvSpPr>
+        <p:spPr>
+          <a:xfrm>
+            <a:off x="2346356" y="128571"/>
+            <a:ext cx="7120094" cy="819150"/>
+          </a:xfrm>
+          <a:gradFill flip="none" rotWithShape="1">
+            <a:gsLst>
+              <a:gs pos="0">
+                <a:schemeClr val="accent1">
+                  <a:lumMod val="67000"/>
+                </a:schemeClr>
+              </a:gs>
+              <a:gs pos="48000">
+                <a:schemeClr val="accent1">
+                  <a:lumMod val="97000"/>
+                  <a:lumOff val="3000"/>
+                </a:schemeClr>
+              </a:gs>
+              <a:gs pos="100000">
+                <a:schemeClr val="accent1">
+                  <a:lumMod val="60000"/>
+                  <a:lumOff val="40000"/>
+                </a:schemeClr>
+              </a:gs>
+            </a:gsLst>
+            <a:lin ang="16200000" scaled="1"/>
+            <a:tileRect/>
+          </a:gradFill>
+          <a:ln>
+            <a:noFill/>
+          </a:ln>
+        </p:spPr>
+        <p:style>
+          <a:lnRef idx="0">
+            <a:scrgbClr r="0" g="0" b="0"/>
+          </a:lnRef>
+          <a:fillRef idx="0">
+            <a:scrgbClr r="0" g="0" b="0"/>
+          </a:fillRef>
+          <a:effectRef idx="0">
+            <a:scrgbClr r="0" g="0" b="0"/>
+          </a:effectRef>
+          <a:fontRef idx="minor">
+            <a:schemeClr val="lt1"/>
+          </a:fontRef>
+        </p:style>
+        <p:txBody>
+          <a:bodyPr anchor="ctr"/>
+          <a:lstStyle/>
+          <a:p>
+            <a:pPr algn="ctr"/>
+            <a:r>
+              <a:rPr lang="en-US" sz="6600" dirty="0">
+                <a:solidFill>
+                  <a:schemeClr val="bg1">
+                    <a:lumMod val="95000"/>
+                  </a:schemeClr>
+                </a:solidFill>
+              </a:rPr>
+              <a:t>PlantUML in Action</a:t>
+            </a:r>
+          </a:p>
+        </p:txBody>
+      </p:sp>
+      <p:sp>
+        <p:nvSpPr>
+          <p:cNvPr id="2" name="TextBox 1">
+            <a:extLst>
+              <a:ext uri="{FF2B5EF4-FFF2-40B4-BE49-F238E27FC236}">
+                <a16:creationId xmlns:a16="http://schemas.microsoft.com/office/drawing/2014/main" id="{BCB381F4-71C4-3080-500A-ADD1D9693A22}"/>
+              </a:ext>
+            </a:extLst>
+          </p:cNvPr>
+          <p:cNvSpPr txBox="1"/>
+          <p:nvPr/>
+        </p:nvSpPr>
+        <p:spPr>
+          <a:xfrm>
+            <a:off x="63778" y="544376"/>
+            <a:ext cx="1742785" cy="1323439"/>
+          </a:xfrm>
+          <a:prstGeom prst="rect">
+            <a:avLst/>
+          </a:prstGeom>
+          <a:noFill/>
+        </p:spPr>
+        <p:txBody>
+          <a:bodyPr wrap="none" rtlCol="0">
+            <a:spAutoFit/>
+          </a:bodyPr>
+          <a:lstStyle/>
+          <a:p>
+            <a:pPr algn="ctr"/>
+            <a:r>
+              <a:rPr lang="en-US" sz="8000" b="1" dirty="0">
+                <a:solidFill>
+                  <a:schemeClr val="tx1">
+                    <a:lumMod val="65000"/>
+                    <a:lumOff val="35000"/>
+                  </a:schemeClr>
+                </a:solidFill>
+                <a:effectLst>
+                  <a:outerShdw blurRad="38100" dist="38100" dir="2700000" algn="tl">
+                    <a:srgbClr val="000000">
+                      <a:alpha val="43137"/>
+                    </a:srgbClr>
+                  </a:outerShdw>
+                </a:effectLst>
+                <a:ea typeface="+mj-ea"/>
+                <a:cs typeface="+mj-cs"/>
+              </a:rPr>
+              <a:t>006</a:t>
+            </a:r>
+          </a:p>
+        </p:txBody>
+      </p:sp>
+      <p:pic>
+        <p:nvPicPr>
+          <p:cNvPr id="4" name="Picture 3">
+            <a:extLst>
+              <a:ext uri="{FF2B5EF4-FFF2-40B4-BE49-F238E27FC236}">
+                <a16:creationId xmlns:a16="http://schemas.microsoft.com/office/drawing/2014/main" id="{4336F9C1-947E-5FCC-732F-E31EB756B976}"/>
+              </a:ext>
+            </a:extLst>
+          </p:cNvPr>
+          <p:cNvPicPr>
+            <a:picLocks noChangeAspect="1"/>
+          </p:cNvPicPr>
+          <p:nvPr/>
+        </p:nvPicPr>
+        <p:blipFill>
+          <a:blip r:embed="rId4"/>
+          <a:stretch>
+            <a:fillRect/>
+          </a:stretch>
+        </p:blipFill>
+        <p:spPr>
+          <a:xfrm>
+            <a:off x="140722" y="2321084"/>
+            <a:ext cx="2156873" cy="1800225"/>
+          </a:xfrm>
+          <a:prstGeom prst="rect">
+            <a:avLst/>
+          </a:prstGeom>
+          <a:ln>
+            <a:noFill/>
+          </a:ln>
+          <a:effectLst>
+            <a:softEdge rad="112500"/>
+          </a:effectLst>
+        </p:spPr>
+      </p:pic>
+      <p:grpSp>
+        <p:nvGrpSpPr>
+          <p:cNvPr id="6" name="Group 5">
+            <a:extLst>
+              <a:ext uri="{FF2B5EF4-FFF2-40B4-BE49-F238E27FC236}">
+                <a16:creationId xmlns:a16="http://schemas.microsoft.com/office/drawing/2014/main" id="{9D2C3B74-3F5D-CAAA-2D9B-BC4A520A9943}"/>
+              </a:ext>
+            </a:extLst>
+          </p:cNvPr>
+          <p:cNvGrpSpPr/>
+          <p:nvPr/>
+        </p:nvGrpSpPr>
+        <p:grpSpPr>
+          <a:xfrm>
+            <a:off x="140722" y="6221921"/>
+            <a:ext cx="2807208" cy="588020"/>
+            <a:chOff x="9034272" y="6189470"/>
+            <a:chExt cx="2807208" cy="588020"/>
+          </a:xfrm>
+        </p:grpSpPr>
+        <p:sp>
+          <p:nvSpPr>
+            <p:cNvPr id="7" name="Rectangle: Rounded Corners 6">
+              <a:extLst>
+                <a:ext uri="{FF2B5EF4-FFF2-40B4-BE49-F238E27FC236}">
+                  <a16:creationId xmlns:a16="http://schemas.microsoft.com/office/drawing/2014/main" id="{0010B690-7856-5EB1-2BF9-0C41CA3642A5}"/>
+                </a:ext>
+              </a:extLst>
+            </p:cNvPr>
+            <p:cNvSpPr/>
+            <p:nvPr/>
+          </p:nvSpPr>
+          <p:spPr>
+            <a:xfrm>
+              <a:off x="9034272" y="6189470"/>
+              <a:ext cx="2807208" cy="588020"/>
+            </a:xfrm>
+            <a:prstGeom prst="roundRect">
+              <a:avLst/>
+            </a:prstGeom>
+            <a:solidFill>
+              <a:schemeClr val="accent1">
+                <a:lumMod val="20000"/>
+                <a:lumOff val="80000"/>
+              </a:schemeClr>
+            </a:solidFill>
+            <a:ln>
+              <a:noFill/>
+            </a:ln>
+          </p:spPr>
+          <p:style>
+            <a:lnRef idx="2">
+              <a:schemeClr val="accent1">
+                <a:shade val="15000"/>
+              </a:schemeClr>
+            </a:lnRef>
+            <a:fillRef idx="1">
+              <a:schemeClr val="accent1"/>
+            </a:fillRef>
+            <a:effectRef idx="0">
+              <a:schemeClr val="accent1"/>
+            </a:effectRef>
+            <a:fontRef idx="minor">
+              <a:schemeClr val="lt1"/>
+            </a:fontRef>
+          </p:style>
+          <p:txBody>
+            <a:bodyPr rtlCol="0" anchor="ctr"/>
+            <a:lstStyle/>
+            <a:p>
+              <a:pPr algn="r"/>
+              <a:r>
+                <a:rPr lang="en-US" sz="1200" dirty="0">
+                  <a:ln w="0"/>
+                  <a:solidFill>
+                    <a:schemeClr val="tx1"/>
+                  </a:solidFill>
+                  <a:effectLst>
+                    <a:outerShdw blurRad="38100" dist="19050" dir="2700000" algn="tl" rotWithShape="0">
+                      <a:schemeClr val="dk1">
+                        <a:alpha val="40000"/>
+                      </a:schemeClr>
+                    </a:outerShdw>
+                  </a:effectLst>
+                </a:rPr>
+                <a:t>Yasen – Enterprise Architecture</a:t>
+              </a:r>
+            </a:p>
+            <a:p>
+              <a:pPr algn="r"/>
+              <a:r>
+                <a:rPr lang="en-US" sz="1200" dirty="0">
+                  <a:ln w="0"/>
+                  <a:solidFill>
+                    <a:schemeClr val="tx1"/>
+                  </a:solidFill>
+                  <a:effectLst>
+                    <a:outerShdw blurRad="38100" dist="19050" dir="2700000" algn="tl" rotWithShape="0">
+                      <a:schemeClr val="dk1">
+                        <a:alpha val="40000"/>
+                      </a:schemeClr>
+                    </a:outerShdw>
+                  </a:effectLst>
+                </a:rPr>
+                <a:t>YouTube: @yasenzhao</a:t>
+              </a:r>
+            </a:p>
+          </p:txBody>
+        </p:sp>
+        <p:pic>
+          <p:nvPicPr>
+            <p:cNvPr id="8" name="Picture 7">
+              <a:extLst>
+                <a:ext uri="{FF2B5EF4-FFF2-40B4-BE49-F238E27FC236}">
+                  <a16:creationId xmlns:a16="http://schemas.microsoft.com/office/drawing/2014/main" id="{574298EC-4397-D1B2-D733-593141A52CEB}"/>
+                </a:ext>
+              </a:extLst>
+            </p:cNvPr>
+            <p:cNvPicPr>
+              <a:picLocks noChangeAspect="1"/>
+            </p:cNvPicPr>
+            <p:nvPr/>
+          </p:nvPicPr>
+          <p:blipFill>
+            <a:blip r:embed="rId5">
+              <a:clrChange>
+                <a:clrFrom>
+                  <a:srgbClr val="FFFFFF"/>
+                </a:clrFrom>
+                <a:clrTo>
+                  <a:srgbClr val="FFFFFF">
+                    <a:alpha val="0"/>
+                  </a:srgbClr>
+                </a:clrTo>
+              </a:clrChange>
+            </a:blip>
+            <a:stretch>
+              <a:fillRect/>
+            </a:stretch>
+          </p:blipFill>
+          <p:spPr>
+            <a:xfrm>
+              <a:off x="9187981" y="6196988"/>
+              <a:ext cx="557286" cy="572984"/>
+            </a:xfrm>
+            <a:prstGeom prst="rect">
+              <a:avLst/>
+            </a:prstGeom>
+          </p:spPr>
+        </p:pic>
+      </p:grpSp>
+      <p:sp>
+        <p:nvSpPr>
+          <p:cNvPr id="11" name="Text Placeholder 10">
+            <a:extLst>
+              <a:ext uri="{FF2B5EF4-FFF2-40B4-BE49-F238E27FC236}">
+                <a16:creationId xmlns:a16="http://schemas.microsoft.com/office/drawing/2014/main" id="{35F1FC23-8B59-9603-A7DF-2732C830F2A2}"/>
+              </a:ext>
+            </a:extLst>
+          </p:cNvPr>
+          <p:cNvSpPr>
+            <a:spLocks noGrp="1"/>
+          </p:cNvSpPr>
+          <p:nvPr>
+            <p:ph type="body" sz="quarter" idx="14"/>
+          </p:nvPr>
+        </p:nvSpPr>
+        <p:spPr>
+          <a:xfrm>
+            <a:off x="3220162" y="6400799"/>
+            <a:ext cx="6246288" cy="401623"/>
+          </a:xfrm>
+        </p:spPr>
+        <p:txBody>
+          <a:bodyPr>
+            <a:normAutofit fontScale="92500" lnSpcReduction="10000"/>
+          </a:bodyPr>
+          <a:lstStyle/>
+          <a:p>
+            <a:pPr>
+              <a:lnSpc>
+                <a:spcPct val="120000"/>
+              </a:lnSpc>
+            </a:pPr>
+            <a:r>
+              <a:rPr lang="en-US" sz="2000" dirty="0"/>
+              <a:t>GitHub: </a:t>
+            </a:r>
+            <a:r>
+              <a:rPr lang="en-US" sz="2000" dirty="0">
+                <a:hlinkClick r:id="rId6"/>
+              </a:rPr>
+              <a:t>https://github.com/yasenstar/PlantUML_in_Action</a:t>
+            </a:r>
+            <a:endParaRPr lang="en-US" sz="2000" dirty="0"/>
+          </a:p>
+        </p:txBody>
+      </p:sp>
+      <p:sp>
+        <p:nvSpPr>
+          <p:cNvPr id="12" name="Title 20">
+            <a:extLst>
+              <a:ext uri="{FF2B5EF4-FFF2-40B4-BE49-F238E27FC236}">
+                <a16:creationId xmlns:a16="http://schemas.microsoft.com/office/drawing/2014/main" id="{0CA82506-B712-27A8-0AC7-E2C48FCA049F}"/>
+              </a:ext>
+            </a:extLst>
+          </p:cNvPr>
+          <p:cNvSpPr txBox="1">
+            <a:spLocks/>
+          </p:cNvSpPr>
+          <p:nvPr/>
+        </p:nvSpPr>
+        <p:spPr>
+          <a:xfrm>
+            <a:off x="2571750" y="1031627"/>
+            <a:ext cx="8820150" cy="1289457"/>
+          </a:xfrm>
+          <a:prstGeom prst="rect">
+            <a:avLst/>
+          </a:prstGeom>
+          <a:solidFill>
+            <a:srgbClr val="EDF3DB">
+              <a:alpha val="50196"/>
+            </a:srgbClr>
+          </a:solidFill>
+        </p:spPr>
+        <p:txBody>
+          <a:bodyPr vert="horz" lIns="91440" tIns="45720" rIns="91440" bIns="45720" rtlCol="0" anchor="ctr">
+            <a:noAutofit/>
+          </a:bodyPr>
+          <a:lstStyle>
+            <a:lvl1pPr algn="l" defTabSz="914400" rtl="0" eaLnBrk="1" latinLnBrk="0" hangingPunct="1">
+              <a:lnSpc>
+                <a:spcPct val="90000"/>
+              </a:lnSpc>
+              <a:spcBef>
+                <a:spcPct val="0"/>
+              </a:spcBef>
+              <a:buNone/>
+              <a:defRPr sz="8200" b="1" kern="1200">
+                <a:solidFill>
+                  <a:schemeClr val="tx1">
+                    <a:lumMod val="65000"/>
+                    <a:lumOff val="35000"/>
+                  </a:schemeClr>
+                </a:solidFill>
+                <a:effectLst>
+                  <a:outerShdw blurRad="38100" dist="38100" dir="2700000" algn="tl">
+                    <a:srgbClr val="000000">
+                      <a:alpha val="43137"/>
+                    </a:srgbClr>
+                  </a:outerShdw>
+                </a:effectLst>
+                <a:latin typeface="+mn-lt"/>
+                <a:ea typeface="+mj-ea"/>
+                <a:cs typeface="+mj-cs"/>
+              </a:defRPr>
+            </a:lvl1pPr>
+          </a:lstStyle>
+          <a:p>
+            <a:r>
+              <a:rPr lang="en-US" sz="5400" dirty="0"/>
+              <a:t>1. Sequence Diagram</a:t>
+            </a:r>
+          </a:p>
+          <a:p>
+            <a:r>
+              <a:rPr lang="en-US" sz="4000" dirty="0"/>
+              <a:t>1.9 Message Sequence Numbering</a:t>
+            </a:r>
+            <a:endParaRPr lang="en-US" sz="5400" dirty="0"/>
+          </a:p>
+        </p:txBody>
+      </p:sp>
+      <p:pic>
+        <p:nvPicPr>
+          <p:cNvPr id="5" name="Picture 4">
+            <a:extLst>
+              <a:ext uri="{FF2B5EF4-FFF2-40B4-BE49-F238E27FC236}">
+                <a16:creationId xmlns:a16="http://schemas.microsoft.com/office/drawing/2014/main" id="{10B8C54B-B517-24AB-86C4-CDD547C16F60}"/>
+              </a:ext>
+            </a:extLst>
+          </p:cNvPr>
+          <p:cNvPicPr>
+            <a:picLocks noChangeAspect="1"/>
+          </p:cNvPicPr>
+          <p:nvPr/>
+        </p:nvPicPr>
+        <p:blipFill>
+          <a:blip r:embed="rId7"/>
+          <a:stretch>
+            <a:fillRect/>
+          </a:stretch>
+        </p:blipFill>
+        <p:spPr>
+          <a:xfrm>
+            <a:off x="2703622" y="2614016"/>
+            <a:ext cx="6062662" cy="3444842"/>
+          </a:xfrm>
+          <a:prstGeom prst="rect">
+            <a:avLst/>
+          </a:prstGeom>
+          <a:ln>
+            <a:noFill/>
+          </a:ln>
+          <a:effectLst>
+            <a:outerShdw blurRad="292100" dist="139700" dir="2700000" algn="tl" rotWithShape="0">
+              <a:srgbClr val="333333">
+                <a:alpha val="65000"/>
+              </a:srgbClr>
+            </a:outerShdw>
+          </a:effectLst>
+        </p:spPr>
+      </p:pic>
+      <p:pic>
+        <p:nvPicPr>
+          <p:cNvPr id="13" name="Picture 12">
+            <a:extLst>
+              <a:ext uri="{FF2B5EF4-FFF2-40B4-BE49-F238E27FC236}">
+                <a16:creationId xmlns:a16="http://schemas.microsoft.com/office/drawing/2014/main" id="{B5ADF494-327D-FCBF-6B15-15AB701EC5FD}"/>
+              </a:ext>
+            </a:extLst>
+          </p:cNvPr>
+          <p:cNvPicPr>
+            <a:picLocks noChangeAspect="1"/>
+          </p:cNvPicPr>
+          <p:nvPr/>
+        </p:nvPicPr>
+        <p:blipFill>
+          <a:blip r:embed="rId8"/>
+          <a:stretch>
+            <a:fillRect/>
+          </a:stretch>
+        </p:blipFill>
+        <p:spPr>
+          <a:xfrm>
+            <a:off x="8997660" y="2962442"/>
+            <a:ext cx="2924175" cy="2638425"/>
+          </a:xfrm>
+          <a:prstGeom prst="rect">
+            <a:avLst/>
+          </a:prstGeom>
+          <a:ln>
+            <a:noFill/>
+          </a:ln>
+          <a:effectLst>
+            <a:outerShdw blurRad="292100" dist="139700" dir="2700000" algn="tl" rotWithShape="0">
+              <a:srgbClr val="333333">
+                <a:alpha val="65000"/>
+              </a:srgbClr>
+            </a:outerShdw>
+          </a:effectLst>
+        </p:spPr>
+      </p:pic>
+    </p:spTree>
+    <p:extLst>
+      <p:ext uri="{BB962C8B-B14F-4D97-AF65-F5344CB8AC3E}">
+        <p14:creationId xmlns:p14="http://schemas.microsoft.com/office/powerpoint/2010/main" val="3389683122"/>
+      </p:ext>
+    </p:extLst>
+  </p:cSld>
+  <p:clrMapOvr>
+    <a:masterClrMapping/>
+  </p:clrMapOvr>
+</p:sld>
+</file>
+
+<file path=ppt/slides/slide8.xml><?xml version="1.0" encoding="utf-8"?>
+<p:sld xmlns:a="http://schemas.openxmlformats.org/drawingml/2006/main" xmlns:r="http://schemas.openxmlformats.org/officeDocument/2006/relationships" xmlns:p="http://schemas.openxmlformats.org/presentationml/2006/main">
+  <p:cSld>
+    <p:spTree>
+      <p:nvGrpSpPr>
+        <p:cNvPr id="1" name=""/>
+        <p:cNvGrpSpPr/>
+        <p:nvPr/>
+      </p:nvGrpSpPr>
+      <p:grpSpPr>
+        <a:xfrm>
+          <a:off x="0" y="0"/>
+          <a:ext cx="0" cy="0"/>
+          <a:chOff x="0" y="0"/>
+          <a:chExt cx="0" cy="0"/>
+        </a:xfrm>
+      </p:grpSpPr>
+      <p:pic>
+        <p:nvPicPr>
+          <p:cNvPr id="18" name="Picture Placeholder 17" descr="Learn to Draw Background">
+            <a:extLst>
+              <a:ext uri="{FF2B5EF4-FFF2-40B4-BE49-F238E27FC236}">
+                <a16:creationId xmlns:a16="http://schemas.microsoft.com/office/drawing/2014/main" id="{7FD9C5C0-919A-48C6-B5A4-49A012EB3DC2}"/>
+              </a:ext>
+            </a:extLst>
+          </p:cNvPr>
+          <p:cNvPicPr>
+            <a:picLocks noGrp="1" noChangeAspect="1"/>
+          </p:cNvPicPr>
+          <p:nvPr>
+            <p:ph type="pic" sz="quarter" idx="15"/>
+          </p:nvPr>
+        </p:nvPicPr>
+        <p:blipFill>
+          <a:blip r:embed="rId3">
+            <a:extLst>
+              <a:ext uri="{28A0092B-C50C-407E-A947-70E740481C1C}">
+                <a14:useLocalDpi xmlns:a14="http://schemas.microsoft.com/office/drawing/2010/main" val="0"/>
+              </a:ext>
+            </a:extLst>
+          </a:blip>
+          <a:srcRect/>
+          <a:stretch>
+            <a:fillRect/>
+          </a:stretch>
+        </p:blipFill>
+        <p:spPr>
+          <a:xfrm>
+            <a:off x="0" y="-32004"/>
+            <a:ext cx="12192000" cy="6912864"/>
+          </a:xfrm>
+        </p:spPr>
+      </p:pic>
+      <p:sp>
+        <p:nvSpPr>
+          <p:cNvPr id="21" name="Title 20">
+            <a:extLst>
+              <a:ext uri="{FF2B5EF4-FFF2-40B4-BE49-F238E27FC236}">
+                <a16:creationId xmlns:a16="http://schemas.microsoft.com/office/drawing/2014/main" id="{D4374B7E-EEDF-4C84-BE7C-BB50183825A0}"/>
+              </a:ext>
+            </a:extLst>
+          </p:cNvPr>
+          <p:cNvSpPr>
+            <a:spLocks noGrp="1"/>
+          </p:cNvSpPr>
+          <p:nvPr>
+            <p:ph type="title"/>
+          </p:nvPr>
+        </p:nvSpPr>
+        <p:spPr>
+          <a:xfrm>
+            <a:off x="2346356" y="128571"/>
+            <a:ext cx="7120094" cy="819150"/>
+          </a:xfrm>
+          <a:gradFill flip="none" rotWithShape="1">
+            <a:gsLst>
+              <a:gs pos="0">
+                <a:schemeClr val="accent1">
+                  <a:lumMod val="67000"/>
+                </a:schemeClr>
+              </a:gs>
+              <a:gs pos="48000">
+                <a:schemeClr val="accent1">
+                  <a:lumMod val="97000"/>
+                  <a:lumOff val="3000"/>
+                </a:schemeClr>
+              </a:gs>
+              <a:gs pos="100000">
+                <a:schemeClr val="accent1">
+                  <a:lumMod val="60000"/>
+                  <a:lumOff val="40000"/>
+                </a:schemeClr>
+              </a:gs>
+            </a:gsLst>
+            <a:lin ang="16200000" scaled="1"/>
+            <a:tileRect/>
+          </a:gradFill>
+          <a:ln>
+            <a:noFill/>
+          </a:ln>
+        </p:spPr>
+        <p:style>
+          <a:lnRef idx="0">
+            <a:scrgbClr r="0" g="0" b="0"/>
+          </a:lnRef>
+          <a:fillRef idx="0">
+            <a:scrgbClr r="0" g="0" b="0"/>
+          </a:fillRef>
+          <a:effectRef idx="0">
+            <a:scrgbClr r="0" g="0" b="0"/>
+          </a:effectRef>
+          <a:fontRef idx="minor">
+            <a:schemeClr val="lt1"/>
+          </a:fontRef>
+        </p:style>
+        <p:txBody>
+          <a:bodyPr anchor="ctr"/>
+          <a:lstStyle/>
+          <a:p>
+            <a:pPr algn="ctr"/>
+            <a:r>
+              <a:rPr lang="en-US" sz="6600" dirty="0">
+                <a:solidFill>
+                  <a:schemeClr val="bg1">
+                    <a:lumMod val="95000"/>
+                  </a:schemeClr>
+                </a:solidFill>
+              </a:rPr>
+              <a:t>PlantUML in Action</a:t>
+            </a:r>
+          </a:p>
+        </p:txBody>
+      </p:sp>
+      <p:sp>
+        <p:nvSpPr>
+          <p:cNvPr id="2" name="TextBox 1">
+            <a:extLst>
+              <a:ext uri="{FF2B5EF4-FFF2-40B4-BE49-F238E27FC236}">
+                <a16:creationId xmlns:a16="http://schemas.microsoft.com/office/drawing/2014/main" id="{BCB381F4-71C4-3080-500A-ADD1D9693A22}"/>
+              </a:ext>
+            </a:extLst>
+          </p:cNvPr>
+          <p:cNvSpPr txBox="1"/>
+          <p:nvPr/>
+        </p:nvSpPr>
+        <p:spPr>
+          <a:xfrm>
+            <a:off x="63778" y="544376"/>
+            <a:ext cx="1742785" cy="1323439"/>
+          </a:xfrm>
+          <a:prstGeom prst="rect">
+            <a:avLst/>
+          </a:prstGeom>
+          <a:noFill/>
+        </p:spPr>
+        <p:txBody>
+          <a:bodyPr wrap="none" rtlCol="0">
+            <a:spAutoFit/>
+          </a:bodyPr>
+          <a:lstStyle/>
+          <a:p>
+            <a:pPr algn="ctr"/>
+            <a:r>
+              <a:rPr lang="en-US" sz="8000" b="1" dirty="0">
+                <a:solidFill>
+                  <a:schemeClr val="tx1">
+                    <a:lumMod val="65000"/>
+                    <a:lumOff val="35000"/>
+                  </a:schemeClr>
+                </a:solidFill>
+                <a:effectLst>
+                  <a:outerShdw blurRad="38100" dist="38100" dir="2700000" algn="tl">
+                    <a:srgbClr val="000000">
+                      <a:alpha val="43137"/>
+                    </a:srgbClr>
+                  </a:outerShdw>
+                </a:effectLst>
+                <a:ea typeface="+mj-ea"/>
+                <a:cs typeface="+mj-cs"/>
+              </a:rPr>
+              <a:t>007</a:t>
+            </a:r>
+          </a:p>
+        </p:txBody>
+      </p:sp>
+      <p:pic>
+        <p:nvPicPr>
+          <p:cNvPr id="4" name="Picture 3">
+            <a:extLst>
+              <a:ext uri="{FF2B5EF4-FFF2-40B4-BE49-F238E27FC236}">
+                <a16:creationId xmlns:a16="http://schemas.microsoft.com/office/drawing/2014/main" id="{4336F9C1-947E-5FCC-732F-E31EB756B976}"/>
+              </a:ext>
+            </a:extLst>
+          </p:cNvPr>
+          <p:cNvPicPr>
+            <a:picLocks noChangeAspect="1"/>
+          </p:cNvPicPr>
+          <p:nvPr/>
+        </p:nvPicPr>
+        <p:blipFill>
+          <a:blip r:embed="rId4"/>
+          <a:stretch>
+            <a:fillRect/>
+          </a:stretch>
+        </p:blipFill>
+        <p:spPr>
+          <a:xfrm>
+            <a:off x="140722" y="2321084"/>
+            <a:ext cx="2156873" cy="1800225"/>
+          </a:xfrm>
+          <a:prstGeom prst="rect">
+            <a:avLst/>
+          </a:prstGeom>
+          <a:ln>
+            <a:noFill/>
+          </a:ln>
+          <a:effectLst>
+            <a:softEdge rad="112500"/>
+          </a:effectLst>
+        </p:spPr>
+      </p:pic>
+      <p:grpSp>
+        <p:nvGrpSpPr>
+          <p:cNvPr id="6" name="Group 5">
+            <a:extLst>
+              <a:ext uri="{FF2B5EF4-FFF2-40B4-BE49-F238E27FC236}">
+                <a16:creationId xmlns:a16="http://schemas.microsoft.com/office/drawing/2014/main" id="{9D2C3B74-3F5D-CAAA-2D9B-BC4A520A9943}"/>
+              </a:ext>
+            </a:extLst>
+          </p:cNvPr>
+          <p:cNvGrpSpPr/>
+          <p:nvPr/>
+        </p:nvGrpSpPr>
+        <p:grpSpPr>
+          <a:xfrm>
+            <a:off x="140722" y="6221921"/>
+            <a:ext cx="2807208" cy="588020"/>
+            <a:chOff x="9034272" y="6189470"/>
+            <a:chExt cx="2807208" cy="588020"/>
+          </a:xfrm>
+        </p:grpSpPr>
+        <p:sp>
+          <p:nvSpPr>
+            <p:cNvPr id="7" name="Rectangle: Rounded Corners 6">
+              <a:extLst>
+                <a:ext uri="{FF2B5EF4-FFF2-40B4-BE49-F238E27FC236}">
+                  <a16:creationId xmlns:a16="http://schemas.microsoft.com/office/drawing/2014/main" id="{0010B690-7856-5EB1-2BF9-0C41CA3642A5}"/>
+                </a:ext>
+              </a:extLst>
+            </p:cNvPr>
+            <p:cNvSpPr/>
+            <p:nvPr/>
+          </p:nvSpPr>
+          <p:spPr>
+            <a:xfrm>
+              <a:off x="9034272" y="6189470"/>
+              <a:ext cx="2807208" cy="588020"/>
+            </a:xfrm>
+            <a:prstGeom prst="roundRect">
+              <a:avLst/>
+            </a:prstGeom>
+            <a:solidFill>
+              <a:schemeClr val="accent1">
+                <a:lumMod val="20000"/>
+                <a:lumOff val="80000"/>
+              </a:schemeClr>
+            </a:solidFill>
+            <a:ln>
+              <a:noFill/>
+            </a:ln>
+          </p:spPr>
+          <p:style>
+            <a:lnRef idx="2">
+              <a:schemeClr val="accent1">
+                <a:shade val="15000"/>
+              </a:schemeClr>
+            </a:lnRef>
+            <a:fillRef idx="1">
+              <a:schemeClr val="accent1"/>
+            </a:fillRef>
+            <a:effectRef idx="0">
+              <a:schemeClr val="accent1"/>
+            </a:effectRef>
+            <a:fontRef idx="minor">
+              <a:schemeClr val="lt1"/>
+            </a:fontRef>
+          </p:style>
+          <p:txBody>
+            <a:bodyPr rtlCol="0" anchor="ctr"/>
+            <a:lstStyle/>
+            <a:p>
+              <a:pPr algn="r"/>
+              <a:r>
+                <a:rPr lang="en-US" sz="1200" dirty="0">
+                  <a:ln w="0"/>
+                  <a:solidFill>
+                    <a:schemeClr val="tx1"/>
+                  </a:solidFill>
+                  <a:effectLst>
+                    <a:outerShdw blurRad="38100" dist="19050" dir="2700000" algn="tl" rotWithShape="0">
+                      <a:schemeClr val="dk1">
+                        <a:alpha val="40000"/>
+                      </a:schemeClr>
+                    </a:outerShdw>
+                  </a:effectLst>
+                </a:rPr>
+                <a:t>Yasen – Enterprise Architecture</a:t>
+              </a:r>
+            </a:p>
+            <a:p>
+              <a:pPr algn="r"/>
+              <a:r>
+                <a:rPr lang="en-US" sz="1200" dirty="0">
+                  <a:ln w="0"/>
+                  <a:solidFill>
+                    <a:schemeClr val="tx1"/>
+                  </a:solidFill>
+                  <a:effectLst>
+                    <a:outerShdw blurRad="38100" dist="19050" dir="2700000" algn="tl" rotWithShape="0">
+                      <a:schemeClr val="dk1">
+                        <a:alpha val="40000"/>
+                      </a:schemeClr>
+                    </a:outerShdw>
+                  </a:effectLst>
+                </a:rPr>
+                <a:t>YouTube: @yasenzhao</a:t>
+              </a:r>
+            </a:p>
+          </p:txBody>
+        </p:sp>
+        <p:pic>
+          <p:nvPicPr>
+            <p:cNvPr id="8" name="Picture 7">
+              <a:extLst>
+                <a:ext uri="{FF2B5EF4-FFF2-40B4-BE49-F238E27FC236}">
+                  <a16:creationId xmlns:a16="http://schemas.microsoft.com/office/drawing/2014/main" id="{574298EC-4397-D1B2-D733-593141A52CEB}"/>
+                </a:ext>
+              </a:extLst>
+            </p:cNvPr>
+            <p:cNvPicPr>
+              <a:picLocks noChangeAspect="1"/>
+            </p:cNvPicPr>
+            <p:nvPr/>
+          </p:nvPicPr>
+          <p:blipFill>
+            <a:blip r:embed="rId5">
+              <a:clrChange>
+                <a:clrFrom>
+                  <a:srgbClr val="FFFFFF"/>
+                </a:clrFrom>
+                <a:clrTo>
+                  <a:srgbClr val="FFFFFF">
+                    <a:alpha val="0"/>
+                  </a:srgbClr>
+                </a:clrTo>
+              </a:clrChange>
+            </a:blip>
+            <a:stretch>
+              <a:fillRect/>
+            </a:stretch>
+          </p:blipFill>
+          <p:spPr>
+            <a:xfrm>
+              <a:off x="9187981" y="6196988"/>
+              <a:ext cx="557286" cy="572984"/>
+            </a:xfrm>
+            <a:prstGeom prst="rect">
+              <a:avLst/>
+            </a:prstGeom>
+          </p:spPr>
+        </p:pic>
+      </p:grpSp>
+      <p:sp>
+        <p:nvSpPr>
+          <p:cNvPr id="11" name="Text Placeholder 10">
+            <a:extLst>
+              <a:ext uri="{FF2B5EF4-FFF2-40B4-BE49-F238E27FC236}">
+                <a16:creationId xmlns:a16="http://schemas.microsoft.com/office/drawing/2014/main" id="{35F1FC23-8B59-9603-A7DF-2732C830F2A2}"/>
+              </a:ext>
+            </a:extLst>
+          </p:cNvPr>
+          <p:cNvSpPr>
+            <a:spLocks noGrp="1"/>
+          </p:cNvSpPr>
+          <p:nvPr>
+            <p:ph type="body" sz="quarter" idx="14"/>
+          </p:nvPr>
+        </p:nvSpPr>
+        <p:spPr>
+          <a:xfrm>
+            <a:off x="3220162" y="6400799"/>
+            <a:ext cx="6246288" cy="401623"/>
+          </a:xfrm>
+        </p:spPr>
+        <p:txBody>
+          <a:bodyPr>
+            <a:normAutofit fontScale="92500" lnSpcReduction="10000"/>
+          </a:bodyPr>
+          <a:lstStyle/>
+          <a:p>
+            <a:pPr>
+              <a:lnSpc>
+                <a:spcPct val="120000"/>
+              </a:lnSpc>
+            </a:pPr>
+            <a:r>
+              <a:rPr lang="en-US" sz="2000" dirty="0"/>
+              <a:t>GitHub: </a:t>
+            </a:r>
+            <a:r>
+              <a:rPr lang="en-US" sz="2000" dirty="0">
+                <a:hlinkClick r:id="rId6"/>
+              </a:rPr>
+              <a:t>https://github.com/yasenstar/PlantUML_in_Action</a:t>
+            </a:r>
+            <a:endParaRPr lang="en-US" sz="2000" dirty="0"/>
+          </a:p>
+        </p:txBody>
+      </p:sp>
+      <p:sp>
+        <p:nvSpPr>
+          <p:cNvPr id="12" name="Title 20">
+            <a:extLst>
+              <a:ext uri="{FF2B5EF4-FFF2-40B4-BE49-F238E27FC236}">
+                <a16:creationId xmlns:a16="http://schemas.microsoft.com/office/drawing/2014/main" id="{0CA82506-B712-27A8-0AC7-E2C48FCA049F}"/>
+              </a:ext>
+            </a:extLst>
+          </p:cNvPr>
+          <p:cNvSpPr txBox="1">
+            <a:spLocks/>
+          </p:cNvSpPr>
+          <p:nvPr/>
+        </p:nvSpPr>
+        <p:spPr>
+          <a:xfrm>
+            <a:off x="2571750" y="1031627"/>
+            <a:ext cx="8820150" cy="1289457"/>
+          </a:xfrm>
+          <a:prstGeom prst="rect">
+            <a:avLst/>
+          </a:prstGeom>
+          <a:solidFill>
+            <a:srgbClr val="EDF3DB">
+              <a:alpha val="50196"/>
+            </a:srgbClr>
+          </a:solidFill>
+        </p:spPr>
+        <p:txBody>
+          <a:bodyPr vert="horz" lIns="91440" tIns="45720" rIns="91440" bIns="45720" rtlCol="0" anchor="ctr">
+            <a:noAutofit/>
+          </a:bodyPr>
+          <a:lstStyle>
+            <a:lvl1pPr algn="l" defTabSz="914400" rtl="0" eaLnBrk="1" latinLnBrk="0" hangingPunct="1">
+              <a:lnSpc>
+                <a:spcPct val="90000"/>
+              </a:lnSpc>
+              <a:spcBef>
+                <a:spcPct val="0"/>
+              </a:spcBef>
+              <a:buNone/>
+              <a:defRPr sz="8200" b="1" kern="1200">
+                <a:solidFill>
+                  <a:schemeClr val="tx1">
+                    <a:lumMod val="65000"/>
+                    <a:lumOff val="35000"/>
+                  </a:schemeClr>
+                </a:solidFill>
+                <a:effectLst>
+                  <a:outerShdw blurRad="38100" dist="38100" dir="2700000" algn="tl">
+                    <a:srgbClr val="000000">
+                      <a:alpha val="43137"/>
+                    </a:srgbClr>
+                  </a:outerShdw>
+                </a:effectLst>
+                <a:latin typeface="+mn-lt"/>
+                <a:ea typeface="+mj-ea"/>
+                <a:cs typeface="+mj-cs"/>
+              </a:defRPr>
+            </a:lvl1pPr>
+          </a:lstStyle>
+          <a:p>
+            <a:r>
+              <a:rPr lang="en-US" sz="5400" dirty="0"/>
+              <a:t>1. Sequence Diagram</a:t>
+            </a:r>
+          </a:p>
+          <a:p>
+            <a:r>
+              <a:rPr lang="en-US" sz="4000" dirty="0"/>
+              <a:t>1.10 Page Title, Header and Footer</a:t>
+            </a:r>
+            <a:endParaRPr lang="en-US" sz="5400" dirty="0"/>
+          </a:p>
+        </p:txBody>
+      </p:sp>
+      <p:pic>
+        <p:nvPicPr>
+          <p:cNvPr id="9" name="Picture 8">
+            <a:extLst>
+              <a:ext uri="{FF2B5EF4-FFF2-40B4-BE49-F238E27FC236}">
+                <a16:creationId xmlns:a16="http://schemas.microsoft.com/office/drawing/2014/main" id="{47D1C26B-6EBE-FAB6-D715-F0490859BD36}"/>
+              </a:ext>
+            </a:extLst>
+          </p:cNvPr>
+          <p:cNvPicPr>
+            <a:picLocks noChangeAspect="1"/>
+          </p:cNvPicPr>
+          <p:nvPr/>
+        </p:nvPicPr>
+        <p:blipFill>
+          <a:blip r:embed="rId7"/>
+          <a:stretch>
+            <a:fillRect/>
+          </a:stretch>
+        </p:blipFill>
+        <p:spPr>
+          <a:xfrm>
+            <a:off x="2631265" y="2622775"/>
+            <a:ext cx="6863760" cy="3317756"/>
+          </a:xfrm>
+          <a:prstGeom prst="rect">
+            <a:avLst/>
+          </a:prstGeom>
+          <a:ln>
+            <a:noFill/>
+          </a:ln>
+          <a:effectLst>
+            <a:outerShdw blurRad="292100" dist="139700" dir="2700000" algn="tl" rotWithShape="0">
+              <a:srgbClr val="333333">
+                <a:alpha val="65000"/>
+              </a:srgbClr>
+            </a:outerShdw>
+          </a:effectLst>
+        </p:spPr>
+      </p:pic>
+      <p:pic>
+        <p:nvPicPr>
+          <p:cNvPr id="14" name="Picture 13">
+            <a:extLst>
+              <a:ext uri="{FF2B5EF4-FFF2-40B4-BE49-F238E27FC236}">
+                <a16:creationId xmlns:a16="http://schemas.microsoft.com/office/drawing/2014/main" id="{54FC84D7-0C6B-BE7B-0FB2-2D9E8CF6CD7A}"/>
+              </a:ext>
+            </a:extLst>
+          </p:cNvPr>
+          <p:cNvPicPr>
+            <a:picLocks noChangeAspect="1"/>
+          </p:cNvPicPr>
+          <p:nvPr/>
+        </p:nvPicPr>
+        <p:blipFill>
+          <a:blip r:embed="rId8"/>
+          <a:stretch>
+            <a:fillRect/>
+          </a:stretch>
+        </p:blipFill>
+        <p:spPr>
+          <a:xfrm>
+            <a:off x="9821621" y="2996409"/>
+            <a:ext cx="1671638" cy="2249799"/>
+          </a:xfrm>
+          <a:prstGeom prst="rect">
+            <a:avLst/>
+          </a:prstGeom>
+          <a:ln>
+            <a:noFill/>
+          </a:ln>
+          <a:effectLst>
+            <a:outerShdw blurRad="292100" dist="139700" dir="2700000" algn="tl" rotWithShape="0">
+              <a:srgbClr val="333333">
+                <a:alpha val="65000"/>
+              </a:srgbClr>
+            </a:outerShdw>
+          </a:effectLst>
+        </p:spPr>
+      </p:pic>
+    </p:spTree>
+    <p:extLst>
+      <p:ext uri="{BB962C8B-B14F-4D97-AF65-F5344CB8AC3E}">
+        <p14:creationId xmlns:p14="http://schemas.microsoft.com/office/powerpoint/2010/main" val="4175592737"/>
+      </p:ext>
+    </p:extLst>
+  </p:cSld>
+  <p:clrMapOvr>
+    <a:masterClrMapping/>
+  </p:clrMapOvr>
+</p:sld>
+</file>
+
+<file path=ppt/slides/slide9.xml><?xml version="1.0" encoding="utf-8"?>
+<p:sld xmlns:a="http://schemas.openxmlformats.org/drawingml/2006/main" xmlns:r="http://schemas.openxmlformats.org/officeDocument/2006/relationships" xmlns:p="http://schemas.openxmlformats.org/presentationml/2006/main">
+  <p:cSld>
+    <p:spTree>
+      <p:nvGrpSpPr>
+        <p:cNvPr id="1" name=""/>
+        <p:cNvGrpSpPr/>
+        <p:nvPr/>
+      </p:nvGrpSpPr>
+      <p:grpSpPr>
+        <a:xfrm>
+          <a:off x="0" y="0"/>
+          <a:ext cx="0" cy="0"/>
+          <a:chOff x="0" y="0"/>
+          <a:chExt cx="0" cy="0"/>
+        </a:xfrm>
+      </p:grpSpPr>
+      <p:pic>
+        <p:nvPicPr>
+          <p:cNvPr id="18" name="Picture Placeholder 17" descr="Learn to Draw Background">
+            <a:extLst>
+              <a:ext uri="{FF2B5EF4-FFF2-40B4-BE49-F238E27FC236}">
+                <a16:creationId xmlns:a16="http://schemas.microsoft.com/office/drawing/2014/main" id="{7FD9C5C0-919A-48C6-B5A4-49A012EB3DC2}"/>
+              </a:ext>
+            </a:extLst>
+          </p:cNvPr>
+          <p:cNvPicPr>
+            <a:picLocks noGrp="1" noChangeAspect="1"/>
+          </p:cNvPicPr>
+          <p:nvPr>
+            <p:ph type="pic" sz="quarter" idx="15"/>
+          </p:nvPr>
+        </p:nvPicPr>
+        <p:blipFill>
+          <a:blip r:embed="rId3">
+            <a:extLst>
+              <a:ext uri="{28A0092B-C50C-407E-A947-70E740481C1C}">
+                <a14:useLocalDpi xmlns:a14="http://schemas.microsoft.com/office/drawing/2010/main" val="0"/>
+              </a:ext>
+            </a:extLst>
+          </a:blip>
+          <a:srcRect/>
+          <a:stretch>
+            <a:fillRect/>
+          </a:stretch>
+        </p:blipFill>
+        <p:spPr>
+          <a:xfrm>
+            <a:off x="0" y="-32004"/>
+            <a:ext cx="12192000" cy="6912864"/>
+          </a:xfrm>
+        </p:spPr>
+      </p:pic>
+      <p:sp>
+        <p:nvSpPr>
+          <p:cNvPr id="21" name="Title 20">
+            <a:extLst>
+              <a:ext uri="{FF2B5EF4-FFF2-40B4-BE49-F238E27FC236}">
+                <a16:creationId xmlns:a16="http://schemas.microsoft.com/office/drawing/2014/main" id="{D4374B7E-EEDF-4C84-BE7C-BB50183825A0}"/>
+              </a:ext>
+            </a:extLst>
+          </p:cNvPr>
+          <p:cNvSpPr>
+            <a:spLocks noGrp="1"/>
+          </p:cNvSpPr>
+          <p:nvPr>
+            <p:ph type="title"/>
+          </p:nvPr>
+        </p:nvSpPr>
+        <p:spPr>
+          <a:xfrm>
+            <a:off x="2346356" y="128571"/>
+            <a:ext cx="7120094" cy="819150"/>
+          </a:xfrm>
+          <a:gradFill flip="none" rotWithShape="1">
+            <a:gsLst>
+              <a:gs pos="0">
+                <a:schemeClr val="accent1">
+                  <a:lumMod val="67000"/>
+                </a:schemeClr>
+              </a:gs>
+              <a:gs pos="48000">
+                <a:schemeClr val="accent1">
+                  <a:lumMod val="97000"/>
+                  <a:lumOff val="3000"/>
+                </a:schemeClr>
+              </a:gs>
+              <a:gs pos="100000">
+                <a:schemeClr val="accent1">
+                  <a:lumMod val="60000"/>
+                  <a:lumOff val="40000"/>
+                </a:schemeClr>
+              </a:gs>
+            </a:gsLst>
+            <a:lin ang="16200000" scaled="1"/>
+            <a:tileRect/>
+          </a:gradFill>
+          <a:ln>
+            <a:noFill/>
+          </a:ln>
+        </p:spPr>
+        <p:style>
+          <a:lnRef idx="0">
+            <a:scrgbClr r="0" g="0" b="0"/>
+          </a:lnRef>
+          <a:fillRef idx="0">
+            <a:scrgbClr r="0" g="0" b="0"/>
+          </a:fillRef>
+          <a:effectRef idx="0">
+            <a:scrgbClr r="0" g="0" b="0"/>
+          </a:effectRef>
+          <a:fontRef idx="minor">
+            <a:schemeClr val="lt1"/>
+          </a:fontRef>
+        </p:style>
+        <p:txBody>
+          <a:bodyPr anchor="ctr"/>
+          <a:lstStyle/>
+          <a:p>
+            <a:pPr algn="ctr"/>
+            <a:r>
+              <a:rPr lang="en-US" sz="6600" dirty="0">
+                <a:solidFill>
+                  <a:schemeClr val="bg1">
+                    <a:lumMod val="95000"/>
+                  </a:schemeClr>
+                </a:solidFill>
+              </a:rPr>
+              <a:t>PlantUML in Action</a:t>
+            </a:r>
+          </a:p>
+        </p:txBody>
+      </p:sp>
+      <p:sp>
+        <p:nvSpPr>
+          <p:cNvPr id="2" name="TextBox 1">
+            <a:extLst>
+              <a:ext uri="{FF2B5EF4-FFF2-40B4-BE49-F238E27FC236}">
+                <a16:creationId xmlns:a16="http://schemas.microsoft.com/office/drawing/2014/main" id="{BCB381F4-71C4-3080-500A-ADD1D9693A22}"/>
+              </a:ext>
+            </a:extLst>
+          </p:cNvPr>
+          <p:cNvSpPr txBox="1"/>
+          <p:nvPr/>
+        </p:nvSpPr>
+        <p:spPr>
+          <a:xfrm>
+            <a:off x="63778" y="544376"/>
+            <a:ext cx="1742785" cy="1323439"/>
+          </a:xfrm>
+          <a:prstGeom prst="rect">
+            <a:avLst/>
+          </a:prstGeom>
+          <a:noFill/>
+        </p:spPr>
+        <p:txBody>
+          <a:bodyPr wrap="none" rtlCol="0">
+            <a:spAutoFit/>
+          </a:bodyPr>
+          <a:lstStyle/>
+          <a:p>
+            <a:pPr algn="ctr"/>
+            <a:r>
+              <a:rPr lang="en-US" sz="8000" b="1" dirty="0">
+                <a:solidFill>
+                  <a:schemeClr val="tx1">
+                    <a:lumMod val="65000"/>
+                    <a:lumOff val="35000"/>
+                  </a:schemeClr>
+                </a:solidFill>
+                <a:effectLst>
+                  <a:outerShdw blurRad="38100" dist="38100" dir="2700000" algn="tl">
+                    <a:srgbClr val="000000">
+                      <a:alpha val="43137"/>
+                    </a:srgbClr>
+                  </a:outerShdw>
+                </a:effectLst>
+                <a:ea typeface="+mj-ea"/>
+                <a:cs typeface="+mj-cs"/>
+              </a:rPr>
+              <a:t>008</a:t>
+            </a:r>
+          </a:p>
+        </p:txBody>
+      </p:sp>
+      <p:pic>
+        <p:nvPicPr>
+          <p:cNvPr id="4" name="Picture 3">
+            <a:extLst>
+              <a:ext uri="{FF2B5EF4-FFF2-40B4-BE49-F238E27FC236}">
+                <a16:creationId xmlns:a16="http://schemas.microsoft.com/office/drawing/2014/main" id="{4336F9C1-947E-5FCC-732F-E31EB756B976}"/>
+              </a:ext>
+            </a:extLst>
+          </p:cNvPr>
+          <p:cNvPicPr>
+            <a:picLocks noChangeAspect="1"/>
+          </p:cNvPicPr>
+          <p:nvPr/>
+        </p:nvPicPr>
+        <p:blipFill>
+          <a:blip r:embed="rId4"/>
+          <a:stretch>
+            <a:fillRect/>
+          </a:stretch>
+        </p:blipFill>
+        <p:spPr>
+          <a:xfrm>
+            <a:off x="140722" y="2321084"/>
+            <a:ext cx="2156873" cy="1800225"/>
+          </a:xfrm>
+          <a:prstGeom prst="rect">
+            <a:avLst/>
+          </a:prstGeom>
+          <a:ln>
+            <a:noFill/>
+          </a:ln>
+          <a:effectLst>
+            <a:softEdge rad="112500"/>
+          </a:effectLst>
+        </p:spPr>
+      </p:pic>
+      <p:grpSp>
+        <p:nvGrpSpPr>
+          <p:cNvPr id="6" name="Group 5">
+            <a:extLst>
+              <a:ext uri="{FF2B5EF4-FFF2-40B4-BE49-F238E27FC236}">
+                <a16:creationId xmlns:a16="http://schemas.microsoft.com/office/drawing/2014/main" id="{9D2C3B74-3F5D-CAAA-2D9B-BC4A520A9943}"/>
+              </a:ext>
+            </a:extLst>
+          </p:cNvPr>
+          <p:cNvGrpSpPr/>
+          <p:nvPr/>
+        </p:nvGrpSpPr>
+        <p:grpSpPr>
+          <a:xfrm>
+            <a:off x="140722" y="6221921"/>
+            <a:ext cx="2807208" cy="588020"/>
+            <a:chOff x="9034272" y="6189470"/>
+            <a:chExt cx="2807208" cy="588020"/>
+          </a:xfrm>
+        </p:grpSpPr>
+        <p:sp>
+          <p:nvSpPr>
+            <p:cNvPr id="7" name="Rectangle: Rounded Corners 6">
+              <a:extLst>
+                <a:ext uri="{FF2B5EF4-FFF2-40B4-BE49-F238E27FC236}">
+                  <a16:creationId xmlns:a16="http://schemas.microsoft.com/office/drawing/2014/main" id="{0010B690-7856-5EB1-2BF9-0C41CA3642A5}"/>
+                </a:ext>
+              </a:extLst>
+            </p:cNvPr>
+            <p:cNvSpPr/>
+            <p:nvPr/>
+          </p:nvSpPr>
+          <p:spPr>
+            <a:xfrm>
+              <a:off x="9034272" y="6189470"/>
+              <a:ext cx="2807208" cy="588020"/>
+            </a:xfrm>
+            <a:prstGeom prst="roundRect">
+              <a:avLst/>
+            </a:prstGeom>
+            <a:solidFill>
+              <a:schemeClr val="accent1">
+                <a:lumMod val="20000"/>
+                <a:lumOff val="80000"/>
+              </a:schemeClr>
+            </a:solidFill>
+            <a:ln>
+              <a:noFill/>
+            </a:ln>
+          </p:spPr>
+          <p:style>
+            <a:lnRef idx="2">
+              <a:schemeClr val="accent1">
+                <a:shade val="15000"/>
+              </a:schemeClr>
+            </a:lnRef>
+            <a:fillRef idx="1">
+              <a:schemeClr val="accent1"/>
+            </a:fillRef>
+            <a:effectRef idx="0">
+              <a:schemeClr val="accent1"/>
+            </a:effectRef>
+            <a:fontRef idx="minor">
+              <a:schemeClr val="lt1"/>
+            </a:fontRef>
+          </p:style>
+          <p:txBody>
+            <a:bodyPr rtlCol="0" anchor="ctr"/>
+            <a:lstStyle/>
+            <a:p>
+              <a:pPr algn="r"/>
+              <a:r>
+                <a:rPr lang="en-US" sz="1200" dirty="0">
+                  <a:ln w="0"/>
+                  <a:solidFill>
+                    <a:schemeClr val="tx1"/>
+                  </a:solidFill>
+                  <a:effectLst>
+                    <a:outerShdw blurRad="38100" dist="19050" dir="2700000" algn="tl" rotWithShape="0">
+                      <a:schemeClr val="dk1">
+                        <a:alpha val="40000"/>
+                      </a:schemeClr>
+                    </a:outerShdw>
+                  </a:effectLst>
+                </a:rPr>
+                <a:t>Yasen – Enterprise Architecture</a:t>
+              </a:r>
+            </a:p>
+            <a:p>
+              <a:pPr algn="r"/>
+              <a:r>
+                <a:rPr lang="en-US" sz="1200" dirty="0">
+                  <a:ln w="0"/>
+                  <a:solidFill>
+                    <a:schemeClr val="tx1"/>
+                  </a:solidFill>
+                  <a:effectLst>
+                    <a:outerShdw blurRad="38100" dist="19050" dir="2700000" algn="tl" rotWithShape="0">
+                      <a:schemeClr val="dk1">
+                        <a:alpha val="40000"/>
+                      </a:schemeClr>
+                    </a:outerShdw>
+                  </a:effectLst>
+                </a:rPr>
+                <a:t>YouTube: @yasenzhao</a:t>
+              </a:r>
+            </a:p>
+          </p:txBody>
+        </p:sp>
+        <p:pic>
+          <p:nvPicPr>
+            <p:cNvPr id="8" name="Picture 7">
+              <a:extLst>
+                <a:ext uri="{FF2B5EF4-FFF2-40B4-BE49-F238E27FC236}">
+                  <a16:creationId xmlns:a16="http://schemas.microsoft.com/office/drawing/2014/main" id="{574298EC-4397-D1B2-D733-593141A52CEB}"/>
+                </a:ext>
+              </a:extLst>
+            </p:cNvPr>
+            <p:cNvPicPr>
+              <a:picLocks noChangeAspect="1"/>
+            </p:cNvPicPr>
+            <p:nvPr/>
+          </p:nvPicPr>
+          <p:blipFill>
+            <a:blip r:embed="rId5">
+              <a:clrChange>
+                <a:clrFrom>
+                  <a:srgbClr val="FFFFFF"/>
+                </a:clrFrom>
+                <a:clrTo>
+                  <a:srgbClr val="FFFFFF">
+                    <a:alpha val="0"/>
+                  </a:srgbClr>
+                </a:clrTo>
+              </a:clrChange>
+            </a:blip>
+            <a:stretch>
+              <a:fillRect/>
+            </a:stretch>
+          </p:blipFill>
+          <p:spPr>
+            <a:xfrm>
+              <a:off x="9187981" y="6196988"/>
+              <a:ext cx="557286" cy="572984"/>
+            </a:xfrm>
+            <a:prstGeom prst="rect">
+              <a:avLst/>
+            </a:prstGeom>
+          </p:spPr>
+        </p:pic>
+      </p:grpSp>
+      <p:sp>
+        <p:nvSpPr>
+          <p:cNvPr id="11" name="Text Placeholder 10">
+            <a:extLst>
+              <a:ext uri="{FF2B5EF4-FFF2-40B4-BE49-F238E27FC236}">
+                <a16:creationId xmlns:a16="http://schemas.microsoft.com/office/drawing/2014/main" id="{35F1FC23-8B59-9603-A7DF-2732C830F2A2}"/>
+              </a:ext>
+            </a:extLst>
+          </p:cNvPr>
+          <p:cNvSpPr>
+            <a:spLocks noGrp="1"/>
+          </p:cNvSpPr>
+          <p:nvPr>
+            <p:ph type="body" sz="quarter" idx="14"/>
+          </p:nvPr>
+        </p:nvSpPr>
+        <p:spPr>
+          <a:xfrm>
+            <a:off x="3220162" y="6400799"/>
+            <a:ext cx="6246288" cy="401623"/>
+          </a:xfrm>
+        </p:spPr>
+        <p:txBody>
+          <a:bodyPr>
+            <a:normAutofit fontScale="92500" lnSpcReduction="10000"/>
+          </a:bodyPr>
+          <a:lstStyle/>
+          <a:p>
+            <a:pPr>
+              <a:lnSpc>
+                <a:spcPct val="120000"/>
+              </a:lnSpc>
+            </a:pPr>
+            <a:r>
+              <a:rPr lang="en-US" sz="2000" dirty="0"/>
+              <a:t>GitHub: </a:t>
+            </a:r>
+            <a:r>
+              <a:rPr lang="en-US" sz="2000" dirty="0">
+                <a:hlinkClick r:id="rId6"/>
+              </a:rPr>
+              <a:t>https://github.com/yasenstar/PlantUML_in_Action</a:t>
+            </a:r>
+            <a:endParaRPr lang="en-US" sz="2000" dirty="0"/>
+          </a:p>
+        </p:txBody>
+      </p:sp>
+      <p:sp>
+        <p:nvSpPr>
+          <p:cNvPr id="12" name="Title 20">
+            <a:extLst>
+              <a:ext uri="{FF2B5EF4-FFF2-40B4-BE49-F238E27FC236}">
+                <a16:creationId xmlns:a16="http://schemas.microsoft.com/office/drawing/2014/main" id="{0CA82506-B712-27A8-0AC7-E2C48FCA049F}"/>
+              </a:ext>
+            </a:extLst>
+          </p:cNvPr>
+          <p:cNvSpPr txBox="1">
+            <a:spLocks/>
+          </p:cNvSpPr>
+          <p:nvPr/>
+        </p:nvSpPr>
+        <p:spPr>
+          <a:xfrm>
+            <a:off x="2571750" y="1031627"/>
+            <a:ext cx="8820150" cy="1289457"/>
+          </a:xfrm>
+          <a:prstGeom prst="rect">
+            <a:avLst/>
+          </a:prstGeom>
+          <a:solidFill>
+            <a:srgbClr val="EDF3DB">
+              <a:alpha val="50196"/>
+            </a:srgbClr>
+          </a:solidFill>
+        </p:spPr>
+        <p:txBody>
+          <a:bodyPr vert="horz" lIns="91440" tIns="45720" rIns="91440" bIns="45720" rtlCol="0" anchor="ctr">
+            <a:noAutofit/>
+          </a:bodyPr>
+          <a:lstStyle>
+            <a:lvl1pPr algn="l" defTabSz="914400" rtl="0" eaLnBrk="1" latinLnBrk="0" hangingPunct="1">
+              <a:lnSpc>
+                <a:spcPct val="90000"/>
+              </a:lnSpc>
+              <a:spcBef>
+                <a:spcPct val="0"/>
+              </a:spcBef>
+              <a:buNone/>
+              <a:defRPr sz="8200" b="1" kern="1200">
+                <a:solidFill>
+                  <a:schemeClr val="tx1">
+                    <a:lumMod val="65000"/>
+                    <a:lumOff val="35000"/>
+                  </a:schemeClr>
+                </a:solidFill>
+                <a:effectLst>
+                  <a:outerShdw blurRad="38100" dist="38100" dir="2700000" algn="tl">
+                    <a:srgbClr val="000000">
+                      <a:alpha val="43137"/>
+                    </a:srgbClr>
+                  </a:outerShdw>
+                </a:effectLst>
+                <a:latin typeface="+mn-lt"/>
+                <a:ea typeface="+mj-ea"/>
+                <a:cs typeface="+mj-cs"/>
+              </a:defRPr>
+            </a:lvl1pPr>
+          </a:lstStyle>
+          <a:p>
+            <a:r>
+              <a:rPr lang="en-US" sz="5400" dirty="0"/>
+              <a:t>1. Sequence Diagram</a:t>
+            </a:r>
+          </a:p>
+          <a:p>
+            <a:r>
+              <a:rPr lang="en-US" sz="4000" dirty="0"/>
+              <a:t>1.11 Splitting Diagrams</a:t>
+            </a:r>
+            <a:endParaRPr lang="en-US" sz="5400" dirty="0"/>
+          </a:p>
+        </p:txBody>
+      </p:sp>
+      <p:pic>
+        <p:nvPicPr>
+          <p:cNvPr id="5" name="Picture 4">
+            <a:extLst>
+              <a:ext uri="{FF2B5EF4-FFF2-40B4-BE49-F238E27FC236}">
+                <a16:creationId xmlns:a16="http://schemas.microsoft.com/office/drawing/2014/main" id="{AD9440F2-2505-F57A-8BBF-088F2C147C5E}"/>
+              </a:ext>
+            </a:extLst>
+          </p:cNvPr>
+          <p:cNvPicPr>
+            <a:picLocks noChangeAspect="1"/>
+          </p:cNvPicPr>
+          <p:nvPr/>
+        </p:nvPicPr>
+        <p:blipFill>
+          <a:blip r:embed="rId7"/>
+          <a:stretch>
+            <a:fillRect/>
+          </a:stretch>
+        </p:blipFill>
+        <p:spPr>
+          <a:xfrm>
+            <a:off x="3848436" y="2404990"/>
+            <a:ext cx="6246289" cy="3952076"/>
+          </a:xfrm>
+          <a:prstGeom prst="rect">
+            <a:avLst/>
+          </a:prstGeom>
+          <a:ln>
+            <a:noFill/>
+          </a:ln>
+          <a:effectLst>
+            <a:outerShdw blurRad="292100" dist="139700" dir="2700000" algn="tl" rotWithShape="0">
+              <a:srgbClr val="333333">
+                <a:alpha val="65000"/>
+              </a:srgbClr>
+            </a:outerShdw>
+          </a:effectLst>
+        </p:spPr>
+      </p:pic>
+    </p:spTree>
+    <p:extLst>
+      <p:ext uri="{BB962C8B-B14F-4D97-AF65-F5344CB8AC3E}">
+        <p14:creationId xmlns:p14="http://schemas.microsoft.com/office/powerpoint/2010/main" val="3460586987"/>
       </p:ext>
     </p:extLst>
   </p:cSld>

</xml_diff>

<commit_message>
add 01-20 and 01-21
</commit_message>
<xml_diff>
--- a/PlantUML_in_Action.pptx
+++ b/PlantUML_in_Action.pptx
@@ -29,8 +29,8 @@
     <p:sldId id="285" r:id="rId20"/>
     <p:sldId id="286" r:id="rId21"/>
     <p:sldId id="287" r:id="rId22"/>
-    <p:sldId id="288" r:id="rId23"/>
-    <p:sldId id="289" r:id="rId24"/>
+    <p:sldId id="289" r:id="rId23"/>
+    <p:sldId id="290" r:id="rId24"/>
   </p:sldIdLst>
   <p:sldSz cx="12192000" cy="6858000"/>
   <p:notesSz cx="6858000" cy="9144000"/>
@@ -1592,7 +1592,7 @@
     </p:spTree>
     <p:extLst>
       <p:ext uri="{BB962C8B-B14F-4D97-AF65-F5344CB8AC3E}">
-        <p14:creationId xmlns:p14="http://schemas.microsoft.com/office/powerpoint/2010/main" val="1945666771"/>
+        <p14:creationId xmlns:p14="http://schemas.microsoft.com/office/powerpoint/2010/main" val="1666802664"/>
       </p:ext>
     </p:extLst>
   </p:cSld>
@@ -1760,7 +1760,7 @@
     </p:spTree>
     <p:extLst>
       <p:ext uri="{BB962C8B-B14F-4D97-AF65-F5344CB8AC3E}">
-        <p14:creationId xmlns:p14="http://schemas.microsoft.com/office/powerpoint/2010/main" val="1666802664"/>
+        <p14:creationId xmlns:p14="http://schemas.microsoft.com/office/powerpoint/2010/main" val="188244034"/>
       </p:ext>
     </p:extLst>
   </p:cSld>
@@ -12929,7 +12929,7 @@
           <a:p>
             <a:r>
               <a:rPr lang="en-US" sz="3600" dirty="0"/>
-              <a:t>1.20 Divider or Separator</a:t>
+              <a:t>1.20 Divider or Separator 1.21 Reference</a:t>
             </a:r>
             <a:endParaRPr lang="en-US" sz="5400" dirty="0"/>
           </a:p>
@@ -12937,10 +12937,10 @@
       </p:sp>
       <p:pic>
         <p:nvPicPr>
-          <p:cNvPr id="9" name="Picture 8">
-            <a:extLst>
-              <a:ext uri="{FF2B5EF4-FFF2-40B4-BE49-F238E27FC236}">
-                <a16:creationId xmlns:a16="http://schemas.microsoft.com/office/drawing/2014/main" id="{2E79F24F-39CD-9173-9576-8EB64BF70012}"/>
+          <p:cNvPr id="5" name="Picture 4">
+            <a:extLst>
+              <a:ext uri="{FF2B5EF4-FFF2-40B4-BE49-F238E27FC236}">
+                <a16:creationId xmlns:a16="http://schemas.microsoft.com/office/drawing/2014/main" id="{8D3F5062-9DF1-AA52-F1D6-BF504DFFD826}"/>
               </a:ext>
             </a:extLst>
           </p:cNvPr>
@@ -12957,8 +12957,8 @@
         </p:blipFill>
         <p:spPr>
           <a:xfrm>
-            <a:off x="3045463" y="2404990"/>
-            <a:ext cx="4415666" cy="3816931"/>
+            <a:off x="2689640" y="2321084"/>
+            <a:ext cx="6059374" cy="3755866"/>
           </a:xfrm>
           <a:prstGeom prst="rect">
             <a:avLst/>
@@ -12997,8 +12997,48 @@
         </p:blipFill>
         <p:spPr>
           <a:xfrm>
-            <a:off x="8079995" y="2480224"/>
-            <a:ext cx="3493138" cy="3666462"/>
+            <a:off x="8188787" y="2223981"/>
+            <a:ext cx="1881670" cy="1975035"/>
+          </a:xfrm>
+          <a:prstGeom prst="rect">
+            <a:avLst/>
+          </a:prstGeom>
+          <a:ln>
+            <a:noFill/>
+          </a:ln>
+          <a:effectLst>
+            <a:outerShdw blurRad="292100" dist="139700" dir="2700000" algn="tl" rotWithShape="0">
+              <a:srgbClr val="333333">
+                <a:alpha val="65000"/>
+              </a:srgbClr>
+            </a:outerShdw>
+          </a:effectLst>
+        </p:spPr>
+      </p:pic>
+      <p:pic>
+        <p:nvPicPr>
+          <p:cNvPr id="14" name="Picture 13">
+            <a:extLst>
+              <a:ext uri="{FF2B5EF4-FFF2-40B4-BE49-F238E27FC236}">
+                <a16:creationId xmlns:a16="http://schemas.microsoft.com/office/drawing/2014/main" id="{503A1439-8B12-07DE-C90E-A81D1F45F41E}"/>
+              </a:ext>
+            </a:extLst>
+          </p:cNvPr>
+          <p:cNvPicPr>
+            <a:picLocks noChangeAspect="1"/>
+          </p:cNvPicPr>
+          <p:nvPr/>
+        </p:nvPicPr>
+        <p:blipFill>
+          <a:blip r:embed="rId9"/>
+          <a:stretch>
+            <a:fillRect/>
+          </a:stretch>
+        </p:blipFill>
+        <p:spPr>
+          <a:xfrm>
+            <a:off x="10188189" y="3086493"/>
+            <a:ext cx="1776355" cy="3231682"/>
           </a:xfrm>
           <a:prstGeom prst="rect">
             <a:avLst/>
@@ -13517,7 +13557,7 @@
           <a:p>
             <a:r>
               <a:rPr lang="en-US" sz="3600" dirty="0"/>
-              <a:t>1.21 Reference</a:t>
+              <a:t>1.22 Delay 1.23 Text Wrapping 1.24 Space</a:t>
             </a:r>
             <a:endParaRPr lang="en-US" sz="5400" dirty="0"/>
           </a:p>
@@ -13528,7 +13568,7 @@
           <p:cNvPr id="5" name="Picture 4">
             <a:extLst>
               <a:ext uri="{FF2B5EF4-FFF2-40B4-BE49-F238E27FC236}">
-                <a16:creationId xmlns:a16="http://schemas.microsoft.com/office/drawing/2014/main" id="{F5B125E3-18EB-35C9-F824-04461C3973F6}"/>
+                <a16:creationId xmlns:a16="http://schemas.microsoft.com/office/drawing/2014/main" id="{444B1FF8-845B-CF73-175B-233ACEA7A421}"/>
               </a:ext>
             </a:extLst>
           </p:cNvPr>
@@ -13545,68 +13585,18 @@
         </p:blipFill>
         <p:spPr>
           <a:xfrm>
-            <a:off x="2947930" y="2390754"/>
-            <a:ext cx="4656563" cy="3666463"/>
+            <a:off x="3088653" y="2393639"/>
+            <a:ext cx="8408022" cy="3886855"/>
           </a:xfrm>
           <a:prstGeom prst="rect">
             <a:avLst/>
           </a:prstGeom>
-          <a:ln>
-            <a:noFill/>
-          </a:ln>
-          <a:effectLst>
-            <a:outerShdw blurRad="292100" dist="139700" dir="2700000" algn="tl" rotWithShape="0">
-              <a:srgbClr val="333333">
-                <a:alpha val="65000"/>
-              </a:srgbClr>
-            </a:outerShdw>
-          </a:effectLst>
-        </p:spPr>
-      </p:pic>
-      <p:pic>
-        <p:nvPicPr>
-          <p:cNvPr id="14" name="Picture 13">
-            <a:extLst>
-              <a:ext uri="{FF2B5EF4-FFF2-40B4-BE49-F238E27FC236}">
-                <a16:creationId xmlns:a16="http://schemas.microsoft.com/office/drawing/2014/main" id="{503A1439-8B12-07DE-C90E-A81D1F45F41E}"/>
-              </a:ext>
-            </a:extLst>
-          </p:cNvPr>
-          <p:cNvPicPr>
-            <a:picLocks noChangeAspect="1"/>
-          </p:cNvPicPr>
-          <p:nvPr/>
-        </p:nvPicPr>
-        <p:blipFill>
-          <a:blip r:embed="rId8"/>
-          <a:stretch>
-            <a:fillRect/>
-          </a:stretch>
-        </p:blipFill>
-        <p:spPr>
-          <a:xfrm>
-            <a:off x="8663044" y="2505468"/>
-            <a:ext cx="1776355" cy="3231682"/>
-          </a:xfrm>
-          <a:prstGeom prst="rect">
-            <a:avLst/>
-          </a:prstGeom>
-          <a:ln>
-            <a:noFill/>
-          </a:ln>
-          <a:effectLst>
-            <a:outerShdw blurRad="292100" dist="139700" dir="2700000" algn="tl" rotWithShape="0">
-              <a:srgbClr val="333333">
-                <a:alpha val="65000"/>
-              </a:srgbClr>
-            </a:outerShdw>
-          </a:effectLst>
         </p:spPr>
       </p:pic>
     </p:spTree>
     <p:extLst>
       <p:ext uri="{BB962C8B-B14F-4D97-AF65-F5344CB8AC3E}">
-        <p14:creationId xmlns:p14="http://schemas.microsoft.com/office/powerpoint/2010/main" val="3015322096"/>
+        <p14:creationId xmlns:p14="http://schemas.microsoft.com/office/powerpoint/2010/main" val="2064236921"/>
       </p:ext>
     </p:extLst>
   </p:cSld>
@@ -14645,7 +14635,7 @@
         </p:spPr>
         <p:txBody>
           <a:bodyPr vert="horz" lIns="91440" tIns="45720" rIns="91440" bIns="45720" rtlCol="0" anchor="ctr">
-            <a:noAutofit/>
+            <a:normAutofit fontScale="85000" lnSpcReduction="20000"/>
           </a:bodyPr>
           <a:lstStyle>
             <a:lvl1pPr algn="l" defTabSz="914400" rtl="0" eaLnBrk="1" latinLnBrk="0" hangingPunct="1">
@@ -14685,7 +14675,13 @@
           <a:p>
             <a:r>
               <a:rPr lang="en-US" sz="3600" dirty="0"/>
-              <a:t>1.22 Delay</a:t>
+              <a:t>1.25 Lifeline Activation and Destruction</a:t>
+            </a:r>
+          </a:p>
+          <a:p>
+            <a:r>
+              <a:rPr lang="en-US" sz="3600" dirty="0"/>
+              <a:t>1.26 Return</a:t>
             </a:r>
             <a:endParaRPr lang="en-US" sz="5400" dirty="0"/>
           </a:p>
@@ -14693,10 +14689,10 @@
       </p:sp>
       <p:pic>
         <p:nvPicPr>
-          <p:cNvPr id="14" name="Picture 13">
-            <a:extLst>
-              <a:ext uri="{FF2B5EF4-FFF2-40B4-BE49-F238E27FC236}">
-                <a16:creationId xmlns:a16="http://schemas.microsoft.com/office/drawing/2014/main" id="{503A1439-8B12-07DE-C90E-A81D1F45F41E}"/>
+          <p:cNvPr id="13" name="Picture 12">
+            <a:extLst>
+              <a:ext uri="{FF2B5EF4-FFF2-40B4-BE49-F238E27FC236}">
+                <a16:creationId xmlns:a16="http://schemas.microsoft.com/office/drawing/2014/main" id="{2497AD0A-0884-7D9E-F2A7-B744D75D6FC2}"/>
               </a:ext>
             </a:extLst>
           </p:cNvPr>
@@ -14713,8 +14709,8 @@
         </p:blipFill>
         <p:spPr>
           <a:xfrm>
-            <a:off x="8663044" y="2505468"/>
-            <a:ext cx="1776355" cy="3231682"/>
+            <a:off x="3233414" y="2404342"/>
+            <a:ext cx="4428486" cy="3913198"/>
           </a:xfrm>
           <a:prstGeom prst="rect">
             <a:avLst/>
@@ -14733,10 +14729,10 @@
       </p:pic>
       <p:pic>
         <p:nvPicPr>
-          <p:cNvPr id="9" name="Picture 8">
-            <a:extLst>
-              <a:ext uri="{FF2B5EF4-FFF2-40B4-BE49-F238E27FC236}">
-                <a16:creationId xmlns:a16="http://schemas.microsoft.com/office/drawing/2014/main" id="{F5FD8A2E-3BB4-5109-5985-21C095D30CF0}"/>
+          <p:cNvPr id="15" name="Picture 14">
+            <a:extLst>
+              <a:ext uri="{FF2B5EF4-FFF2-40B4-BE49-F238E27FC236}">
+                <a16:creationId xmlns:a16="http://schemas.microsoft.com/office/drawing/2014/main" id="{EA988C7A-3276-F23B-7F76-5EF4CEBFF0BA}"/>
               </a:ext>
             </a:extLst>
           </p:cNvPr>
@@ -14753,8 +14749,8 @@
         </p:blipFill>
         <p:spPr>
           <a:xfrm>
-            <a:off x="3528957" y="2505468"/>
-            <a:ext cx="4592465" cy="3647682"/>
+            <a:off x="8291512" y="2361444"/>
+            <a:ext cx="2657475" cy="2143125"/>
           </a:xfrm>
           <a:prstGeom prst="rect">
             <a:avLst/>
@@ -14771,10 +14767,50 @@
           </a:effectLst>
         </p:spPr>
       </p:pic>
+      <p:pic>
+        <p:nvPicPr>
+          <p:cNvPr id="17" name="Picture 16">
+            <a:extLst>
+              <a:ext uri="{FF2B5EF4-FFF2-40B4-BE49-F238E27FC236}">
+                <a16:creationId xmlns:a16="http://schemas.microsoft.com/office/drawing/2014/main" id="{01095B77-C934-1E56-AEE4-4B69CF6086C6}"/>
+              </a:ext>
+            </a:extLst>
+          </p:cNvPr>
+          <p:cNvPicPr>
+            <a:picLocks noChangeAspect="1"/>
+          </p:cNvPicPr>
+          <p:nvPr/>
+        </p:nvPicPr>
+        <p:blipFill>
+          <a:blip r:embed="rId9"/>
+          <a:stretch>
+            <a:fillRect/>
+          </a:stretch>
+        </p:blipFill>
+        <p:spPr>
+          <a:xfrm>
+            <a:off x="8291512" y="4768494"/>
+            <a:ext cx="2657474" cy="1590675"/>
+          </a:xfrm>
+          <a:prstGeom prst="rect">
+            <a:avLst/>
+          </a:prstGeom>
+          <a:ln>
+            <a:noFill/>
+          </a:ln>
+          <a:effectLst>
+            <a:outerShdw blurRad="292100" dist="139700" dir="2700000" algn="tl" rotWithShape="0">
+              <a:srgbClr val="333333">
+                <a:alpha val="65000"/>
+              </a:srgbClr>
+            </a:outerShdw>
+          </a:effectLst>
+        </p:spPr>
+      </p:pic>
     </p:spTree>
     <p:extLst>
       <p:ext uri="{BB962C8B-B14F-4D97-AF65-F5344CB8AC3E}">
-        <p14:creationId xmlns:p14="http://schemas.microsoft.com/office/powerpoint/2010/main" val="2064236921"/>
+        <p14:creationId xmlns:p14="http://schemas.microsoft.com/office/powerpoint/2010/main" val="1857399978"/>
       </p:ext>
     </p:extLst>
   </p:cSld>
@@ -19884,23 +19920,12 @@
 </file>
 
 <file path=customXml/item1.xml><?xml version="1.0" encoding="utf-8"?>
-<p:properties xmlns:p="http://schemas.microsoft.com/office/2006/metadata/properties" xmlns:xsi="http://www.w3.org/2001/XMLSchema-instance" xmlns:pc="http://schemas.microsoft.com/office/infopath/2007/PartnerControls">
-  <documentManagement>
-    <_ip_UnifiedCompliancePolicyUIAction xmlns="http://schemas.microsoft.com/sharepoint/v3" xsi:nil="true"/>
-    <Image xmlns="71af3243-3dd4-4a8d-8c0d-dd76da1f02a5">
-      <Url xsi:nil="true"/>
-      <Description xsi:nil="true"/>
-    </Image>
-    <Status xmlns="71af3243-3dd4-4a8d-8c0d-dd76da1f02a5">Not started</Status>
-    <Background xmlns="71af3243-3dd4-4a8d-8c0d-dd76da1f02a5">false</Background>
-    <_ip_UnifiedCompliancePolicyProperties xmlns="http://schemas.microsoft.com/sharepoint/v3" xsi:nil="true"/>
-    <ImageTagsTaxHTField xmlns="71af3243-3dd4-4a8d-8c0d-dd76da1f02a5">
-      <Terms xmlns="http://schemas.microsoft.com/office/infopath/2007/PartnerControls"/>
-    </ImageTagsTaxHTField>
-    <TaxCatchAll xmlns="230e9df3-be65-4c73-a93b-d1236ebd677e" xsi:nil="true"/>
-    <MediaServiceKeyPoints xmlns="71af3243-3dd4-4a8d-8c0d-dd76da1f02a5" xsi:nil="true"/>
-  </documentManagement>
-</p:properties>
+<?mso-contentType ?>
+<FormTemplates xmlns="http://schemas.microsoft.com/sharepoint/v3/contenttype/forms">
+  <Display>DocumentLibraryForm</Display>
+  <Edit>DocumentLibraryForm</Edit>
+  <New>DocumentLibraryForm</New>
+</FormTemplates>
 </file>
 
 <file path=customXml/item2.xml><?xml version="1.0" encoding="utf-8"?>
@@ -20192,22 +20217,29 @@
 </file>
 
 <file path=customXml/item3.xml><?xml version="1.0" encoding="utf-8"?>
-<?mso-contentType ?>
-<FormTemplates xmlns="http://schemas.microsoft.com/sharepoint/v3/contenttype/forms">
-  <Display>DocumentLibraryForm</Display>
-  <Edit>DocumentLibraryForm</Edit>
-  <New>DocumentLibraryForm</New>
-</FormTemplates>
+<p:properties xmlns:p="http://schemas.microsoft.com/office/2006/metadata/properties" xmlns:xsi="http://www.w3.org/2001/XMLSchema-instance" xmlns:pc="http://schemas.microsoft.com/office/infopath/2007/PartnerControls">
+  <documentManagement>
+    <_ip_UnifiedCompliancePolicyUIAction xmlns="http://schemas.microsoft.com/sharepoint/v3" xsi:nil="true"/>
+    <Image xmlns="71af3243-3dd4-4a8d-8c0d-dd76da1f02a5">
+      <Url xsi:nil="true"/>
+      <Description xsi:nil="true"/>
+    </Image>
+    <Status xmlns="71af3243-3dd4-4a8d-8c0d-dd76da1f02a5">Not started</Status>
+    <Background xmlns="71af3243-3dd4-4a8d-8c0d-dd76da1f02a5">false</Background>
+    <_ip_UnifiedCompliancePolicyProperties xmlns="http://schemas.microsoft.com/sharepoint/v3" xsi:nil="true"/>
+    <ImageTagsTaxHTField xmlns="71af3243-3dd4-4a8d-8c0d-dd76da1f02a5">
+      <Terms xmlns="http://schemas.microsoft.com/office/infopath/2007/PartnerControls"/>
+    </ImageTagsTaxHTField>
+    <TaxCatchAll xmlns="230e9df3-be65-4c73-a93b-d1236ebd677e" xsi:nil="true"/>
+    <MediaServiceKeyPoints xmlns="71af3243-3dd4-4a8d-8c0d-dd76da1f02a5" xsi:nil="true"/>
+  </documentManagement>
+</p:properties>
 </file>
 
 <file path=customXml/itemProps1.xml><?xml version="1.0" encoding="utf-8"?>
-<ds:datastoreItem xmlns:ds="http://schemas.openxmlformats.org/officeDocument/2006/customXml" ds:itemID="{6BEBEE47-E975-4F93-A8CC-93D51AEF41AC}">
+<ds:datastoreItem xmlns:ds="http://schemas.openxmlformats.org/officeDocument/2006/customXml" ds:itemID="{FC43B1BF-65BC-4B0E-8E52-87CEF13383E1}">
   <ds:schemaRefs>
-    <ds:schemaRef ds:uri="http://schemas.microsoft.com/office/2006/metadata/properties"/>
-    <ds:schemaRef ds:uri="http://schemas.microsoft.com/office/infopath/2007/PartnerControls"/>
-    <ds:schemaRef ds:uri="http://schemas.microsoft.com/sharepoint/v3"/>
-    <ds:schemaRef ds:uri="71af3243-3dd4-4a8d-8c0d-dd76da1f02a5"/>
-    <ds:schemaRef ds:uri="230e9df3-be65-4c73-a93b-d1236ebd677e"/>
+    <ds:schemaRef ds:uri="http://schemas.microsoft.com/sharepoint/v3/contenttype/forms"/>
   </ds:schemaRefs>
 </ds:datastoreItem>
 </file>
@@ -20234,9 +20266,13 @@
 </file>
 
 <file path=customXml/itemProps3.xml><?xml version="1.0" encoding="utf-8"?>
-<ds:datastoreItem xmlns:ds="http://schemas.openxmlformats.org/officeDocument/2006/customXml" ds:itemID="{FC43B1BF-65BC-4B0E-8E52-87CEF13383E1}">
+<ds:datastoreItem xmlns:ds="http://schemas.openxmlformats.org/officeDocument/2006/customXml" ds:itemID="{6BEBEE47-E975-4F93-A8CC-93D51AEF41AC}">
   <ds:schemaRefs>
-    <ds:schemaRef ds:uri="http://schemas.microsoft.com/sharepoint/v3/contenttype/forms"/>
+    <ds:schemaRef ds:uri="http://schemas.microsoft.com/office/2006/metadata/properties"/>
+    <ds:schemaRef ds:uri="http://schemas.microsoft.com/office/infopath/2007/PartnerControls"/>
+    <ds:schemaRef ds:uri="http://schemas.microsoft.com/sharepoint/v3"/>
+    <ds:schemaRef ds:uri="71af3243-3dd4-4a8d-8c0d-dd76da1f02a5"/>
+    <ds:schemaRef ds:uri="230e9df3-be65-4c73-a93b-d1236ebd677e"/>
   </ds:schemaRefs>
 </ds:datastoreItem>
 </file>
</xml_diff>

<commit_message>
add 01_25 and 01_26
</commit_message>
<xml_diff>
--- a/PlantUML_in_Action.pptx
+++ b/PlantUML_in_Action.pptx
@@ -5,10 +5,10 @@
     <p:sldMasterId id="2147483648" r:id="rId4"/>
   </p:sldMasterIdLst>
   <p:notesMasterIdLst>
-    <p:notesMasterId r:id="rId26"/>
+    <p:notesMasterId r:id="rId28"/>
   </p:notesMasterIdLst>
   <p:handoutMasterIdLst>
-    <p:handoutMasterId r:id="rId27"/>
+    <p:handoutMasterId r:id="rId29"/>
   </p:handoutMasterIdLst>
   <p:sldIdLst>
     <p:sldId id="269" r:id="rId5"/>
@@ -32,6 +32,8 @@
     <p:sldId id="287" r:id="rId23"/>
     <p:sldId id="289" r:id="rId24"/>
     <p:sldId id="290" r:id="rId25"/>
+    <p:sldId id="292" r:id="rId26"/>
+    <p:sldId id="293" r:id="rId27"/>
   </p:sldIdLst>
   <p:sldSz cx="12192000" cy="6858000"/>
   <p:notesSz cx="6858000" cy="9144000"/>
@@ -1846,6 +1848,174 @@
     <p:extLst>
       <p:ext uri="{BB962C8B-B14F-4D97-AF65-F5344CB8AC3E}">
         <p14:creationId xmlns:p14="http://schemas.microsoft.com/office/powerpoint/2010/main" val="188244034"/>
+      </p:ext>
+    </p:extLst>
+  </p:cSld>
+  <p:clrMapOvr>
+    <a:masterClrMapping/>
+  </p:clrMapOvr>
+</p:notes>
+</file>
+
+<file path=ppt/notesSlides/notesSlide22.xml><?xml version="1.0" encoding="utf-8"?>
+<p:notes xmlns:a="http://schemas.openxmlformats.org/drawingml/2006/main" xmlns:r="http://schemas.openxmlformats.org/officeDocument/2006/relationships" xmlns:p="http://schemas.openxmlformats.org/presentationml/2006/main">
+  <p:cSld>
+    <p:spTree>
+      <p:nvGrpSpPr>
+        <p:cNvPr id="1" name=""/>
+        <p:cNvGrpSpPr/>
+        <p:nvPr/>
+      </p:nvGrpSpPr>
+      <p:grpSpPr>
+        <a:xfrm>
+          <a:off x="0" y="0"/>
+          <a:ext cx="0" cy="0"/>
+          <a:chOff x="0" y="0"/>
+          <a:chExt cx="0" cy="0"/>
+        </a:xfrm>
+      </p:grpSpPr>
+      <p:sp>
+        <p:nvSpPr>
+          <p:cNvPr id="2" name="Slide Image Placeholder 1"/>
+          <p:cNvSpPr>
+            <a:spLocks noGrp="1" noRot="1" noChangeAspect="1"/>
+          </p:cNvSpPr>
+          <p:nvPr>
+            <p:ph type="sldImg"/>
+          </p:nvPr>
+        </p:nvSpPr>
+        <p:spPr/>
+      </p:sp>
+      <p:sp>
+        <p:nvSpPr>
+          <p:cNvPr id="3" name="Notes Placeholder 2"/>
+          <p:cNvSpPr>
+            <a:spLocks noGrp="1"/>
+          </p:cNvSpPr>
+          <p:nvPr>
+            <p:ph type="body" idx="1"/>
+          </p:nvPr>
+        </p:nvSpPr>
+        <p:spPr/>
+        <p:txBody>
+          <a:bodyPr/>
+          <a:lstStyle/>
+          <a:p>
+            <a:endParaRPr lang="en-US" dirty="0"/>
+          </a:p>
+        </p:txBody>
+      </p:sp>
+      <p:sp>
+        <p:nvSpPr>
+          <p:cNvPr id="4" name="Slide Number Placeholder 3"/>
+          <p:cNvSpPr>
+            <a:spLocks noGrp="1"/>
+          </p:cNvSpPr>
+          <p:nvPr>
+            <p:ph type="sldNum" sz="quarter" idx="5"/>
+          </p:nvPr>
+        </p:nvSpPr>
+        <p:spPr/>
+        <p:txBody>
+          <a:bodyPr/>
+          <a:lstStyle/>
+          <a:p>
+            <a:fld id="{B2D6E128-7848-41C8-9D17-DA3B35E5052C}" type="slidenum">
+              <a:rPr lang="en-US" smtClean="0"/>
+              <a:t>22</a:t>
+            </a:fld>
+            <a:endParaRPr lang="en-US" dirty="0"/>
+          </a:p>
+        </p:txBody>
+      </p:sp>
+    </p:spTree>
+    <p:extLst>
+      <p:ext uri="{BB962C8B-B14F-4D97-AF65-F5344CB8AC3E}">
+        <p14:creationId xmlns:p14="http://schemas.microsoft.com/office/powerpoint/2010/main" val="3964865707"/>
+      </p:ext>
+    </p:extLst>
+  </p:cSld>
+  <p:clrMapOvr>
+    <a:masterClrMapping/>
+  </p:clrMapOvr>
+</p:notes>
+</file>
+
+<file path=ppt/notesSlides/notesSlide23.xml><?xml version="1.0" encoding="utf-8"?>
+<p:notes xmlns:a="http://schemas.openxmlformats.org/drawingml/2006/main" xmlns:r="http://schemas.openxmlformats.org/officeDocument/2006/relationships" xmlns:p="http://schemas.openxmlformats.org/presentationml/2006/main">
+  <p:cSld>
+    <p:spTree>
+      <p:nvGrpSpPr>
+        <p:cNvPr id="1" name=""/>
+        <p:cNvGrpSpPr/>
+        <p:nvPr/>
+      </p:nvGrpSpPr>
+      <p:grpSpPr>
+        <a:xfrm>
+          <a:off x="0" y="0"/>
+          <a:ext cx="0" cy="0"/>
+          <a:chOff x="0" y="0"/>
+          <a:chExt cx="0" cy="0"/>
+        </a:xfrm>
+      </p:grpSpPr>
+      <p:sp>
+        <p:nvSpPr>
+          <p:cNvPr id="2" name="Slide Image Placeholder 1"/>
+          <p:cNvSpPr>
+            <a:spLocks noGrp="1" noRot="1" noChangeAspect="1"/>
+          </p:cNvSpPr>
+          <p:nvPr>
+            <p:ph type="sldImg"/>
+          </p:nvPr>
+        </p:nvSpPr>
+        <p:spPr/>
+      </p:sp>
+      <p:sp>
+        <p:nvSpPr>
+          <p:cNvPr id="3" name="Notes Placeholder 2"/>
+          <p:cNvSpPr>
+            <a:spLocks noGrp="1"/>
+          </p:cNvSpPr>
+          <p:nvPr>
+            <p:ph type="body" idx="1"/>
+          </p:nvPr>
+        </p:nvSpPr>
+        <p:spPr/>
+        <p:txBody>
+          <a:bodyPr/>
+          <a:lstStyle/>
+          <a:p>
+            <a:endParaRPr lang="en-US" dirty="0"/>
+          </a:p>
+        </p:txBody>
+      </p:sp>
+      <p:sp>
+        <p:nvSpPr>
+          <p:cNvPr id="4" name="Slide Number Placeholder 3"/>
+          <p:cNvSpPr>
+            <a:spLocks noGrp="1"/>
+          </p:cNvSpPr>
+          <p:nvPr>
+            <p:ph type="sldNum" sz="quarter" idx="5"/>
+          </p:nvPr>
+        </p:nvSpPr>
+        <p:spPr/>
+        <p:txBody>
+          <a:bodyPr/>
+          <a:lstStyle/>
+          <a:p>
+            <a:fld id="{B2D6E128-7848-41C8-9D17-DA3B35E5052C}" type="slidenum">
+              <a:rPr lang="en-US" smtClean="0"/>
+              <a:t>23</a:t>
+            </a:fld>
+            <a:endParaRPr lang="en-US" dirty="0"/>
+          </a:p>
+        </p:txBody>
+      </p:sp>
+    </p:spTree>
+    <p:extLst>
+      <p:ext uri="{BB962C8B-B14F-4D97-AF65-F5344CB8AC3E}">
+        <p14:creationId xmlns:p14="http://schemas.microsoft.com/office/powerpoint/2010/main" val="229677510"/>
       </p:ext>
     </p:extLst>
   </p:cSld>
@@ -15102,6 +15272,1222 @@
     <p:extLst>
       <p:ext uri="{BB962C8B-B14F-4D97-AF65-F5344CB8AC3E}">
         <p14:creationId xmlns:p14="http://schemas.microsoft.com/office/powerpoint/2010/main" val="1857399978"/>
+      </p:ext>
+    </p:extLst>
+  </p:cSld>
+  <p:clrMapOvr>
+    <a:masterClrMapping/>
+  </p:clrMapOvr>
+</p:sld>
+</file>
+
+<file path=ppt/slides/slide22.xml><?xml version="1.0" encoding="utf-8"?>
+<p:sld xmlns:a="http://schemas.openxmlformats.org/drawingml/2006/main" xmlns:r="http://schemas.openxmlformats.org/officeDocument/2006/relationships" xmlns:p="http://schemas.openxmlformats.org/presentationml/2006/main">
+  <p:cSld>
+    <p:spTree>
+      <p:nvGrpSpPr>
+        <p:cNvPr id="1" name=""/>
+        <p:cNvGrpSpPr/>
+        <p:nvPr/>
+      </p:nvGrpSpPr>
+      <p:grpSpPr>
+        <a:xfrm>
+          <a:off x="0" y="0"/>
+          <a:ext cx="0" cy="0"/>
+          <a:chOff x="0" y="0"/>
+          <a:chExt cx="0" cy="0"/>
+        </a:xfrm>
+      </p:grpSpPr>
+      <p:pic>
+        <p:nvPicPr>
+          <p:cNvPr id="18" name="Picture Placeholder 17" descr="Learn to Draw Background">
+            <a:extLst>
+              <a:ext uri="{FF2B5EF4-FFF2-40B4-BE49-F238E27FC236}">
+                <a16:creationId xmlns:a16="http://schemas.microsoft.com/office/drawing/2014/main" id="{7FD9C5C0-919A-48C6-B5A4-49A012EB3DC2}"/>
+              </a:ext>
+            </a:extLst>
+          </p:cNvPr>
+          <p:cNvPicPr>
+            <a:picLocks noGrp="1" noChangeAspect="1"/>
+          </p:cNvPicPr>
+          <p:nvPr>
+            <p:ph type="pic" sz="quarter" idx="15"/>
+          </p:nvPr>
+        </p:nvPicPr>
+        <p:blipFill>
+          <a:blip r:embed="rId3">
+            <a:extLst>
+              <a:ext uri="{28A0092B-C50C-407E-A947-70E740481C1C}">
+                <a14:useLocalDpi xmlns:a14="http://schemas.microsoft.com/office/drawing/2010/main" val="0"/>
+              </a:ext>
+            </a:extLst>
+          </a:blip>
+          <a:srcRect/>
+          <a:stretch>
+            <a:fillRect/>
+          </a:stretch>
+        </p:blipFill>
+        <p:spPr>
+          <a:xfrm>
+            <a:off x="0" y="-32004"/>
+            <a:ext cx="12192000" cy="6912864"/>
+          </a:xfrm>
+        </p:spPr>
+      </p:pic>
+      <p:sp>
+        <p:nvSpPr>
+          <p:cNvPr id="21" name="Title 20">
+            <a:extLst>
+              <a:ext uri="{FF2B5EF4-FFF2-40B4-BE49-F238E27FC236}">
+                <a16:creationId xmlns:a16="http://schemas.microsoft.com/office/drawing/2014/main" id="{D4374B7E-EEDF-4C84-BE7C-BB50183825A0}"/>
+              </a:ext>
+            </a:extLst>
+          </p:cNvPr>
+          <p:cNvSpPr>
+            <a:spLocks noGrp="1"/>
+          </p:cNvSpPr>
+          <p:nvPr>
+            <p:ph type="title"/>
+          </p:nvPr>
+        </p:nvSpPr>
+        <p:spPr>
+          <a:xfrm>
+            <a:off x="2346356" y="128571"/>
+            <a:ext cx="7120094" cy="819150"/>
+          </a:xfrm>
+          <a:gradFill flip="none" rotWithShape="1">
+            <a:gsLst>
+              <a:gs pos="0">
+                <a:schemeClr val="accent1">
+                  <a:lumMod val="67000"/>
+                </a:schemeClr>
+              </a:gs>
+              <a:gs pos="48000">
+                <a:schemeClr val="accent1">
+                  <a:lumMod val="97000"/>
+                  <a:lumOff val="3000"/>
+                </a:schemeClr>
+              </a:gs>
+              <a:gs pos="100000">
+                <a:schemeClr val="accent1">
+                  <a:lumMod val="60000"/>
+                  <a:lumOff val="40000"/>
+                </a:schemeClr>
+              </a:gs>
+            </a:gsLst>
+            <a:lin ang="16200000" scaled="1"/>
+            <a:tileRect/>
+          </a:gradFill>
+          <a:ln>
+            <a:noFill/>
+          </a:ln>
+        </p:spPr>
+        <p:style>
+          <a:lnRef idx="0">
+            <a:scrgbClr r="0" g="0" b="0"/>
+          </a:lnRef>
+          <a:fillRef idx="0">
+            <a:scrgbClr r="0" g="0" b="0"/>
+          </a:fillRef>
+          <a:effectRef idx="0">
+            <a:scrgbClr r="0" g="0" b="0"/>
+          </a:effectRef>
+          <a:fontRef idx="minor">
+            <a:schemeClr val="lt1"/>
+          </a:fontRef>
+        </p:style>
+        <p:txBody>
+          <a:bodyPr anchor="ctr"/>
+          <a:lstStyle/>
+          <a:p>
+            <a:pPr algn="ctr"/>
+            <a:r>
+              <a:rPr lang="en-US" sz="6600" dirty="0">
+                <a:solidFill>
+                  <a:schemeClr val="bg1">
+                    <a:lumMod val="95000"/>
+                  </a:schemeClr>
+                </a:solidFill>
+              </a:rPr>
+              <a:t>PlantUML in Action</a:t>
+            </a:r>
+          </a:p>
+        </p:txBody>
+      </p:sp>
+      <p:sp>
+        <p:nvSpPr>
+          <p:cNvPr id="2" name="TextBox 1">
+            <a:extLst>
+              <a:ext uri="{FF2B5EF4-FFF2-40B4-BE49-F238E27FC236}">
+                <a16:creationId xmlns:a16="http://schemas.microsoft.com/office/drawing/2014/main" id="{BCB381F4-71C4-3080-500A-ADD1D9693A22}"/>
+              </a:ext>
+            </a:extLst>
+          </p:cNvPr>
+          <p:cNvSpPr txBox="1"/>
+          <p:nvPr/>
+        </p:nvSpPr>
+        <p:spPr>
+          <a:xfrm>
+            <a:off x="63778" y="544376"/>
+            <a:ext cx="1742785" cy="1323439"/>
+          </a:xfrm>
+          <a:prstGeom prst="rect">
+            <a:avLst/>
+          </a:prstGeom>
+          <a:noFill/>
+        </p:spPr>
+        <p:txBody>
+          <a:bodyPr wrap="none" rtlCol="0">
+            <a:spAutoFit/>
+          </a:bodyPr>
+          <a:lstStyle/>
+          <a:p>
+            <a:pPr algn="ctr"/>
+            <a:r>
+              <a:rPr lang="en-US" sz="8000" b="1" dirty="0">
+                <a:solidFill>
+                  <a:schemeClr val="tx1">
+                    <a:lumMod val="65000"/>
+                    <a:lumOff val="35000"/>
+                  </a:schemeClr>
+                </a:solidFill>
+                <a:effectLst>
+                  <a:outerShdw blurRad="38100" dist="38100" dir="2700000" algn="tl">
+                    <a:srgbClr val="000000">
+                      <a:alpha val="43137"/>
+                    </a:srgbClr>
+                  </a:outerShdw>
+                </a:effectLst>
+                <a:ea typeface="+mj-ea"/>
+                <a:cs typeface="+mj-cs"/>
+              </a:rPr>
+              <a:t>020</a:t>
+            </a:r>
+          </a:p>
+        </p:txBody>
+      </p:sp>
+      <p:grpSp>
+        <p:nvGrpSpPr>
+          <p:cNvPr id="6" name="Group 5">
+            <a:extLst>
+              <a:ext uri="{FF2B5EF4-FFF2-40B4-BE49-F238E27FC236}">
+                <a16:creationId xmlns:a16="http://schemas.microsoft.com/office/drawing/2014/main" id="{9D2C3B74-3F5D-CAAA-2D9B-BC4A520A9943}"/>
+              </a:ext>
+            </a:extLst>
+          </p:cNvPr>
+          <p:cNvGrpSpPr/>
+          <p:nvPr/>
+        </p:nvGrpSpPr>
+        <p:grpSpPr>
+          <a:xfrm>
+            <a:off x="140722" y="6221921"/>
+            <a:ext cx="2807208" cy="588020"/>
+            <a:chOff x="9034272" y="6189470"/>
+            <a:chExt cx="2807208" cy="588020"/>
+          </a:xfrm>
+        </p:grpSpPr>
+        <p:sp>
+          <p:nvSpPr>
+            <p:cNvPr id="7" name="Rectangle: Rounded Corners 6">
+              <a:extLst>
+                <a:ext uri="{FF2B5EF4-FFF2-40B4-BE49-F238E27FC236}">
+                  <a16:creationId xmlns:a16="http://schemas.microsoft.com/office/drawing/2014/main" id="{0010B690-7856-5EB1-2BF9-0C41CA3642A5}"/>
+                </a:ext>
+              </a:extLst>
+            </p:cNvPr>
+            <p:cNvSpPr/>
+            <p:nvPr/>
+          </p:nvSpPr>
+          <p:spPr>
+            <a:xfrm>
+              <a:off x="9034272" y="6189470"/>
+              <a:ext cx="2807208" cy="588020"/>
+            </a:xfrm>
+            <a:prstGeom prst="roundRect">
+              <a:avLst/>
+            </a:prstGeom>
+            <a:solidFill>
+              <a:schemeClr val="accent1">
+                <a:lumMod val="20000"/>
+                <a:lumOff val="80000"/>
+              </a:schemeClr>
+            </a:solidFill>
+            <a:ln>
+              <a:noFill/>
+            </a:ln>
+          </p:spPr>
+          <p:style>
+            <a:lnRef idx="2">
+              <a:schemeClr val="accent1">
+                <a:shade val="15000"/>
+              </a:schemeClr>
+            </a:lnRef>
+            <a:fillRef idx="1">
+              <a:schemeClr val="accent1"/>
+            </a:fillRef>
+            <a:effectRef idx="0">
+              <a:schemeClr val="accent1"/>
+            </a:effectRef>
+            <a:fontRef idx="minor">
+              <a:schemeClr val="lt1"/>
+            </a:fontRef>
+          </p:style>
+          <p:txBody>
+            <a:bodyPr rtlCol="0" anchor="ctr"/>
+            <a:lstStyle/>
+            <a:p>
+              <a:pPr algn="r"/>
+              <a:r>
+                <a:rPr lang="en-US" sz="1200" dirty="0">
+                  <a:ln w="0"/>
+                  <a:solidFill>
+                    <a:schemeClr val="tx1"/>
+                  </a:solidFill>
+                  <a:effectLst>
+                    <a:outerShdw blurRad="38100" dist="19050" dir="2700000" algn="tl" rotWithShape="0">
+                      <a:schemeClr val="dk1">
+                        <a:alpha val="40000"/>
+                      </a:schemeClr>
+                    </a:outerShdw>
+                  </a:effectLst>
+                </a:rPr>
+                <a:t>Yasen – Enterprise Architecture</a:t>
+              </a:r>
+            </a:p>
+            <a:p>
+              <a:pPr algn="r"/>
+              <a:r>
+                <a:rPr lang="en-US" sz="1200" dirty="0">
+                  <a:ln w="0"/>
+                  <a:solidFill>
+                    <a:schemeClr val="tx1"/>
+                  </a:solidFill>
+                  <a:effectLst>
+                    <a:outerShdw blurRad="38100" dist="19050" dir="2700000" algn="tl" rotWithShape="0">
+                      <a:schemeClr val="dk1">
+                        <a:alpha val="40000"/>
+                      </a:schemeClr>
+                    </a:outerShdw>
+                  </a:effectLst>
+                </a:rPr>
+                <a:t>YouTube: @yasenzhao</a:t>
+              </a:r>
+            </a:p>
+          </p:txBody>
+        </p:sp>
+        <p:pic>
+          <p:nvPicPr>
+            <p:cNvPr id="8" name="Picture 7">
+              <a:extLst>
+                <a:ext uri="{FF2B5EF4-FFF2-40B4-BE49-F238E27FC236}">
+                  <a16:creationId xmlns:a16="http://schemas.microsoft.com/office/drawing/2014/main" id="{574298EC-4397-D1B2-D733-593141A52CEB}"/>
+                </a:ext>
+              </a:extLst>
+            </p:cNvPr>
+            <p:cNvPicPr>
+              <a:picLocks noChangeAspect="1"/>
+            </p:cNvPicPr>
+            <p:nvPr/>
+          </p:nvPicPr>
+          <p:blipFill>
+            <a:blip r:embed="rId4">
+              <a:clrChange>
+                <a:clrFrom>
+                  <a:srgbClr val="FFFFFF"/>
+                </a:clrFrom>
+                <a:clrTo>
+                  <a:srgbClr val="FFFFFF">
+                    <a:alpha val="0"/>
+                  </a:srgbClr>
+                </a:clrTo>
+              </a:clrChange>
+            </a:blip>
+            <a:stretch>
+              <a:fillRect/>
+            </a:stretch>
+          </p:blipFill>
+          <p:spPr>
+            <a:xfrm>
+              <a:off x="9187981" y="6196988"/>
+              <a:ext cx="557286" cy="572984"/>
+            </a:xfrm>
+            <a:prstGeom prst="rect">
+              <a:avLst/>
+            </a:prstGeom>
+          </p:spPr>
+        </p:pic>
+      </p:grpSp>
+      <p:sp>
+        <p:nvSpPr>
+          <p:cNvPr id="11" name="Text Placeholder 10">
+            <a:extLst>
+              <a:ext uri="{FF2B5EF4-FFF2-40B4-BE49-F238E27FC236}">
+                <a16:creationId xmlns:a16="http://schemas.microsoft.com/office/drawing/2014/main" id="{35F1FC23-8B59-9603-A7DF-2732C830F2A2}"/>
+              </a:ext>
+            </a:extLst>
+          </p:cNvPr>
+          <p:cNvSpPr>
+            <a:spLocks noGrp="1"/>
+          </p:cNvSpPr>
+          <p:nvPr>
+            <p:ph type="body" sz="quarter" idx="14"/>
+          </p:nvPr>
+        </p:nvSpPr>
+        <p:spPr>
+          <a:xfrm>
+            <a:off x="3220161" y="6400799"/>
+            <a:ext cx="8428913" cy="401623"/>
+          </a:xfrm>
+        </p:spPr>
+        <p:txBody>
+          <a:bodyPr anchor="ctr">
+            <a:noAutofit/>
+          </a:bodyPr>
+          <a:lstStyle/>
+          <a:p>
+            <a:pPr>
+              <a:lnSpc>
+                <a:spcPct val="120000"/>
+              </a:lnSpc>
+            </a:pPr>
+            <a:r>
+              <a:rPr lang="en-US" sz="2400" dirty="0"/>
+              <a:t>GitHub: </a:t>
+            </a:r>
+            <a:r>
+              <a:rPr lang="en-US" sz="2400" dirty="0">
+                <a:hlinkClick r:id="rId5"/>
+              </a:rPr>
+              <a:t>https://github.com/yasenstar/PlantUML_in_Action</a:t>
+            </a:r>
+            <a:endParaRPr lang="en-US" sz="2400" dirty="0"/>
+          </a:p>
+        </p:txBody>
+      </p:sp>
+      <p:sp>
+        <p:nvSpPr>
+          <p:cNvPr id="12" name="Title 20">
+            <a:extLst>
+              <a:ext uri="{FF2B5EF4-FFF2-40B4-BE49-F238E27FC236}">
+                <a16:creationId xmlns:a16="http://schemas.microsoft.com/office/drawing/2014/main" id="{0CA82506-B712-27A8-0AC7-E2C48FCA049F}"/>
+              </a:ext>
+            </a:extLst>
+          </p:cNvPr>
+          <p:cNvSpPr txBox="1">
+            <a:spLocks/>
+          </p:cNvSpPr>
+          <p:nvPr/>
+        </p:nvSpPr>
+        <p:spPr>
+          <a:xfrm>
+            <a:off x="2571750" y="1031627"/>
+            <a:ext cx="8820150" cy="1289457"/>
+          </a:xfrm>
+          <a:prstGeom prst="rect">
+            <a:avLst/>
+          </a:prstGeom>
+          <a:solidFill>
+            <a:srgbClr val="EDF3DB">
+              <a:alpha val="50196"/>
+            </a:srgbClr>
+          </a:solidFill>
+        </p:spPr>
+        <p:txBody>
+          <a:bodyPr vert="horz" lIns="91440" tIns="45720" rIns="91440" bIns="45720" rtlCol="0" anchor="ctr">
+            <a:normAutofit lnSpcReduction="10000"/>
+          </a:bodyPr>
+          <a:lstStyle>
+            <a:lvl1pPr algn="l" defTabSz="914400" rtl="0" eaLnBrk="1" latinLnBrk="0" hangingPunct="1">
+              <a:lnSpc>
+                <a:spcPct val="90000"/>
+              </a:lnSpc>
+              <a:spcBef>
+                <a:spcPct val="0"/>
+              </a:spcBef>
+              <a:buNone/>
+              <a:defRPr sz="8200" b="1" kern="1200">
+                <a:solidFill>
+                  <a:schemeClr val="tx1">
+                    <a:lumMod val="65000"/>
+                    <a:lumOff val="35000"/>
+                  </a:schemeClr>
+                </a:solidFill>
+                <a:effectLst>
+                  <a:outerShdw blurRad="38100" dist="38100" dir="2700000" algn="tl">
+                    <a:srgbClr val="000000">
+                      <a:alpha val="43137"/>
+                    </a:srgbClr>
+                  </a:outerShdw>
+                </a:effectLst>
+                <a:latin typeface="+mn-lt"/>
+                <a:ea typeface="+mj-ea"/>
+                <a:cs typeface="+mj-cs"/>
+              </a:defRPr>
+            </a:lvl1pPr>
+          </a:lstStyle>
+          <a:p>
+            <a:r>
+              <a:rPr lang="en-US" sz="5400" dirty="0"/>
+              <a:t>1. Sequence Diagram</a:t>
+            </a:r>
+          </a:p>
+          <a:p>
+            <a:r>
+              <a:rPr lang="en-US" sz="3600" dirty="0"/>
+              <a:t>1.27 Participant Creation</a:t>
+            </a:r>
+            <a:endParaRPr lang="en-US" sz="5400" dirty="0"/>
+          </a:p>
+        </p:txBody>
+      </p:sp>
+      <p:pic>
+        <p:nvPicPr>
+          <p:cNvPr id="20" name="Picture 19">
+            <a:extLst>
+              <a:ext uri="{FF2B5EF4-FFF2-40B4-BE49-F238E27FC236}">
+                <a16:creationId xmlns:a16="http://schemas.microsoft.com/office/drawing/2014/main" id="{89D0C9AB-2794-9767-5B5A-4CDC46E6E000}"/>
+              </a:ext>
+            </a:extLst>
+          </p:cNvPr>
+          <p:cNvPicPr>
+            <a:picLocks noChangeAspect="1"/>
+          </p:cNvPicPr>
+          <p:nvPr/>
+        </p:nvPicPr>
+        <p:blipFill>
+          <a:blip r:embed="rId6"/>
+          <a:stretch>
+            <a:fillRect/>
+          </a:stretch>
+        </p:blipFill>
+        <p:spPr>
+          <a:xfrm>
+            <a:off x="73819" y="2167128"/>
+            <a:ext cx="2313601" cy="2143125"/>
+          </a:xfrm>
+          <a:prstGeom prst="rect">
+            <a:avLst/>
+          </a:prstGeom>
+          <a:ln>
+            <a:noFill/>
+          </a:ln>
+          <a:effectLst>
+            <a:softEdge rad="112500"/>
+          </a:effectLst>
+        </p:spPr>
+      </p:pic>
+      <p:pic>
+        <p:nvPicPr>
+          <p:cNvPr id="4" name="Picture 3">
+            <a:extLst>
+              <a:ext uri="{FF2B5EF4-FFF2-40B4-BE49-F238E27FC236}">
+                <a16:creationId xmlns:a16="http://schemas.microsoft.com/office/drawing/2014/main" id="{70954E7E-32F0-C07A-2B39-60FE5D2880C7}"/>
+              </a:ext>
+            </a:extLst>
+          </p:cNvPr>
+          <p:cNvPicPr>
+            <a:picLocks noChangeAspect="1"/>
+          </p:cNvPicPr>
+          <p:nvPr/>
+        </p:nvPicPr>
+        <p:blipFill>
+          <a:blip r:embed="rId7"/>
+          <a:stretch>
+            <a:fillRect/>
+          </a:stretch>
+        </p:blipFill>
+        <p:spPr>
+          <a:xfrm>
+            <a:off x="8974619" y="3232208"/>
+            <a:ext cx="2995612" cy="2078588"/>
+          </a:xfrm>
+          <a:prstGeom prst="rect">
+            <a:avLst/>
+          </a:prstGeom>
+          <a:ln>
+            <a:noFill/>
+          </a:ln>
+          <a:effectLst>
+            <a:outerShdw blurRad="292100" dist="139700" dir="2700000" algn="tl" rotWithShape="0">
+              <a:srgbClr val="333333">
+                <a:alpha val="65000"/>
+              </a:srgbClr>
+            </a:outerShdw>
+          </a:effectLst>
+        </p:spPr>
+      </p:pic>
+      <p:pic>
+        <p:nvPicPr>
+          <p:cNvPr id="9" name="Picture 8">
+            <a:extLst>
+              <a:ext uri="{FF2B5EF4-FFF2-40B4-BE49-F238E27FC236}">
+                <a16:creationId xmlns:a16="http://schemas.microsoft.com/office/drawing/2014/main" id="{DD0A16F4-9C49-F637-00D6-52BF4E94FBF2}"/>
+              </a:ext>
+            </a:extLst>
+          </p:cNvPr>
+          <p:cNvPicPr>
+            <a:picLocks noChangeAspect="1"/>
+          </p:cNvPicPr>
+          <p:nvPr/>
+        </p:nvPicPr>
+        <p:blipFill>
+          <a:blip r:embed="rId8"/>
+          <a:stretch>
+            <a:fillRect/>
+          </a:stretch>
+        </p:blipFill>
+        <p:spPr>
+          <a:xfrm>
+            <a:off x="3217382" y="2455717"/>
+            <a:ext cx="5193193" cy="3874744"/>
+          </a:xfrm>
+          <a:prstGeom prst="rect">
+            <a:avLst/>
+          </a:prstGeom>
+          <a:ln>
+            <a:noFill/>
+          </a:ln>
+          <a:effectLst>
+            <a:outerShdw blurRad="292100" dist="139700" dir="2700000" algn="tl" rotWithShape="0">
+              <a:srgbClr val="333333">
+                <a:alpha val="65000"/>
+              </a:srgbClr>
+            </a:outerShdw>
+          </a:effectLst>
+        </p:spPr>
+      </p:pic>
+    </p:spTree>
+    <p:extLst>
+      <p:ext uri="{BB962C8B-B14F-4D97-AF65-F5344CB8AC3E}">
+        <p14:creationId xmlns:p14="http://schemas.microsoft.com/office/powerpoint/2010/main" val="3040369798"/>
+      </p:ext>
+    </p:extLst>
+  </p:cSld>
+  <p:clrMapOvr>
+    <a:masterClrMapping/>
+  </p:clrMapOvr>
+</p:sld>
+</file>
+
+<file path=ppt/slides/slide23.xml><?xml version="1.0" encoding="utf-8"?>
+<p:sld xmlns:a="http://schemas.openxmlformats.org/drawingml/2006/main" xmlns:r="http://schemas.openxmlformats.org/officeDocument/2006/relationships" xmlns:p="http://schemas.openxmlformats.org/presentationml/2006/main">
+  <p:cSld>
+    <p:spTree>
+      <p:nvGrpSpPr>
+        <p:cNvPr id="1" name=""/>
+        <p:cNvGrpSpPr/>
+        <p:nvPr/>
+      </p:nvGrpSpPr>
+      <p:grpSpPr>
+        <a:xfrm>
+          <a:off x="0" y="0"/>
+          <a:ext cx="0" cy="0"/>
+          <a:chOff x="0" y="0"/>
+          <a:chExt cx="0" cy="0"/>
+        </a:xfrm>
+      </p:grpSpPr>
+      <p:pic>
+        <p:nvPicPr>
+          <p:cNvPr id="18" name="Picture Placeholder 17" descr="Learn to Draw Background">
+            <a:extLst>
+              <a:ext uri="{FF2B5EF4-FFF2-40B4-BE49-F238E27FC236}">
+                <a16:creationId xmlns:a16="http://schemas.microsoft.com/office/drawing/2014/main" id="{7FD9C5C0-919A-48C6-B5A4-49A012EB3DC2}"/>
+              </a:ext>
+            </a:extLst>
+          </p:cNvPr>
+          <p:cNvPicPr>
+            <a:picLocks noGrp="1" noChangeAspect="1"/>
+          </p:cNvPicPr>
+          <p:nvPr>
+            <p:ph type="pic" sz="quarter" idx="15"/>
+          </p:nvPr>
+        </p:nvPicPr>
+        <p:blipFill>
+          <a:blip r:embed="rId3">
+            <a:extLst>
+              <a:ext uri="{28A0092B-C50C-407E-A947-70E740481C1C}">
+                <a14:useLocalDpi xmlns:a14="http://schemas.microsoft.com/office/drawing/2010/main" val="0"/>
+              </a:ext>
+            </a:extLst>
+          </a:blip>
+          <a:srcRect/>
+          <a:stretch>
+            <a:fillRect/>
+          </a:stretch>
+        </p:blipFill>
+        <p:spPr>
+          <a:xfrm>
+            <a:off x="0" y="-32004"/>
+            <a:ext cx="12192000" cy="6912864"/>
+          </a:xfrm>
+        </p:spPr>
+      </p:pic>
+      <p:sp>
+        <p:nvSpPr>
+          <p:cNvPr id="21" name="Title 20">
+            <a:extLst>
+              <a:ext uri="{FF2B5EF4-FFF2-40B4-BE49-F238E27FC236}">
+                <a16:creationId xmlns:a16="http://schemas.microsoft.com/office/drawing/2014/main" id="{D4374B7E-EEDF-4C84-BE7C-BB50183825A0}"/>
+              </a:ext>
+            </a:extLst>
+          </p:cNvPr>
+          <p:cNvSpPr>
+            <a:spLocks noGrp="1"/>
+          </p:cNvSpPr>
+          <p:nvPr>
+            <p:ph type="title"/>
+          </p:nvPr>
+        </p:nvSpPr>
+        <p:spPr>
+          <a:xfrm>
+            <a:off x="2346356" y="128571"/>
+            <a:ext cx="7120094" cy="819150"/>
+          </a:xfrm>
+          <a:gradFill flip="none" rotWithShape="1">
+            <a:gsLst>
+              <a:gs pos="0">
+                <a:schemeClr val="accent1">
+                  <a:lumMod val="67000"/>
+                </a:schemeClr>
+              </a:gs>
+              <a:gs pos="48000">
+                <a:schemeClr val="accent1">
+                  <a:lumMod val="97000"/>
+                  <a:lumOff val="3000"/>
+                </a:schemeClr>
+              </a:gs>
+              <a:gs pos="100000">
+                <a:schemeClr val="accent1">
+                  <a:lumMod val="60000"/>
+                  <a:lumOff val="40000"/>
+                </a:schemeClr>
+              </a:gs>
+            </a:gsLst>
+            <a:lin ang="16200000" scaled="1"/>
+            <a:tileRect/>
+          </a:gradFill>
+          <a:ln>
+            <a:noFill/>
+          </a:ln>
+        </p:spPr>
+        <p:style>
+          <a:lnRef idx="0">
+            <a:scrgbClr r="0" g="0" b="0"/>
+          </a:lnRef>
+          <a:fillRef idx="0">
+            <a:scrgbClr r="0" g="0" b="0"/>
+          </a:fillRef>
+          <a:effectRef idx="0">
+            <a:scrgbClr r="0" g="0" b="0"/>
+          </a:effectRef>
+          <a:fontRef idx="minor">
+            <a:schemeClr val="lt1"/>
+          </a:fontRef>
+        </p:style>
+        <p:txBody>
+          <a:bodyPr anchor="ctr"/>
+          <a:lstStyle/>
+          <a:p>
+            <a:pPr algn="ctr"/>
+            <a:r>
+              <a:rPr lang="en-US" sz="6600" dirty="0">
+                <a:solidFill>
+                  <a:schemeClr val="bg1">
+                    <a:lumMod val="95000"/>
+                  </a:schemeClr>
+                </a:solidFill>
+              </a:rPr>
+              <a:t>PlantUML in Action</a:t>
+            </a:r>
+          </a:p>
+        </p:txBody>
+      </p:sp>
+      <p:sp>
+        <p:nvSpPr>
+          <p:cNvPr id="2" name="TextBox 1">
+            <a:extLst>
+              <a:ext uri="{FF2B5EF4-FFF2-40B4-BE49-F238E27FC236}">
+                <a16:creationId xmlns:a16="http://schemas.microsoft.com/office/drawing/2014/main" id="{BCB381F4-71C4-3080-500A-ADD1D9693A22}"/>
+              </a:ext>
+            </a:extLst>
+          </p:cNvPr>
+          <p:cNvSpPr txBox="1"/>
+          <p:nvPr/>
+        </p:nvSpPr>
+        <p:spPr>
+          <a:xfrm>
+            <a:off x="63778" y="544376"/>
+            <a:ext cx="1742785" cy="1323439"/>
+          </a:xfrm>
+          <a:prstGeom prst="rect">
+            <a:avLst/>
+          </a:prstGeom>
+          <a:noFill/>
+        </p:spPr>
+        <p:txBody>
+          <a:bodyPr wrap="none" rtlCol="0">
+            <a:spAutoFit/>
+          </a:bodyPr>
+          <a:lstStyle/>
+          <a:p>
+            <a:pPr algn="ctr"/>
+            <a:r>
+              <a:rPr lang="en-US" sz="8000" b="1" dirty="0">
+                <a:solidFill>
+                  <a:schemeClr val="tx1">
+                    <a:lumMod val="65000"/>
+                    <a:lumOff val="35000"/>
+                  </a:schemeClr>
+                </a:solidFill>
+                <a:effectLst>
+                  <a:outerShdw blurRad="38100" dist="38100" dir="2700000" algn="tl">
+                    <a:srgbClr val="000000">
+                      <a:alpha val="43137"/>
+                    </a:srgbClr>
+                  </a:outerShdw>
+                </a:effectLst>
+                <a:ea typeface="+mj-ea"/>
+                <a:cs typeface="+mj-cs"/>
+              </a:rPr>
+              <a:t>021</a:t>
+            </a:r>
+          </a:p>
+        </p:txBody>
+      </p:sp>
+      <p:grpSp>
+        <p:nvGrpSpPr>
+          <p:cNvPr id="6" name="Group 5">
+            <a:extLst>
+              <a:ext uri="{FF2B5EF4-FFF2-40B4-BE49-F238E27FC236}">
+                <a16:creationId xmlns:a16="http://schemas.microsoft.com/office/drawing/2014/main" id="{9D2C3B74-3F5D-CAAA-2D9B-BC4A520A9943}"/>
+              </a:ext>
+            </a:extLst>
+          </p:cNvPr>
+          <p:cNvGrpSpPr/>
+          <p:nvPr/>
+        </p:nvGrpSpPr>
+        <p:grpSpPr>
+          <a:xfrm>
+            <a:off x="140722" y="6221921"/>
+            <a:ext cx="2807208" cy="588020"/>
+            <a:chOff x="9034272" y="6189470"/>
+            <a:chExt cx="2807208" cy="588020"/>
+          </a:xfrm>
+        </p:grpSpPr>
+        <p:sp>
+          <p:nvSpPr>
+            <p:cNvPr id="7" name="Rectangle: Rounded Corners 6">
+              <a:extLst>
+                <a:ext uri="{FF2B5EF4-FFF2-40B4-BE49-F238E27FC236}">
+                  <a16:creationId xmlns:a16="http://schemas.microsoft.com/office/drawing/2014/main" id="{0010B690-7856-5EB1-2BF9-0C41CA3642A5}"/>
+                </a:ext>
+              </a:extLst>
+            </p:cNvPr>
+            <p:cNvSpPr/>
+            <p:nvPr/>
+          </p:nvSpPr>
+          <p:spPr>
+            <a:xfrm>
+              <a:off x="9034272" y="6189470"/>
+              <a:ext cx="2807208" cy="588020"/>
+            </a:xfrm>
+            <a:prstGeom prst="roundRect">
+              <a:avLst/>
+            </a:prstGeom>
+            <a:solidFill>
+              <a:schemeClr val="accent1">
+                <a:lumMod val="20000"/>
+                <a:lumOff val="80000"/>
+              </a:schemeClr>
+            </a:solidFill>
+            <a:ln>
+              <a:noFill/>
+            </a:ln>
+          </p:spPr>
+          <p:style>
+            <a:lnRef idx="2">
+              <a:schemeClr val="accent1">
+                <a:shade val="15000"/>
+              </a:schemeClr>
+            </a:lnRef>
+            <a:fillRef idx="1">
+              <a:schemeClr val="accent1"/>
+            </a:fillRef>
+            <a:effectRef idx="0">
+              <a:schemeClr val="accent1"/>
+            </a:effectRef>
+            <a:fontRef idx="minor">
+              <a:schemeClr val="lt1"/>
+            </a:fontRef>
+          </p:style>
+          <p:txBody>
+            <a:bodyPr rtlCol="0" anchor="ctr"/>
+            <a:lstStyle/>
+            <a:p>
+              <a:pPr algn="r"/>
+              <a:r>
+                <a:rPr lang="en-US" sz="1200" dirty="0">
+                  <a:ln w="0"/>
+                  <a:solidFill>
+                    <a:schemeClr val="tx1"/>
+                  </a:solidFill>
+                  <a:effectLst>
+                    <a:outerShdw blurRad="38100" dist="19050" dir="2700000" algn="tl" rotWithShape="0">
+                      <a:schemeClr val="dk1">
+                        <a:alpha val="40000"/>
+                      </a:schemeClr>
+                    </a:outerShdw>
+                  </a:effectLst>
+                </a:rPr>
+                <a:t>Yasen – Enterprise Architecture</a:t>
+              </a:r>
+            </a:p>
+            <a:p>
+              <a:pPr algn="r"/>
+              <a:r>
+                <a:rPr lang="en-US" sz="1200" dirty="0">
+                  <a:ln w="0"/>
+                  <a:solidFill>
+                    <a:schemeClr val="tx1"/>
+                  </a:solidFill>
+                  <a:effectLst>
+                    <a:outerShdw blurRad="38100" dist="19050" dir="2700000" algn="tl" rotWithShape="0">
+                      <a:schemeClr val="dk1">
+                        <a:alpha val="40000"/>
+                      </a:schemeClr>
+                    </a:outerShdw>
+                  </a:effectLst>
+                </a:rPr>
+                <a:t>YouTube: @yasenzhao</a:t>
+              </a:r>
+            </a:p>
+          </p:txBody>
+        </p:sp>
+        <p:pic>
+          <p:nvPicPr>
+            <p:cNvPr id="8" name="Picture 7">
+              <a:extLst>
+                <a:ext uri="{FF2B5EF4-FFF2-40B4-BE49-F238E27FC236}">
+                  <a16:creationId xmlns:a16="http://schemas.microsoft.com/office/drawing/2014/main" id="{574298EC-4397-D1B2-D733-593141A52CEB}"/>
+                </a:ext>
+              </a:extLst>
+            </p:cNvPr>
+            <p:cNvPicPr>
+              <a:picLocks noChangeAspect="1"/>
+            </p:cNvPicPr>
+            <p:nvPr/>
+          </p:nvPicPr>
+          <p:blipFill>
+            <a:blip r:embed="rId4">
+              <a:clrChange>
+                <a:clrFrom>
+                  <a:srgbClr val="FFFFFF"/>
+                </a:clrFrom>
+                <a:clrTo>
+                  <a:srgbClr val="FFFFFF">
+                    <a:alpha val="0"/>
+                  </a:srgbClr>
+                </a:clrTo>
+              </a:clrChange>
+            </a:blip>
+            <a:stretch>
+              <a:fillRect/>
+            </a:stretch>
+          </p:blipFill>
+          <p:spPr>
+            <a:xfrm>
+              <a:off x="9187981" y="6196988"/>
+              <a:ext cx="557286" cy="572984"/>
+            </a:xfrm>
+            <a:prstGeom prst="rect">
+              <a:avLst/>
+            </a:prstGeom>
+          </p:spPr>
+        </p:pic>
+      </p:grpSp>
+      <p:sp>
+        <p:nvSpPr>
+          <p:cNvPr id="11" name="Text Placeholder 10">
+            <a:extLst>
+              <a:ext uri="{FF2B5EF4-FFF2-40B4-BE49-F238E27FC236}">
+                <a16:creationId xmlns:a16="http://schemas.microsoft.com/office/drawing/2014/main" id="{35F1FC23-8B59-9603-A7DF-2732C830F2A2}"/>
+              </a:ext>
+            </a:extLst>
+          </p:cNvPr>
+          <p:cNvSpPr>
+            <a:spLocks noGrp="1"/>
+          </p:cNvSpPr>
+          <p:nvPr>
+            <p:ph type="body" sz="quarter" idx="14"/>
+          </p:nvPr>
+        </p:nvSpPr>
+        <p:spPr>
+          <a:xfrm>
+            <a:off x="3220161" y="6400799"/>
+            <a:ext cx="8428913" cy="401623"/>
+          </a:xfrm>
+        </p:spPr>
+        <p:txBody>
+          <a:bodyPr anchor="ctr">
+            <a:noAutofit/>
+          </a:bodyPr>
+          <a:lstStyle/>
+          <a:p>
+            <a:pPr>
+              <a:lnSpc>
+                <a:spcPct val="120000"/>
+              </a:lnSpc>
+            </a:pPr>
+            <a:r>
+              <a:rPr lang="en-US" sz="2400" dirty="0"/>
+              <a:t>GitHub: </a:t>
+            </a:r>
+            <a:r>
+              <a:rPr lang="en-US" sz="2400" dirty="0">
+                <a:hlinkClick r:id="rId5"/>
+              </a:rPr>
+              <a:t>https://github.com/yasenstar/PlantUML_in_Action</a:t>
+            </a:r>
+            <a:endParaRPr lang="en-US" sz="2400" dirty="0"/>
+          </a:p>
+        </p:txBody>
+      </p:sp>
+      <p:sp>
+        <p:nvSpPr>
+          <p:cNvPr id="12" name="Title 20">
+            <a:extLst>
+              <a:ext uri="{FF2B5EF4-FFF2-40B4-BE49-F238E27FC236}">
+                <a16:creationId xmlns:a16="http://schemas.microsoft.com/office/drawing/2014/main" id="{0CA82506-B712-27A8-0AC7-E2C48FCA049F}"/>
+              </a:ext>
+            </a:extLst>
+          </p:cNvPr>
+          <p:cNvSpPr txBox="1">
+            <a:spLocks/>
+          </p:cNvSpPr>
+          <p:nvPr/>
+        </p:nvSpPr>
+        <p:spPr>
+          <a:xfrm>
+            <a:off x="2571750" y="1031627"/>
+            <a:ext cx="8820150" cy="1289457"/>
+          </a:xfrm>
+          <a:prstGeom prst="rect">
+            <a:avLst/>
+          </a:prstGeom>
+          <a:solidFill>
+            <a:srgbClr val="EDF3DB">
+              <a:alpha val="50196"/>
+            </a:srgbClr>
+          </a:solidFill>
+        </p:spPr>
+        <p:txBody>
+          <a:bodyPr vert="horz" lIns="91440" tIns="45720" rIns="91440" bIns="45720" rtlCol="0" anchor="ctr">
+            <a:normAutofit lnSpcReduction="10000"/>
+          </a:bodyPr>
+          <a:lstStyle>
+            <a:lvl1pPr algn="l" defTabSz="914400" rtl="0" eaLnBrk="1" latinLnBrk="0" hangingPunct="1">
+              <a:lnSpc>
+                <a:spcPct val="90000"/>
+              </a:lnSpc>
+              <a:spcBef>
+                <a:spcPct val="0"/>
+              </a:spcBef>
+              <a:buNone/>
+              <a:defRPr sz="8200" b="1" kern="1200">
+                <a:solidFill>
+                  <a:schemeClr val="tx1">
+                    <a:lumMod val="65000"/>
+                    <a:lumOff val="35000"/>
+                  </a:schemeClr>
+                </a:solidFill>
+                <a:effectLst>
+                  <a:outerShdw blurRad="38100" dist="38100" dir="2700000" algn="tl">
+                    <a:srgbClr val="000000">
+                      <a:alpha val="43137"/>
+                    </a:srgbClr>
+                  </a:outerShdw>
+                </a:effectLst>
+                <a:latin typeface="+mn-lt"/>
+                <a:ea typeface="+mj-ea"/>
+                <a:cs typeface="+mj-cs"/>
+              </a:defRPr>
+            </a:lvl1pPr>
+          </a:lstStyle>
+          <a:p>
+            <a:r>
+              <a:rPr lang="en-US" sz="5400" dirty="0"/>
+              <a:t>1. Sequence Diagram</a:t>
+            </a:r>
+          </a:p>
+          <a:p>
+            <a:r>
+              <a:rPr lang="en-US" sz="3600" dirty="0"/>
+              <a:t>1.28 Shortcut Syntax</a:t>
+            </a:r>
+            <a:endParaRPr lang="en-US" sz="5400" dirty="0"/>
+          </a:p>
+        </p:txBody>
+      </p:sp>
+      <p:pic>
+        <p:nvPicPr>
+          <p:cNvPr id="20" name="Picture 19">
+            <a:extLst>
+              <a:ext uri="{FF2B5EF4-FFF2-40B4-BE49-F238E27FC236}">
+                <a16:creationId xmlns:a16="http://schemas.microsoft.com/office/drawing/2014/main" id="{89D0C9AB-2794-9767-5B5A-4CDC46E6E000}"/>
+              </a:ext>
+            </a:extLst>
+          </p:cNvPr>
+          <p:cNvPicPr>
+            <a:picLocks noChangeAspect="1"/>
+          </p:cNvPicPr>
+          <p:nvPr/>
+        </p:nvPicPr>
+        <p:blipFill>
+          <a:blip r:embed="rId6"/>
+          <a:stretch>
+            <a:fillRect/>
+          </a:stretch>
+        </p:blipFill>
+        <p:spPr>
+          <a:xfrm>
+            <a:off x="73819" y="2167128"/>
+            <a:ext cx="2313601" cy="2143125"/>
+          </a:xfrm>
+          <a:prstGeom prst="rect">
+            <a:avLst/>
+          </a:prstGeom>
+          <a:ln>
+            <a:noFill/>
+          </a:ln>
+          <a:effectLst>
+            <a:softEdge rad="112500"/>
+          </a:effectLst>
+        </p:spPr>
+      </p:pic>
+      <p:pic>
+        <p:nvPicPr>
+          <p:cNvPr id="15" name="Picture 14">
+            <a:extLst>
+              <a:ext uri="{FF2B5EF4-FFF2-40B4-BE49-F238E27FC236}">
+                <a16:creationId xmlns:a16="http://schemas.microsoft.com/office/drawing/2014/main" id="{F0A04392-8DBC-3D8D-1677-910A01DAEBDD}"/>
+              </a:ext>
+            </a:extLst>
+          </p:cNvPr>
+          <p:cNvPicPr>
+            <a:picLocks noChangeAspect="1"/>
+          </p:cNvPicPr>
+          <p:nvPr/>
+        </p:nvPicPr>
+        <p:blipFill>
+          <a:blip r:embed="rId7"/>
+          <a:stretch>
+            <a:fillRect/>
+          </a:stretch>
+        </p:blipFill>
+        <p:spPr>
+          <a:xfrm>
+            <a:off x="2701241" y="3064394"/>
+            <a:ext cx="7099984" cy="3018759"/>
+          </a:xfrm>
+          <a:prstGeom prst="rect">
+            <a:avLst/>
+          </a:prstGeom>
+          <a:ln>
+            <a:noFill/>
+          </a:ln>
+          <a:effectLst>
+            <a:outerShdw blurRad="292100" dist="139700" dir="2700000" algn="tl" rotWithShape="0">
+              <a:srgbClr val="333333">
+                <a:alpha val="65000"/>
+              </a:srgbClr>
+            </a:outerShdw>
+          </a:effectLst>
+        </p:spPr>
+      </p:pic>
+      <p:pic>
+        <p:nvPicPr>
+          <p:cNvPr id="5" name="Picture 4">
+            <a:extLst>
+              <a:ext uri="{FF2B5EF4-FFF2-40B4-BE49-F238E27FC236}">
+                <a16:creationId xmlns:a16="http://schemas.microsoft.com/office/drawing/2014/main" id="{D074D02E-7A03-7D82-9B5B-B81D8CFF3433}"/>
+              </a:ext>
+            </a:extLst>
+          </p:cNvPr>
+          <p:cNvPicPr>
+            <a:picLocks noChangeAspect="1"/>
+          </p:cNvPicPr>
+          <p:nvPr/>
+        </p:nvPicPr>
+        <p:blipFill>
+          <a:blip r:embed="rId8"/>
+          <a:stretch>
+            <a:fillRect/>
+          </a:stretch>
+        </p:blipFill>
+        <p:spPr>
+          <a:xfrm>
+            <a:off x="7748587" y="2513177"/>
+            <a:ext cx="1114425" cy="1743075"/>
+          </a:xfrm>
+          <a:prstGeom prst="rect">
+            <a:avLst/>
+          </a:prstGeom>
+          <a:ln>
+            <a:noFill/>
+          </a:ln>
+          <a:effectLst>
+            <a:outerShdw blurRad="292100" dist="139700" dir="2700000" algn="tl" rotWithShape="0">
+              <a:srgbClr val="333333">
+                <a:alpha val="65000"/>
+              </a:srgbClr>
+            </a:outerShdw>
+          </a:effectLst>
+        </p:spPr>
+      </p:pic>
+      <p:pic>
+        <p:nvPicPr>
+          <p:cNvPr id="13" name="Picture 12">
+            <a:extLst>
+              <a:ext uri="{FF2B5EF4-FFF2-40B4-BE49-F238E27FC236}">
+                <a16:creationId xmlns:a16="http://schemas.microsoft.com/office/drawing/2014/main" id="{1E736733-CEFC-0457-D8F7-0C5EE7C672C9}"/>
+              </a:ext>
+            </a:extLst>
+          </p:cNvPr>
+          <p:cNvPicPr>
+            <a:picLocks noChangeAspect="1"/>
+          </p:cNvPicPr>
+          <p:nvPr/>
+        </p:nvPicPr>
+        <p:blipFill>
+          <a:blip r:embed="rId9"/>
+          <a:stretch>
+            <a:fillRect/>
+          </a:stretch>
+        </p:blipFill>
+        <p:spPr>
+          <a:xfrm>
+            <a:off x="9302627" y="1294453"/>
+            <a:ext cx="2209800" cy="3057525"/>
+          </a:xfrm>
+          <a:prstGeom prst="rect">
+            <a:avLst/>
+          </a:prstGeom>
+          <a:ln>
+            <a:noFill/>
+          </a:ln>
+          <a:effectLst>
+            <a:outerShdw blurRad="292100" dist="139700" dir="2700000" algn="tl" rotWithShape="0">
+              <a:srgbClr val="333333">
+                <a:alpha val="65000"/>
+              </a:srgbClr>
+            </a:outerShdw>
+          </a:effectLst>
+        </p:spPr>
+      </p:pic>
+    </p:spTree>
+    <p:extLst>
+      <p:ext uri="{BB962C8B-B14F-4D97-AF65-F5344CB8AC3E}">
+        <p14:creationId xmlns:p14="http://schemas.microsoft.com/office/powerpoint/2010/main" val="2812384373"/>
       </p:ext>
     </p:extLst>
   </p:cSld>

</xml_diff>

<commit_message>
prepare Use Case section
</commit_message>
<xml_diff>
--- a/PlantUML_in_Action.pptx
+++ b/PlantUML_in_Action.pptx
@@ -5,10 +5,10 @@
     <p:sldMasterId id="2147483648" r:id="rId4"/>
   </p:sldMasterIdLst>
   <p:notesMasterIdLst>
-    <p:notesMasterId r:id="rId41"/>
+    <p:notesMasterId r:id="rId42"/>
   </p:notesMasterIdLst>
   <p:handoutMasterIdLst>
-    <p:handoutMasterId r:id="rId42"/>
+    <p:handoutMasterId r:id="rId43"/>
   </p:handoutMasterIdLst>
   <p:sldIdLst>
     <p:sldId id="269" r:id="rId5"/>
@@ -47,6 +47,7 @@
     <p:sldId id="304" r:id="rId38"/>
     <p:sldId id="305" r:id="rId39"/>
     <p:sldId id="306" r:id="rId40"/>
+    <p:sldId id="307" r:id="rId41"/>
   </p:sldIdLst>
   <p:sldSz cx="12192000" cy="6858000"/>
   <p:notesSz cx="6858000" cy="9144000"/>
@@ -3205,6 +3206,90 @@
     <p:extLst>
       <p:ext uri="{BB962C8B-B14F-4D97-AF65-F5344CB8AC3E}">
         <p14:creationId xmlns:p14="http://schemas.microsoft.com/office/powerpoint/2010/main" val="3445045483"/>
+      </p:ext>
+    </p:extLst>
+  </p:cSld>
+  <p:clrMapOvr>
+    <a:masterClrMapping/>
+  </p:clrMapOvr>
+</p:notes>
+</file>
+
+<file path=ppt/notesSlides/notesSlide37.xml><?xml version="1.0" encoding="utf-8"?>
+<p:notes xmlns:a="http://schemas.openxmlformats.org/drawingml/2006/main" xmlns:r="http://schemas.openxmlformats.org/officeDocument/2006/relationships" xmlns:p="http://schemas.openxmlformats.org/presentationml/2006/main">
+  <p:cSld>
+    <p:spTree>
+      <p:nvGrpSpPr>
+        <p:cNvPr id="1" name=""/>
+        <p:cNvGrpSpPr/>
+        <p:nvPr/>
+      </p:nvGrpSpPr>
+      <p:grpSpPr>
+        <a:xfrm>
+          <a:off x="0" y="0"/>
+          <a:ext cx="0" cy="0"/>
+          <a:chOff x="0" y="0"/>
+          <a:chExt cx="0" cy="0"/>
+        </a:xfrm>
+      </p:grpSpPr>
+      <p:sp>
+        <p:nvSpPr>
+          <p:cNvPr id="2" name="Slide Image Placeholder 1"/>
+          <p:cNvSpPr>
+            <a:spLocks noGrp="1" noRot="1" noChangeAspect="1"/>
+          </p:cNvSpPr>
+          <p:nvPr>
+            <p:ph type="sldImg"/>
+          </p:nvPr>
+        </p:nvSpPr>
+        <p:spPr/>
+      </p:sp>
+      <p:sp>
+        <p:nvSpPr>
+          <p:cNvPr id="3" name="Notes Placeholder 2"/>
+          <p:cNvSpPr>
+            <a:spLocks noGrp="1"/>
+          </p:cNvSpPr>
+          <p:nvPr>
+            <p:ph type="body" idx="1"/>
+          </p:nvPr>
+        </p:nvSpPr>
+        <p:spPr/>
+        <p:txBody>
+          <a:bodyPr/>
+          <a:lstStyle/>
+          <a:p>
+            <a:endParaRPr lang="en-US" dirty="0"/>
+          </a:p>
+        </p:txBody>
+      </p:sp>
+      <p:sp>
+        <p:nvSpPr>
+          <p:cNvPr id="4" name="Slide Number Placeholder 3"/>
+          <p:cNvSpPr>
+            <a:spLocks noGrp="1"/>
+          </p:cNvSpPr>
+          <p:nvPr>
+            <p:ph type="sldNum" sz="quarter" idx="5"/>
+          </p:nvPr>
+        </p:nvSpPr>
+        <p:spPr/>
+        <p:txBody>
+          <a:bodyPr/>
+          <a:lstStyle/>
+          <a:p>
+            <a:fld id="{B2D6E128-7848-41C8-9D17-DA3B35E5052C}" type="slidenum">
+              <a:rPr lang="en-US" smtClean="0"/>
+              <a:t>37</a:t>
+            </a:fld>
+            <a:endParaRPr lang="en-US" dirty="0"/>
+          </a:p>
+        </p:txBody>
+      </p:sp>
+    </p:spTree>
+    <p:extLst>
+      <p:ext uri="{BB962C8B-B14F-4D97-AF65-F5344CB8AC3E}">
+        <p14:creationId xmlns:p14="http://schemas.microsoft.com/office/powerpoint/2010/main" val="2074289003"/>
       </p:ext>
     </p:extLst>
   </p:cSld>
@@ -26020,6 +26105,633 @@
     <p:extLst>
       <p:ext uri="{BB962C8B-B14F-4D97-AF65-F5344CB8AC3E}">
         <p14:creationId xmlns:p14="http://schemas.microsoft.com/office/powerpoint/2010/main" val="1224131714"/>
+      </p:ext>
+    </p:extLst>
+  </p:cSld>
+  <p:clrMapOvr>
+    <a:masterClrMapping/>
+  </p:clrMapOvr>
+</p:sld>
+</file>
+
+<file path=ppt/slides/slide37.xml><?xml version="1.0" encoding="utf-8"?>
+<p:sld xmlns:a="http://schemas.openxmlformats.org/drawingml/2006/main" xmlns:r="http://schemas.openxmlformats.org/officeDocument/2006/relationships" xmlns:p="http://schemas.openxmlformats.org/presentationml/2006/main">
+  <p:cSld>
+    <p:spTree>
+      <p:nvGrpSpPr>
+        <p:cNvPr id="1" name=""/>
+        <p:cNvGrpSpPr/>
+        <p:nvPr/>
+      </p:nvGrpSpPr>
+      <p:grpSpPr>
+        <a:xfrm>
+          <a:off x="0" y="0"/>
+          <a:ext cx="0" cy="0"/>
+          <a:chOff x="0" y="0"/>
+          <a:chExt cx="0" cy="0"/>
+        </a:xfrm>
+      </p:grpSpPr>
+      <p:pic>
+        <p:nvPicPr>
+          <p:cNvPr id="18" name="Picture Placeholder 17" descr="Learn to Draw Background">
+            <a:extLst>
+              <a:ext uri="{FF2B5EF4-FFF2-40B4-BE49-F238E27FC236}">
+                <a16:creationId xmlns:a16="http://schemas.microsoft.com/office/drawing/2014/main" id="{7FD9C5C0-919A-48C6-B5A4-49A012EB3DC2}"/>
+              </a:ext>
+            </a:extLst>
+          </p:cNvPr>
+          <p:cNvPicPr>
+            <a:picLocks noGrp="1" noChangeAspect="1"/>
+          </p:cNvPicPr>
+          <p:nvPr>
+            <p:ph type="pic" sz="quarter" idx="15"/>
+          </p:nvPr>
+        </p:nvPicPr>
+        <p:blipFill>
+          <a:blip r:embed="rId3">
+            <a:extLst>
+              <a:ext uri="{28A0092B-C50C-407E-A947-70E740481C1C}">
+                <a14:useLocalDpi xmlns:a14="http://schemas.microsoft.com/office/drawing/2010/main" val="0"/>
+              </a:ext>
+            </a:extLst>
+          </a:blip>
+          <a:srcRect/>
+          <a:stretch>
+            <a:fillRect/>
+          </a:stretch>
+        </p:blipFill>
+        <p:spPr>
+          <a:xfrm>
+            <a:off x="0" y="-32004"/>
+            <a:ext cx="12192000" cy="6912864"/>
+          </a:xfrm>
+        </p:spPr>
+      </p:pic>
+      <p:sp>
+        <p:nvSpPr>
+          <p:cNvPr id="21" name="Title 20">
+            <a:extLst>
+              <a:ext uri="{FF2B5EF4-FFF2-40B4-BE49-F238E27FC236}">
+                <a16:creationId xmlns:a16="http://schemas.microsoft.com/office/drawing/2014/main" id="{D4374B7E-EEDF-4C84-BE7C-BB50183825A0}"/>
+              </a:ext>
+            </a:extLst>
+          </p:cNvPr>
+          <p:cNvSpPr>
+            <a:spLocks noGrp="1"/>
+          </p:cNvSpPr>
+          <p:nvPr>
+            <p:ph type="title"/>
+          </p:nvPr>
+        </p:nvSpPr>
+        <p:spPr>
+          <a:xfrm>
+            <a:off x="2346356" y="128571"/>
+            <a:ext cx="7120094" cy="819150"/>
+          </a:xfrm>
+          <a:gradFill flip="none" rotWithShape="1">
+            <a:gsLst>
+              <a:gs pos="0">
+                <a:schemeClr val="accent1">
+                  <a:lumMod val="67000"/>
+                </a:schemeClr>
+              </a:gs>
+              <a:gs pos="48000">
+                <a:schemeClr val="accent1">
+                  <a:lumMod val="97000"/>
+                  <a:lumOff val="3000"/>
+                </a:schemeClr>
+              </a:gs>
+              <a:gs pos="100000">
+                <a:schemeClr val="accent1">
+                  <a:lumMod val="60000"/>
+                  <a:lumOff val="40000"/>
+                </a:schemeClr>
+              </a:gs>
+            </a:gsLst>
+            <a:lin ang="16200000" scaled="1"/>
+            <a:tileRect/>
+          </a:gradFill>
+          <a:ln>
+            <a:noFill/>
+          </a:ln>
+        </p:spPr>
+        <p:style>
+          <a:lnRef idx="0">
+            <a:scrgbClr r="0" g="0" b="0"/>
+          </a:lnRef>
+          <a:fillRef idx="0">
+            <a:scrgbClr r="0" g="0" b="0"/>
+          </a:fillRef>
+          <a:effectRef idx="0">
+            <a:scrgbClr r="0" g="0" b="0"/>
+          </a:effectRef>
+          <a:fontRef idx="minor">
+            <a:schemeClr val="lt1"/>
+          </a:fontRef>
+        </p:style>
+        <p:txBody>
+          <a:bodyPr anchor="ctr"/>
+          <a:lstStyle/>
+          <a:p>
+            <a:pPr algn="ctr"/>
+            <a:r>
+              <a:rPr lang="en-US" sz="6600" dirty="0">
+                <a:solidFill>
+                  <a:schemeClr val="bg1">
+                    <a:lumMod val="95000"/>
+                  </a:schemeClr>
+                </a:solidFill>
+              </a:rPr>
+              <a:t>PlantUML in Action</a:t>
+            </a:r>
+          </a:p>
+        </p:txBody>
+      </p:sp>
+      <p:sp>
+        <p:nvSpPr>
+          <p:cNvPr id="2" name="TextBox 1">
+            <a:extLst>
+              <a:ext uri="{FF2B5EF4-FFF2-40B4-BE49-F238E27FC236}">
+                <a16:creationId xmlns:a16="http://schemas.microsoft.com/office/drawing/2014/main" id="{BCB381F4-71C4-3080-500A-ADD1D9693A22}"/>
+              </a:ext>
+            </a:extLst>
+          </p:cNvPr>
+          <p:cNvSpPr txBox="1"/>
+          <p:nvPr/>
+        </p:nvSpPr>
+        <p:spPr>
+          <a:xfrm>
+            <a:off x="63778" y="544376"/>
+            <a:ext cx="1742785" cy="1323439"/>
+          </a:xfrm>
+          <a:prstGeom prst="rect">
+            <a:avLst/>
+          </a:prstGeom>
+          <a:noFill/>
+        </p:spPr>
+        <p:txBody>
+          <a:bodyPr wrap="none" rtlCol="0">
+            <a:spAutoFit/>
+          </a:bodyPr>
+          <a:lstStyle/>
+          <a:p>
+            <a:pPr algn="ctr"/>
+            <a:r>
+              <a:rPr lang="en-US" sz="8000" b="1" dirty="0">
+                <a:solidFill>
+                  <a:schemeClr val="tx1">
+                    <a:lumMod val="65000"/>
+                    <a:lumOff val="35000"/>
+                  </a:schemeClr>
+                </a:solidFill>
+                <a:effectLst>
+                  <a:outerShdw blurRad="38100" dist="38100" dir="2700000" algn="tl">
+                    <a:srgbClr val="000000">
+                      <a:alpha val="43137"/>
+                    </a:srgbClr>
+                  </a:outerShdw>
+                </a:effectLst>
+                <a:ea typeface="+mj-ea"/>
+                <a:cs typeface="+mj-cs"/>
+              </a:rPr>
+              <a:t>035</a:t>
+            </a:r>
+          </a:p>
+        </p:txBody>
+      </p:sp>
+      <p:grpSp>
+        <p:nvGrpSpPr>
+          <p:cNvPr id="6" name="Group 5">
+            <a:extLst>
+              <a:ext uri="{FF2B5EF4-FFF2-40B4-BE49-F238E27FC236}">
+                <a16:creationId xmlns:a16="http://schemas.microsoft.com/office/drawing/2014/main" id="{9D2C3B74-3F5D-CAAA-2D9B-BC4A520A9943}"/>
+              </a:ext>
+            </a:extLst>
+          </p:cNvPr>
+          <p:cNvGrpSpPr/>
+          <p:nvPr/>
+        </p:nvGrpSpPr>
+        <p:grpSpPr>
+          <a:xfrm>
+            <a:off x="140722" y="6221921"/>
+            <a:ext cx="2807208" cy="588020"/>
+            <a:chOff x="9034272" y="6189470"/>
+            <a:chExt cx="2807208" cy="588020"/>
+          </a:xfrm>
+        </p:grpSpPr>
+        <p:sp>
+          <p:nvSpPr>
+            <p:cNvPr id="7" name="Rectangle: Rounded Corners 6">
+              <a:extLst>
+                <a:ext uri="{FF2B5EF4-FFF2-40B4-BE49-F238E27FC236}">
+                  <a16:creationId xmlns:a16="http://schemas.microsoft.com/office/drawing/2014/main" id="{0010B690-7856-5EB1-2BF9-0C41CA3642A5}"/>
+                </a:ext>
+              </a:extLst>
+            </p:cNvPr>
+            <p:cNvSpPr/>
+            <p:nvPr/>
+          </p:nvSpPr>
+          <p:spPr>
+            <a:xfrm>
+              <a:off x="9034272" y="6189470"/>
+              <a:ext cx="2807208" cy="588020"/>
+            </a:xfrm>
+            <a:prstGeom prst="roundRect">
+              <a:avLst/>
+            </a:prstGeom>
+            <a:solidFill>
+              <a:schemeClr val="accent1">
+                <a:lumMod val="20000"/>
+                <a:lumOff val="80000"/>
+              </a:schemeClr>
+            </a:solidFill>
+            <a:ln>
+              <a:noFill/>
+            </a:ln>
+          </p:spPr>
+          <p:style>
+            <a:lnRef idx="2">
+              <a:schemeClr val="accent1">
+                <a:shade val="15000"/>
+              </a:schemeClr>
+            </a:lnRef>
+            <a:fillRef idx="1">
+              <a:schemeClr val="accent1"/>
+            </a:fillRef>
+            <a:effectRef idx="0">
+              <a:schemeClr val="accent1"/>
+            </a:effectRef>
+            <a:fontRef idx="minor">
+              <a:schemeClr val="lt1"/>
+            </a:fontRef>
+          </p:style>
+          <p:txBody>
+            <a:bodyPr rtlCol="0" anchor="ctr"/>
+            <a:lstStyle/>
+            <a:p>
+              <a:pPr algn="r"/>
+              <a:r>
+                <a:rPr lang="en-US" sz="1200" dirty="0">
+                  <a:ln w="0"/>
+                  <a:solidFill>
+                    <a:schemeClr val="tx1"/>
+                  </a:solidFill>
+                  <a:effectLst>
+                    <a:outerShdw blurRad="38100" dist="19050" dir="2700000" algn="tl" rotWithShape="0">
+                      <a:schemeClr val="dk1">
+                        <a:alpha val="40000"/>
+                      </a:schemeClr>
+                    </a:outerShdw>
+                  </a:effectLst>
+                </a:rPr>
+                <a:t>Yasen – Enterprise Architecture</a:t>
+              </a:r>
+            </a:p>
+            <a:p>
+              <a:pPr algn="r"/>
+              <a:r>
+                <a:rPr lang="en-US" sz="1200" dirty="0">
+                  <a:ln w="0"/>
+                  <a:solidFill>
+                    <a:schemeClr val="tx1"/>
+                  </a:solidFill>
+                  <a:effectLst>
+                    <a:outerShdw blurRad="38100" dist="19050" dir="2700000" algn="tl" rotWithShape="0">
+                      <a:schemeClr val="dk1">
+                        <a:alpha val="40000"/>
+                      </a:schemeClr>
+                    </a:outerShdw>
+                  </a:effectLst>
+                </a:rPr>
+                <a:t>YouTube: @yasenzhao</a:t>
+              </a:r>
+            </a:p>
+          </p:txBody>
+        </p:sp>
+        <p:pic>
+          <p:nvPicPr>
+            <p:cNvPr id="8" name="Picture 7">
+              <a:extLst>
+                <a:ext uri="{FF2B5EF4-FFF2-40B4-BE49-F238E27FC236}">
+                  <a16:creationId xmlns:a16="http://schemas.microsoft.com/office/drawing/2014/main" id="{574298EC-4397-D1B2-D733-593141A52CEB}"/>
+                </a:ext>
+              </a:extLst>
+            </p:cNvPr>
+            <p:cNvPicPr>
+              <a:picLocks noChangeAspect="1"/>
+            </p:cNvPicPr>
+            <p:nvPr/>
+          </p:nvPicPr>
+          <p:blipFill>
+            <a:blip r:embed="rId4">
+              <a:clrChange>
+                <a:clrFrom>
+                  <a:srgbClr val="FFFFFF"/>
+                </a:clrFrom>
+                <a:clrTo>
+                  <a:srgbClr val="FFFFFF">
+                    <a:alpha val="0"/>
+                  </a:srgbClr>
+                </a:clrTo>
+              </a:clrChange>
+            </a:blip>
+            <a:stretch>
+              <a:fillRect/>
+            </a:stretch>
+          </p:blipFill>
+          <p:spPr>
+            <a:xfrm>
+              <a:off x="9187981" y="6196988"/>
+              <a:ext cx="557286" cy="572984"/>
+            </a:xfrm>
+            <a:prstGeom prst="rect">
+              <a:avLst/>
+            </a:prstGeom>
+          </p:spPr>
+        </p:pic>
+      </p:grpSp>
+      <p:sp>
+        <p:nvSpPr>
+          <p:cNvPr id="11" name="Text Placeholder 10">
+            <a:extLst>
+              <a:ext uri="{FF2B5EF4-FFF2-40B4-BE49-F238E27FC236}">
+                <a16:creationId xmlns:a16="http://schemas.microsoft.com/office/drawing/2014/main" id="{35F1FC23-8B59-9603-A7DF-2732C830F2A2}"/>
+              </a:ext>
+            </a:extLst>
+          </p:cNvPr>
+          <p:cNvSpPr>
+            <a:spLocks noGrp="1"/>
+          </p:cNvSpPr>
+          <p:nvPr>
+            <p:ph type="body" sz="quarter" idx="14"/>
+          </p:nvPr>
+        </p:nvSpPr>
+        <p:spPr>
+          <a:xfrm>
+            <a:off x="3220161" y="6400799"/>
+            <a:ext cx="8428913" cy="401623"/>
+          </a:xfrm>
+        </p:spPr>
+        <p:txBody>
+          <a:bodyPr anchor="ctr">
+            <a:noAutofit/>
+          </a:bodyPr>
+          <a:lstStyle/>
+          <a:p>
+            <a:pPr>
+              <a:lnSpc>
+                <a:spcPct val="120000"/>
+              </a:lnSpc>
+            </a:pPr>
+            <a:r>
+              <a:rPr lang="en-US" sz="2400" dirty="0"/>
+              <a:t>GitHub: </a:t>
+            </a:r>
+            <a:r>
+              <a:rPr lang="en-US" sz="2400" dirty="0">
+                <a:hlinkClick r:id="rId5"/>
+              </a:rPr>
+              <a:t>https://github.com/yasenstar/PlantUML_in_Action</a:t>
+            </a:r>
+            <a:endParaRPr lang="en-US" sz="2400" dirty="0"/>
+          </a:p>
+        </p:txBody>
+      </p:sp>
+      <p:sp>
+        <p:nvSpPr>
+          <p:cNvPr id="12" name="Title 20">
+            <a:extLst>
+              <a:ext uri="{FF2B5EF4-FFF2-40B4-BE49-F238E27FC236}">
+                <a16:creationId xmlns:a16="http://schemas.microsoft.com/office/drawing/2014/main" id="{0CA82506-B712-27A8-0AC7-E2C48FCA049F}"/>
+              </a:ext>
+            </a:extLst>
+          </p:cNvPr>
+          <p:cNvSpPr txBox="1">
+            <a:spLocks/>
+          </p:cNvSpPr>
+          <p:nvPr/>
+        </p:nvSpPr>
+        <p:spPr>
+          <a:xfrm>
+            <a:off x="2571750" y="1031627"/>
+            <a:ext cx="8820150" cy="1289457"/>
+          </a:xfrm>
+          <a:prstGeom prst="rect">
+            <a:avLst/>
+          </a:prstGeom>
+          <a:solidFill>
+            <a:srgbClr val="EDF3DB">
+              <a:alpha val="50196"/>
+            </a:srgbClr>
+          </a:solidFill>
+        </p:spPr>
+        <p:txBody>
+          <a:bodyPr vert="horz" lIns="91440" tIns="45720" rIns="91440" bIns="45720" rtlCol="0" anchor="ctr">
+            <a:normAutofit lnSpcReduction="10000"/>
+          </a:bodyPr>
+          <a:lstStyle>
+            <a:lvl1pPr algn="l" defTabSz="914400" rtl="0" eaLnBrk="1" latinLnBrk="0" hangingPunct="1">
+              <a:lnSpc>
+                <a:spcPct val="90000"/>
+              </a:lnSpc>
+              <a:spcBef>
+                <a:spcPct val="0"/>
+              </a:spcBef>
+              <a:buNone/>
+              <a:defRPr sz="8200" b="1" kern="1200">
+                <a:solidFill>
+                  <a:schemeClr val="tx1">
+                    <a:lumMod val="65000"/>
+                    <a:lumOff val="35000"/>
+                  </a:schemeClr>
+                </a:solidFill>
+                <a:effectLst>
+                  <a:outerShdw blurRad="38100" dist="38100" dir="2700000" algn="tl">
+                    <a:srgbClr val="000000">
+                      <a:alpha val="43137"/>
+                    </a:srgbClr>
+                  </a:outerShdw>
+                </a:effectLst>
+                <a:latin typeface="+mn-lt"/>
+                <a:ea typeface="+mj-ea"/>
+                <a:cs typeface="+mj-cs"/>
+              </a:defRPr>
+            </a:lvl1pPr>
+          </a:lstStyle>
+          <a:p>
+            <a:r>
+              <a:rPr lang="en-US" sz="5400" dirty="0"/>
+              <a:t>2. Use Case Diagram</a:t>
+            </a:r>
+          </a:p>
+          <a:p>
+            <a:r>
+              <a:rPr lang="en-US" sz="3600" dirty="0"/>
+              <a:t>2.1 Use Cases 2.2 Actors</a:t>
+            </a:r>
+          </a:p>
+        </p:txBody>
+      </p:sp>
+      <p:pic>
+        <p:nvPicPr>
+          <p:cNvPr id="20" name="Picture 19">
+            <a:extLst>
+              <a:ext uri="{FF2B5EF4-FFF2-40B4-BE49-F238E27FC236}">
+                <a16:creationId xmlns:a16="http://schemas.microsoft.com/office/drawing/2014/main" id="{89D0C9AB-2794-9767-5B5A-4CDC46E6E000}"/>
+              </a:ext>
+            </a:extLst>
+          </p:cNvPr>
+          <p:cNvPicPr>
+            <a:picLocks noChangeAspect="1"/>
+          </p:cNvPicPr>
+          <p:nvPr/>
+        </p:nvPicPr>
+        <p:blipFill>
+          <a:blip r:embed="rId6"/>
+          <a:stretch>
+            <a:fillRect/>
+          </a:stretch>
+        </p:blipFill>
+        <p:spPr>
+          <a:xfrm>
+            <a:off x="73819" y="2167128"/>
+            <a:ext cx="2313601" cy="2143125"/>
+          </a:xfrm>
+          <a:prstGeom prst="rect">
+            <a:avLst/>
+          </a:prstGeom>
+          <a:ln>
+            <a:noFill/>
+          </a:ln>
+          <a:effectLst>
+            <a:softEdge rad="112500"/>
+          </a:effectLst>
+        </p:spPr>
+      </p:pic>
+      <p:pic>
+        <p:nvPicPr>
+          <p:cNvPr id="4" name="Picture 3">
+            <a:extLst>
+              <a:ext uri="{FF2B5EF4-FFF2-40B4-BE49-F238E27FC236}">
+                <a16:creationId xmlns:a16="http://schemas.microsoft.com/office/drawing/2014/main" id="{2CC580F9-A2AC-369C-5808-0B1972ACB7FC}"/>
+              </a:ext>
+            </a:extLst>
+          </p:cNvPr>
+          <p:cNvPicPr>
+            <a:picLocks noChangeAspect="1"/>
+          </p:cNvPicPr>
+          <p:nvPr/>
+        </p:nvPicPr>
+        <p:blipFill>
+          <a:blip r:embed="rId7"/>
+          <a:stretch>
+            <a:fillRect/>
+          </a:stretch>
+        </p:blipFill>
+        <p:spPr>
+          <a:xfrm>
+            <a:off x="3220161" y="2355980"/>
+            <a:ext cx="5038725" cy="3966381"/>
+          </a:xfrm>
+          <a:prstGeom prst="rect">
+            <a:avLst/>
+          </a:prstGeom>
+          <a:ln>
+            <a:noFill/>
+          </a:ln>
+          <a:effectLst>
+            <a:outerShdw blurRad="292100" dist="139700" dir="2700000" algn="tl" rotWithShape="0">
+              <a:srgbClr val="333333">
+                <a:alpha val="65000"/>
+              </a:srgbClr>
+            </a:outerShdw>
+          </a:effectLst>
+        </p:spPr>
+      </p:pic>
+      <p:pic>
+        <p:nvPicPr>
+          <p:cNvPr id="9" name="Picture 8">
+            <a:extLst>
+              <a:ext uri="{FF2B5EF4-FFF2-40B4-BE49-F238E27FC236}">
+                <a16:creationId xmlns:a16="http://schemas.microsoft.com/office/drawing/2014/main" id="{7CBF7D33-FFF7-B564-2B52-5F4B99417B1B}"/>
+              </a:ext>
+            </a:extLst>
+          </p:cNvPr>
+          <p:cNvPicPr>
+            <a:picLocks noChangeAspect="1"/>
+          </p:cNvPicPr>
+          <p:nvPr/>
+        </p:nvPicPr>
+        <p:blipFill>
+          <a:blip r:embed="rId8"/>
+          <a:stretch>
+            <a:fillRect/>
+          </a:stretch>
+        </p:blipFill>
+        <p:spPr>
+          <a:xfrm>
+            <a:off x="8677275" y="2660815"/>
+            <a:ext cx="2714625" cy="1447800"/>
+          </a:xfrm>
+          <a:prstGeom prst="rect">
+            <a:avLst/>
+          </a:prstGeom>
+          <a:ln>
+            <a:noFill/>
+          </a:ln>
+          <a:effectLst>
+            <a:outerShdw blurRad="292100" dist="139700" dir="2700000" algn="tl" rotWithShape="0">
+              <a:srgbClr val="333333">
+                <a:alpha val="65000"/>
+              </a:srgbClr>
+            </a:outerShdw>
+          </a:effectLst>
+        </p:spPr>
+      </p:pic>
+      <p:pic>
+        <p:nvPicPr>
+          <p:cNvPr id="15" name="Picture 14">
+            <a:extLst>
+              <a:ext uri="{FF2B5EF4-FFF2-40B4-BE49-F238E27FC236}">
+                <a16:creationId xmlns:a16="http://schemas.microsoft.com/office/drawing/2014/main" id="{699CE7BF-EB09-968D-7A4A-A9A560A7E18E}"/>
+              </a:ext>
+            </a:extLst>
+          </p:cNvPr>
+          <p:cNvPicPr>
+            <a:picLocks noChangeAspect="1"/>
+          </p:cNvPicPr>
+          <p:nvPr/>
+        </p:nvPicPr>
+        <p:blipFill>
+          <a:blip r:embed="rId9"/>
+          <a:stretch>
+            <a:fillRect/>
+          </a:stretch>
+        </p:blipFill>
+        <p:spPr>
+          <a:xfrm>
+            <a:off x="9143999" y="4187053"/>
+            <a:ext cx="1781175" cy="2076450"/>
+          </a:xfrm>
+          <a:prstGeom prst="rect">
+            <a:avLst/>
+          </a:prstGeom>
+          <a:ln>
+            <a:noFill/>
+          </a:ln>
+          <a:effectLst>
+            <a:outerShdw blurRad="292100" dist="139700" dir="2700000" algn="tl" rotWithShape="0">
+              <a:srgbClr val="333333">
+                <a:alpha val="65000"/>
+              </a:srgbClr>
+            </a:outerShdw>
+          </a:effectLst>
+        </p:spPr>
+      </p:pic>
+    </p:spTree>
+    <p:extLst>
+      <p:ext uri="{BB962C8B-B14F-4D97-AF65-F5344CB8AC3E}">
+        <p14:creationId xmlns:p14="http://schemas.microsoft.com/office/powerpoint/2010/main" val="2205701108"/>
       </p:ext>
     </p:extLst>
   </p:cSld>

</xml_diff>